<commit_message>
finito la presentazione iniziale (ancora da stilizzare), va bene così?
</commit_message>
<xml_diff>
--- a/Tesi_Sistema_Accessi_IoT_Andrei_Ciulpan_872394/presentazione/Sistema Accessi IoT.pptx
+++ b/Tesi_Sistema_Accessi_IoT_Andrei_Ciulpan_872394/presentazione/Sistema Accessi IoT.pptx
@@ -7,6 +7,15 @@
   <p:sldIdLst>
     <p:sldId id="256" r:id="rId2"/>
     <p:sldId id="257" r:id="rId3"/>
+    <p:sldId id="258" r:id="rId4"/>
+    <p:sldId id="259" r:id="rId5"/>
+    <p:sldId id="264" r:id="rId6"/>
+    <p:sldId id="260" r:id="rId7"/>
+    <p:sldId id="263" r:id="rId8"/>
+    <p:sldId id="261" r:id="rId9"/>
+    <p:sldId id="262" r:id="rId10"/>
+    <p:sldId id="265" r:id="rId11"/>
+    <p:sldId id="266" r:id="rId12"/>
   </p:sldIdLst>
   <p:sldSz cx="9144000" cy="6858000" type="screen4x3"/>
   <p:notesSz cx="6858000" cy="9144000"/>
@@ -105,6 +114,27 @@
       </a:defRPr>
     </a:lvl9pPr>
   </p:defaultTextStyle>
+  <p:extLst>
+    <p:ext uri="{521415D9-36F7-43E2-AB2F-B90AF26B5E84}">
+      <p14:sectionLst xmlns:p14="http://schemas.microsoft.com/office/powerpoint/2010/main">
+        <p14:section name="Secțiune implicită" id="{F12CB6F5-F495-492F-BF5F-E6D89F12FEA5}">
+          <p14:sldIdLst>
+            <p14:sldId id="256"/>
+            <p14:sldId id="257"/>
+            <p14:sldId id="258"/>
+            <p14:sldId id="259"/>
+            <p14:sldId id="264"/>
+            <p14:sldId id="260"/>
+            <p14:sldId id="263"/>
+            <p14:sldId id="261"/>
+            <p14:sldId id="262"/>
+            <p14:sldId id="265"/>
+            <p14:sldId id="266"/>
+          </p14:sldIdLst>
+        </p14:section>
+      </p14:sectionLst>
+    </p:ext>
+  </p:extLst>
 </p:presentation>
 </file>
 
@@ -289,7 +319,7 @@
           <a:p>
             <a:fld id="{179DE077-2B25-4D43-8A5F-B5A94BA1672D}" type="datetimeFigureOut">
               <a:rPr lang="en-US" smtClean="0"/>
-              <a:t>17-Jun-19</a:t>
+              <a:t>18-Jun-19</a:t>
             </a:fld>
             <a:endParaRPr lang="en-US"/>
           </a:p>
@@ -459,7 +489,7 @@
           <a:p>
             <a:fld id="{179DE077-2B25-4D43-8A5F-B5A94BA1672D}" type="datetimeFigureOut">
               <a:rPr lang="en-US" smtClean="0"/>
-              <a:t>17-Jun-19</a:t>
+              <a:t>18-Jun-19</a:t>
             </a:fld>
             <a:endParaRPr lang="en-US"/>
           </a:p>
@@ -639,7 +669,7 @@
           <a:p>
             <a:fld id="{179DE077-2B25-4D43-8A5F-B5A94BA1672D}" type="datetimeFigureOut">
               <a:rPr lang="en-US" smtClean="0"/>
-              <a:t>17-Jun-19</a:t>
+              <a:t>18-Jun-19</a:t>
             </a:fld>
             <a:endParaRPr lang="en-US"/>
           </a:p>
@@ -809,7 +839,7 @@
           <a:p>
             <a:fld id="{179DE077-2B25-4D43-8A5F-B5A94BA1672D}" type="datetimeFigureOut">
               <a:rPr lang="en-US" smtClean="0"/>
-              <a:t>17-Jun-19</a:t>
+              <a:t>18-Jun-19</a:t>
             </a:fld>
             <a:endParaRPr lang="en-US"/>
           </a:p>
@@ -1055,7 +1085,7 @@
           <a:p>
             <a:fld id="{179DE077-2B25-4D43-8A5F-B5A94BA1672D}" type="datetimeFigureOut">
               <a:rPr lang="en-US" smtClean="0"/>
-              <a:t>17-Jun-19</a:t>
+              <a:t>18-Jun-19</a:t>
             </a:fld>
             <a:endParaRPr lang="en-US"/>
           </a:p>
@@ -1343,7 +1373,7 @@
           <a:p>
             <a:fld id="{179DE077-2B25-4D43-8A5F-B5A94BA1672D}" type="datetimeFigureOut">
               <a:rPr lang="en-US" smtClean="0"/>
-              <a:t>17-Jun-19</a:t>
+              <a:t>18-Jun-19</a:t>
             </a:fld>
             <a:endParaRPr lang="en-US"/>
           </a:p>
@@ -1765,7 +1795,7 @@
           <a:p>
             <a:fld id="{179DE077-2B25-4D43-8A5F-B5A94BA1672D}" type="datetimeFigureOut">
               <a:rPr lang="en-US" smtClean="0"/>
-              <a:t>17-Jun-19</a:t>
+              <a:t>18-Jun-19</a:t>
             </a:fld>
             <a:endParaRPr lang="en-US"/>
           </a:p>
@@ -1883,7 +1913,7 @@
           <a:p>
             <a:fld id="{179DE077-2B25-4D43-8A5F-B5A94BA1672D}" type="datetimeFigureOut">
               <a:rPr lang="en-US" smtClean="0"/>
-              <a:t>17-Jun-19</a:t>
+              <a:t>18-Jun-19</a:t>
             </a:fld>
             <a:endParaRPr lang="en-US"/>
           </a:p>
@@ -1978,7 +2008,7 @@
           <a:p>
             <a:fld id="{179DE077-2B25-4D43-8A5F-B5A94BA1672D}" type="datetimeFigureOut">
               <a:rPr lang="en-US" smtClean="0"/>
-              <a:t>17-Jun-19</a:t>
+              <a:t>18-Jun-19</a:t>
             </a:fld>
             <a:endParaRPr lang="en-US"/>
           </a:p>
@@ -2255,7 +2285,7 @@
           <a:p>
             <a:fld id="{179DE077-2B25-4D43-8A5F-B5A94BA1672D}" type="datetimeFigureOut">
               <a:rPr lang="en-US" smtClean="0"/>
-              <a:t>17-Jun-19</a:t>
+              <a:t>18-Jun-19</a:t>
             </a:fld>
             <a:endParaRPr lang="en-US"/>
           </a:p>
@@ -2508,7 +2538,7 @@
           <a:p>
             <a:fld id="{179DE077-2B25-4D43-8A5F-B5A94BA1672D}" type="datetimeFigureOut">
               <a:rPr lang="en-US" smtClean="0"/>
-              <a:t>17-Jun-19</a:t>
+              <a:t>18-Jun-19</a:t>
             </a:fld>
             <a:endParaRPr lang="en-US"/>
           </a:p>
@@ -2721,7 +2751,7 @@
           <a:p>
             <a:fld id="{179DE077-2B25-4D43-8A5F-B5A94BA1672D}" type="datetimeFigureOut">
               <a:rPr lang="en-US" smtClean="0"/>
-              <a:t>17-Jun-19</a:t>
+              <a:t>18-Jun-19</a:t>
             </a:fld>
             <a:endParaRPr lang="en-US"/>
           </a:p>
@@ -3154,8 +3184,8 @@
         </p:nvSpPr>
         <p:spPr>
           <a:xfrm>
-            <a:off x="1981200" y="2667000"/>
-            <a:ext cx="5715000" cy="1371600"/>
+            <a:off x="1904999" y="2667000"/>
+            <a:ext cx="6008235" cy="1371600"/>
           </a:xfrm>
         </p:spPr>
         <p:txBody>
@@ -3191,7 +3221,19 @@
             </a:r>
             <a:r>
               <a:rPr lang="en-US" sz="2800" b="1" dirty="0" smtClean="0"/>
-              <a:t>Marco LANZA</a:t>
+              <a:t>Marco </a:t>
+            </a:r>
+            <a:r>
+              <a:rPr lang="en-US" sz="2800" b="1" dirty="0"/>
+              <a:t> </a:t>
+            </a:r>
+            <a:r>
+              <a:rPr lang="en-US" sz="2800" b="1" dirty="0" smtClean="0"/>
+              <a:t> </a:t>
+            </a:r>
+            <a:r>
+              <a:rPr lang="en-US" sz="2800" b="1" dirty="0" smtClean="0"/>
+              <a:t>LANZA</a:t>
             </a:r>
             <a:endParaRPr lang="en-US" sz="2800" b="1" dirty="0"/>
           </a:p>
@@ -3220,8 +3262,8 @@
         </p:blipFill>
         <p:spPr bwMode="auto">
           <a:xfrm>
-            <a:off x="304800" y="4791076"/>
-            <a:ext cx="4724400" cy="1600200"/>
+            <a:off x="304800" y="5029200"/>
+            <a:ext cx="4724400" cy="1362076"/>
           </a:xfrm>
           <a:prstGeom prst="rect">
             <a:avLst/>
@@ -3261,8 +3303,8 @@
         </p:blipFill>
         <p:spPr bwMode="auto">
           <a:xfrm>
-            <a:off x="5486400" y="4791075"/>
-            <a:ext cx="2847975" cy="1600200"/>
+            <a:off x="5562600" y="5105400"/>
+            <a:ext cx="2847975" cy="1209675"/>
           </a:xfrm>
           <a:prstGeom prst="rect">
             <a:avLst/>
@@ -3292,6 +3334,241 @@
 </p:sld>
 </file>
 
+<file path=ppt/slides/slide10.xml><?xml version="1.0" encoding="utf-8"?>
+<p:sld xmlns:a="http://schemas.openxmlformats.org/drawingml/2006/main" xmlns:r="http://schemas.openxmlformats.org/officeDocument/2006/relationships" xmlns:p="http://schemas.openxmlformats.org/presentationml/2006/main">
+  <p:cSld>
+    <p:spTree>
+      <p:nvGrpSpPr>
+        <p:cNvPr id="1" name=""/>
+        <p:cNvGrpSpPr/>
+        <p:nvPr/>
+      </p:nvGrpSpPr>
+      <p:grpSpPr>
+        <a:xfrm>
+          <a:off x="0" y="0"/>
+          <a:ext cx="0" cy="0"/>
+          <a:chOff x="0" y="0"/>
+          <a:chExt cx="0" cy="0"/>
+        </a:xfrm>
+      </p:grpSpPr>
+      <p:sp>
+        <p:nvSpPr>
+          <p:cNvPr id="2" name="Titlu 1"/>
+          <p:cNvSpPr>
+            <a:spLocks noGrp="1"/>
+          </p:cNvSpPr>
+          <p:nvPr>
+            <p:ph type="title"/>
+          </p:nvPr>
+        </p:nvSpPr>
+        <p:spPr/>
+        <p:txBody>
+          <a:bodyPr/>
+          <a:lstStyle/>
+          <a:p>
+            <a:r>
+              <a:rPr lang="en-US" dirty="0" err="1" smtClean="0"/>
+              <a:t>Prototipo</a:t>
+            </a:r>
+            <a:r>
+              <a:rPr lang="en-US" dirty="0" smtClean="0"/>
+              <a:t> </a:t>
+            </a:r>
+            <a:r>
+              <a:rPr lang="en-US" dirty="0" err="1" smtClean="0"/>
+              <a:t>SimSim</a:t>
+            </a:r>
+            <a:endParaRPr lang="en-US" dirty="0"/>
+          </a:p>
+        </p:txBody>
+      </p:sp>
+      <p:pic>
+        <p:nvPicPr>
+          <p:cNvPr id="3074" name="Picture 2" descr="C:\Users\Jolsty\Desktop\SimSimGit\SimSim\Tesi_Sistema_Accessi_IoT_Andrei_Ciulpan_872394\img\simsim.jpeg"/>
+          <p:cNvPicPr>
+            <a:picLocks noChangeAspect="1" noChangeArrowheads="1"/>
+          </p:cNvPicPr>
+          <p:nvPr/>
+        </p:nvPicPr>
+        <p:blipFill>
+          <a:blip r:embed="rId2">
+            <a:extLst>
+              <a:ext uri="{28A0092B-C50C-407E-A947-70E740481C1C}">
+                <a14:useLocalDpi xmlns:a14="http://schemas.microsoft.com/office/drawing/2010/main" val="0"/>
+              </a:ext>
+            </a:extLst>
+          </a:blip>
+          <a:srcRect/>
+          <a:stretch>
+            <a:fillRect/>
+          </a:stretch>
+        </p:blipFill>
+        <p:spPr bwMode="auto">
+          <a:xfrm>
+            <a:off x="885120" y="1542253"/>
+            <a:ext cx="7373760" cy="3994120"/>
+          </a:xfrm>
+          <a:prstGeom prst="rect">
+            <a:avLst/>
+          </a:prstGeom>
+          <a:noFill/>
+          <a:extLst>
+            <a:ext uri="{909E8E84-426E-40DD-AFC4-6F175D3DCCD1}">
+              <a14:hiddenFill xmlns:a14="http://schemas.microsoft.com/office/drawing/2010/main">
+                <a:solidFill>
+                  <a:srgbClr val="FFFFFF"/>
+                </a:solidFill>
+              </a14:hiddenFill>
+            </a:ext>
+          </a:extLst>
+        </p:spPr>
+      </p:pic>
+      <p:sp>
+        <p:nvSpPr>
+          <p:cNvPr id="5" name="Dreptunghi 4"/>
+          <p:cNvSpPr/>
+          <p:nvPr/>
+        </p:nvSpPr>
+        <p:spPr>
+          <a:xfrm>
+            <a:off x="2186274" y="5771705"/>
+            <a:ext cx="4771452" cy="830997"/>
+          </a:xfrm>
+          <a:prstGeom prst="rect">
+            <a:avLst/>
+          </a:prstGeom>
+        </p:spPr>
+        <p:txBody>
+          <a:bodyPr wrap="square">
+            <a:spAutoFit/>
+          </a:bodyPr>
+          <a:lstStyle/>
+          <a:p>
+            <a:pPr algn="ctr"/>
+            <a:r>
+              <a:rPr lang="en-US" sz="2400" dirty="0" err="1" smtClean="0"/>
+              <a:t>Foto</a:t>
+            </a:r>
+            <a:r>
+              <a:rPr lang="en-US" sz="2400" dirty="0" smtClean="0"/>
+              <a:t> </a:t>
+            </a:r>
+            <a:r>
+              <a:rPr lang="en-US" sz="2400" dirty="0" err="1" smtClean="0"/>
+              <a:t>scattata</a:t>
+            </a:r>
+            <a:r>
+              <a:rPr lang="en-US" sz="2400" dirty="0" smtClean="0"/>
+              <a:t> </a:t>
+            </a:r>
+            <a:r>
+              <a:rPr lang="en-US" sz="2400" dirty="0" err="1" smtClean="0"/>
+              <a:t>durante</a:t>
+            </a:r>
+            <a:r>
+              <a:rPr lang="en-US" sz="2400" dirty="0" smtClean="0"/>
+              <a:t> </a:t>
+            </a:r>
+            <a:r>
+              <a:rPr lang="en-US" sz="2400" dirty="0" err="1" smtClean="0"/>
+              <a:t>l’</a:t>
+            </a:r>
+            <a:r>
+              <a:rPr lang="en-US" sz="2400" dirty="0" err="1" smtClean="0"/>
+              <a:t>Arduino</a:t>
+            </a:r>
+            <a:r>
+              <a:rPr lang="en-US" sz="2400" dirty="0" smtClean="0"/>
+              <a:t> </a:t>
+            </a:r>
+            <a:r>
+              <a:rPr lang="en-US" sz="2400" dirty="0" smtClean="0"/>
+              <a:t>Day (16/05/2019)</a:t>
+            </a:r>
+            <a:endParaRPr lang="en-US" sz="2400" dirty="0"/>
+          </a:p>
+        </p:txBody>
+      </p:sp>
+    </p:spTree>
+    <p:extLst>
+      <p:ext uri="{BB962C8B-B14F-4D97-AF65-F5344CB8AC3E}">
+        <p14:creationId xmlns:p14="http://schemas.microsoft.com/office/powerpoint/2010/main" val="2809307754"/>
+      </p:ext>
+    </p:extLst>
+  </p:cSld>
+  <p:clrMapOvr>
+    <a:masterClrMapping/>
+  </p:clrMapOvr>
+</p:sld>
+</file>
+
+<file path=ppt/slides/slide11.xml><?xml version="1.0" encoding="utf-8"?>
+<p:sld xmlns:a="http://schemas.openxmlformats.org/drawingml/2006/main" xmlns:r="http://schemas.openxmlformats.org/officeDocument/2006/relationships" xmlns:p="http://schemas.openxmlformats.org/presentationml/2006/main">
+  <p:cSld>
+    <p:spTree>
+      <p:nvGrpSpPr>
+        <p:cNvPr id="1" name=""/>
+        <p:cNvGrpSpPr/>
+        <p:nvPr/>
+      </p:nvGrpSpPr>
+      <p:grpSpPr>
+        <a:xfrm>
+          <a:off x="0" y="0"/>
+          <a:ext cx="0" cy="0"/>
+          <a:chOff x="0" y="0"/>
+          <a:chExt cx="0" cy="0"/>
+        </a:xfrm>
+      </p:grpSpPr>
+      <p:sp>
+        <p:nvSpPr>
+          <p:cNvPr id="3" name="Substituent conținut 2"/>
+          <p:cNvSpPr>
+            <a:spLocks noGrp="1"/>
+          </p:cNvSpPr>
+          <p:nvPr>
+            <p:ph idx="1"/>
+          </p:nvPr>
+        </p:nvSpPr>
+        <p:spPr>
+          <a:xfrm>
+            <a:off x="457200" y="2929735"/>
+            <a:ext cx="8229600" cy="1190555"/>
+          </a:xfrm>
+        </p:spPr>
+        <p:txBody>
+          <a:bodyPr>
+            <a:normAutofit/>
+          </a:bodyPr>
+          <a:lstStyle/>
+          <a:p>
+            <a:pPr marL="0" indent="0" algn="ctr">
+              <a:buNone/>
+            </a:pPr>
+            <a:r>
+              <a:rPr lang="en-US" sz="5400" dirty="0" smtClean="0"/>
+              <a:t>Grazie per </a:t>
+            </a:r>
+            <a:r>
+              <a:rPr lang="en-US" sz="5400" dirty="0" err="1" smtClean="0"/>
+              <a:t>l’attenzione</a:t>
+            </a:r>
+            <a:endParaRPr lang="en-US" sz="5400" dirty="0"/>
+          </a:p>
+        </p:txBody>
+      </p:sp>
+    </p:spTree>
+    <p:extLst>
+      <p:ext uri="{BB962C8B-B14F-4D97-AF65-F5344CB8AC3E}">
+        <p14:creationId xmlns:p14="http://schemas.microsoft.com/office/powerpoint/2010/main" val="2325906746"/>
+      </p:ext>
+    </p:extLst>
+  </p:cSld>
+  <p:clrMapOvr>
+    <a:masterClrMapping/>
+  </p:clrMapOvr>
+</p:sld>
+</file>
+
 <file path=ppt/slides/slide2.xml><?xml version="1.0" encoding="utf-8"?>
 <p:sld xmlns:a="http://schemas.openxmlformats.org/drawingml/2006/main" xmlns:r="http://schemas.openxmlformats.org/officeDocument/2006/relationships" xmlns:p="http://schemas.openxmlformats.org/presentationml/2006/main">
   <p:cSld>
@@ -3319,7 +3596,12 @@
             <p:ph type="title"/>
           </p:nvPr>
         </p:nvSpPr>
-        <p:spPr/>
+        <p:spPr>
+          <a:xfrm>
+            <a:off x="457200" y="228600"/>
+            <a:ext cx="8229600" cy="1143000"/>
+          </a:xfrm>
+        </p:spPr>
         <p:txBody>
           <a:bodyPr>
             <a:normAutofit/>
@@ -3345,14 +3627,118 @@
             <p:ph idx="1"/>
           </p:nvPr>
         </p:nvSpPr>
-        <p:spPr/>
-        <p:txBody>
-          <a:bodyPr/>
-          <a:lstStyle/>
-          <a:p>
-            <a:r>
-              <a:rPr lang="en-US" dirty="0" smtClean="0"/>
-              <a:t>…</a:t>
+        <p:spPr>
+          <a:xfrm>
+            <a:off x="533400" y="1600200"/>
+            <a:ext cx="8229600" cy="4525963"/>
+          </a:xfrm>
+        </p:spPr>
+        <p:txBody>
+          <a:bodyPr>
+            <a:normAutofit fontScale="92500" lnSpcReduction="20000"/>
+          </a:bodyPr>
+          <a:lstStyle/>
+          <a:p>
+            <a:r>
+              <a:rPr lang="en-US" dirty="0" err="1" smtClean="0"/>
+              <a:t>Scopo</a:t>
+            </a:r>
+            <a:r>
+              <a:rPr lang="en-US" dirty="0" smtClean="0"/>
+              <a:t> e </a:t>
+            </a:r>
+            <a:r>
+              <a:rPr lang="en-US" dirty="0" err="1" smtClean="0"/>
+              <a:t>requisiti</a:t>
+            </a:r>
+            <a:r>
+              <a:rPr lang="en-US" dirty="0" smtClean="0"/>
+              <a:t> del </a:t>
+            </a:r>
+            <a:r>
+              <a:rPr lang="en-US" dirty="0" err="1" smtClean="0"/>
+              <a:t>progetto</a:t>
+            </a:r>
+            <a:endParaRPr lang="en-US" dirty="0" smtClean="0"/>
+          </a:p>
+          <a:p>
+            <a:endParaRPr lang="en-US" dirty="0" smtClean="0"/>
+          </a:p>
+          <a:p>
+            <a:r>
+              <a:rPr lang="en-US" dirty="0" err="1" smtClean="0"/>
+              <a:t>Sviluppo</a:t>
+            </a:r>
+            <a:r>
+              <a:rPr lang="en-US" dirty="0" smtClean="0"/>
+              <a:t> del </a:t>
+            </a:r>
+            <a:r>
+              <a:rPr lang="en-US" dirty="0" err="1" smtClean="0"/>
+              <a:t>sistema</a:t>
+            </a:r>
+            <a:r>
+              <a:rPr lang="en-US" dirty="0" smtClean="0"/>
+              <a:t> embedded </a:t>
+            </a:r>
+          </a:p>
+          <a:p>
+            <a:endParaRPr lang="en-US" dirty="0" smtClean="0"/>
+          </a:p>
+          <a:p>
+            <a:r>
+              <a:rPr lang="en-US" dirty="0" err="1" smtClean="0"/>
+              <a:t>Sviluppo</a:t>
+            </a:r>
+            <a:r>
+              <a:rPr lang="en-US" dirty="0" smtClean="0"/>
+              <a:t> del </a:t>
+            </a:r>
+            <a:r>
+              <a:rPr lang="en-US" dirty="0" err="1" smtClean="0"/>
+              <a:t>sito</a:t>
+            </a:r>
+            <a:r>
+              <a:rPr lang="en-US" dirty="0" smtClean="0"/>
+              <a:t> web </a:t>
+            </a:r>
+          </a:p>
+          <a:p>
+            <a:endParaRPr lang="en-US" dirty="0" smtClean="0"/>
+          </a:p>
+          <a:p>
+            <a:r>
+              <a:rPr lang="en-US" dirty="0" err="1" smtClean="0"/>
+              <a:t>Problemi</a:t>
+            </a:r>
+            <a:r>
+              <a:rPr lang="en-US" dirty="0" smtClean="0"/>
+              <a:t> </a:t>
+            </a:r>
+            <a:r>
+              <a:rPr lang="en-US" dirty="0" err="1" smtClean="0"/>
+              <a:t>affrontati</a:t>
+            </a:r>
+            <a:r>
+              <a:rPr lang="en-US" dirty="0" smtClean="0"/>
+              <a:t> </a:t>
+            </a:r>
+          </a:p>
+          <a:p>
+            <a:endParaRPr lang="en-US" dirty="0" smtClean="0"/>
+          </a:p>
+          <a:p>
+            <a:r>
+              <a:rPr lang="en-US" dirty="0" err="1" smtClean="0"/>
+              <a:t>Eventuali</a:t>
+            </a:r>
+            <a:r>
+              <a:rPr lang="en-US" dirty="0" smtClean="0"/>
+              <a:t> </a:t>
+            </a:r>
+            <a:r>
+              <a:rPr lang="en-US" dirty="0" err="1" smtClean="0"/>
+              <a:t>miglioramenti</a:t>
             </a:r>
             <a:endParaRPr lang="en-US" dirty="0"/>
           </a:p>
@@ -3362,6 +3748,1256 @@
     <p:extLst>
       <p:ext uri="{BB962C8B-B14F-4D97-AF65-F5344CB8AC3E}">
         <p14:creationId xmlns:p14="http://schemas.microsoft.com/office/powerpoint/2010/main" val="784689500"/>
+      </p:ext>
+    </p:extLst>
+  </p:cSld>
+  <p:clrMapOvr>
+    <a:masterClrMapping/>
+  </p:clrMapOvr>
+</p:sld>
+</file>
+
+<file path=ppt/slides/slide3.xml><?xml version="1.0" encoding="utf-8"?>
+<p:sld xmlns:a="http://schemas.openxmlformats.org/drawingml/2006/main" xmlns:r="http://schemas.openxmlformats.org/officeDocument/2006/relationships" xmlns:p="http://schemas.openxmlformats.org/presentationml/2006/main">
+  <p:cSld>
+    <p:spTree>
+      <p:nvGrpSpPr>
+        <p:cNvPr id="1" name=""/>
+        <p:cNvGrpSpPr/>
+        <p:nvPr/>
+      </p:nvGrpSpPr>
+      <p:grpSpPr>
+        <a:xfrm>
+          <a:off x="0" y="0"/>
+          <a:ext cx="0" cy="0"/>
+          <a:chOff x="0" y="0"/>
+          <a:chExt cx="0" cy="0"/>
+        </a:xfrm>
+      </p:grpSpPr>
+      <p:pic>
+        <p:nvPicPr>
+          <p:cNvPr id="1026" name="Picture 2" descr="C:\Users\Jolsty\Desktop\SimSimGit\SimSim\Tesi_Sistema_Accessi_IoT_Andrei_Ciulpan_872394\img\usecase.png"/>
+          <p:cNvPicPr>
+            <a:picLocks noChangeAspect="1" noChangeArrowheads="1"/>
+          </p:cNvPicPr>
+          <p:nvPr/>
+        </p:nvPicPr>
+        <p:blipFill>
+          <a:blip r:embed="rId2">
+            <a:extLst>
+              <a:ext uri="{28A0092B-C50C-407E-A947-70E740481C1C}">
+                <a14:useLocalDpi xmlns:a14="http://schemas.microsoft.com/office/drawing/2010/main" val="0"/>
+              </a:ext>
+            </a:extLst>
+          </a:blip>
+          <a:srcRect/>
+          <a:stretch>
+            <a:fillRect/>
+          </a:stretch>
+        </p:blipFill>
+        <p:spPr bwMode="auto">
+          <a:xfrm>
+            <a:off x="142707" y="0"/>
+            <a:ext cx="8991600" cy="6705600"/>
+          </a:xfrm>
+          <a:prstGeom prst="rect">
+            <a:avLst/>
+          </a:prstGeom>
+          <a:noFill/>
+          <a:extLst>
+            <a:ext uri="{909E8E84-426E-40DD-AFC4-6F175D3DCCD1}">
+              <a14:hiddenFill xmlns:a14="http://schemas.microsoft.com/office/drawing/2010/main">
+                <a:solidFill>
+                  <a:srgbClr val="FFFFFF"/>
+                </a:solidFill>
+              </a14:hiddenFill>
+            </a:ext>
+          </a:extLst>
+        </p:spPr>
+      </p:pic>
+    </p:spTree>
+    <p:extLst>
+      <p:ext uri="{BB962C8B-B14F-4D97-AF65-F5344CB8AC3E}">
+        <p14:creationId xmlns:p14="http://schemas.microsoft.com/office/powerpoint/2010/main" val="436630627"/>
+      </p:ext>
+    </p:extLst>
+  </p:cSld>
+  <p:clrMapOvr>
+    <a:masterClrMapping/>
+  </p:clrMapOvr>
+</p:sld>
+</file>
+
+<file path=ppt/slides/slide4.xml><?xml version="1.0" encoding="utf-8"?>
+<p:sld xmlns:a="http://schemas.openxmlformats.org/drawingml/2006/main" xmlns:r="http://schemas.openxmlformats.org/officeDocument/2006/relationships" xmlns:p="http://schemas.openxmlformats.org/presentationml/2006/main">
+  <p:cSld>
+    <p:spTree>
+      <p:nvGrpSpPr>
+        <p:cNvPr id="1" name=""/>
+        <p:cNvGrpSpPr/>
+        <p:nvPr/>
+      </p:nvGrpSpPr>
+      <p:grpSpPr>
+        <a:xfrm>
+          <a:off x="0" y="0"/>
+          <a:ext cx="0" cy="0"/>
+          <a:chOff x="0" y="0"/>
+          <a:chExt cx="0" cy="0"/>
+        </a:xfrm>
+      </p:grpSpPr>
+      <p:sp>
+        <p:nvSpPr>
+          <p:cNvPr id="2" name="Titlu 1"/>
+          <p:cNvSpPr>
+            <a:spLocks noGrp="1"/>
+          </p:cNvSpPr>
+          <p:nvPr>
+            <p:ph type="title"/>
+          </p:nvPr>
+        </p:nvSpPr>
+        <p:spPr/>
+        <p:txBody>
+          <a:bodyPr/>
+          <a:lstStyle/>
+          <a:p>
+            <a:r>
+              <a:rPr lang="en-US" dirty="0" err="1" smtClean="0"/>
+              <a:t>Sviluppo</a:t>
+            </a:r>
+            <a:r>
+              <a:rPr lang="en-US" dirty="0" smtClean="0"/>
+              <a:t> del </a:t>
+            </a:r>
+            <a:r>
+              <a:rPr lang="en-US" dirty="0" err="1" smtClean="0"/>
+              <a:t>sistema</a:t>
+            </a:r>
+            <a:r>
+              <a:rPr lang="en-US" dirty="0" smtClean="0"/>
+              <a:t> embedded</a:t>
+            </a:r>
+            <a:endParaRPr lang="en-US" dirty="0"/>
+          </a:p>
+        </p:txBody>
+      </p:sp>
+      <p:sp>
+        <p:nvSpPr>
+          <p:cNvPr id="3" name="Substituent conținut 2"/>
+          <p:cNvSpPr>
+            <a:spLocks noGrp="1"/>
+          </p:cNvSpPr>
+          <p:nvPr>
+            <p:ph idx="1"/>
+          </p:nvPr>
+        </p:nvSpPr>
+        <p:spPr/>
+        <p:txBody>
+          <a:bodyPr>
+            <a:normAutofit fontScale="85000" lnSpcReduction="20000"/>
+          </a:bodyPr>
+          <a:lstStyle/>
+          <a:p>
+            <a:pPr marL="0" indent="0">
+              <a:buNone/>
+            </a:pPr>
+            <a:r>
+              <a:rPr lang="en-US" dirty="0" err="1" smtClean="0"/>
+              <a:t>Linguaggio</a:t>
+            </a:r>
+            <a:r>
+              <a:rPr lang="en-US" dirty="0" smtClean="0"/>
+              <a:t>: </a:t>
+            </a:r>
+            <a:r>
+              <a:rPr lang="en-US" dirty="0" err="1" smtClean="0"/>
+              <a:t>Arduino</a:t>
+            </a:r>
+            <a:r>
+              <a:rPr lang="en-US" dirty="0" smtClean="0"/>
+              <a:t> Programming Language</a:t>
+            </a:r>
+          </a:p>
+          <a:p>
+            <a:pPr marL="0" indent="0">
+              <a:buNone/>
+            </a:pPr>
+            <a:endParaRPr lang="en-US" dirty="0" smtClean="0"/>
+          </a:p>
+          <a:p>
+            <a:r>
+              <a:rPr lang="en-US" dirty="0" smtClean="0"/>
+              <a:t>Raspberry Pi: server hosting</a:t>
+            </a:r>
+          </a:p>
+          <a:p>
+            <a:r>
+              <a:rPr lang="en-US" dirty="0" err="1" smtClean="0"/>
+              <a:t>Arduino</a:t>
+            </a:r>
+            <a:r>
+              <a:rPr lang="en-US" dirty="0" smtClean="0"/>
+              <a:t> UNO: MCU</a:t>
+            </a:r>
+          </a:p>
+          <a:p>
+            <a:r>
+              <a:rPr lang="en-US" dirty="0" err="1" smtClean="0"/>
+              <a:t>Ricevitore</a:t>
+            </a:r>
+            <a:r>
+              <a:rPr lang="en-US" dirty="0" smtClean="0"/>
+              <a:t> RF: </a:t>
+            </a:r>
+            <a:r>
+              <a:rPr lang="en-US" dirty="0" err="1" smtClean="0"/>
+              <a:t>telecomando</a:t>
+            </a:r>
+            <a:endParaRPr lang="en-US" dirty="0" smtClean="0"/>
+          </a:p>
+          <a:p>
+            <a:r>
+              <a:rPr lang="en-US" dirty="0" smtClean="0"/>
+              <a:t>RFID: tag</a:t>
+            </a:r>
+          </a:p>
+          <a:p>
+            <a:r>
+              <a:rPr lang="en-US" dirty="0" smtClean="0"/>
+              <a:t>Keypad 4x4: password</a:t>
+            </a:r>
+          </a:p>
+          <a:p>
+            <a:r>
+              <a:rPr lang="en-US" dirty="0" smtClean="0"/>
+              <a:t>LCD 16x2: display</a:t>
+            </a:r>
+          </a:p>
+          <a:p>
+            <a:r>
+              <a:rPr lang="en-US" dirty="0" err="1" smtClean="0"/>
+              <a:t>Servomotore</a:t>
+            </a:r>
+            <a:r>
+              <a:rPr lang="en-US" dirty="0" smtClean="0"/>
+              <a:t>: </a:t>
+            </a:r>
+            <a:r>
+              <a:rPr lang="en-US" dirty="0" err="1" smtClean="0"/>
+              <a:t>attuatore</a:t>
+            </a:r>
+            <a:endParaRPr lang="en-US" dirty="0" smtClean="0"/>
+          </a:p>
+          <a:p>
+            <a:r>
+              <a:rPr lang="en-US" dirty="0" smtClean="0"/>
+              <a:t>ESP8266: </a:t>
+            </a:r>
+            <a:r>
+              <a:rPr lang="en-US" dirty="0" err="1" smtClean="0"/>
+              <a:t>WiFi</a:t>
+            </a:r>
+            <a:endParaRPr lang="en-US" dirty="0" smtClean="0"/>
+          </a:p>
+        </p:txBody>
+      </p:sp>
+    </p:spTree>
+    <p:extLst>
+      <p:ext uri="{BB962C8B-B14F-4D97-AF65-F5344CB8AC3E}">
+        <p14:creationId xmlns:p14="http://schemas.microsoft.com/office/powerpoint/2010/main" val="1969105805"/>
+      </p:ext>
+    </p:extLst>
+  </p:cSld>
+  <p:clrMapOvr>
+    <a:masterClrMapping/>
+  </p:clrMapOvr>
+</p:sld>
+</file>
+
+<file path=ppt/slides/slide5.xml><?xml version="1.0" encoding="utf-8"?>
+<p:sld xmlns:a="http://schemas.openxmlformats.org/drawingml/2006/main" xmlns:r="http://schemas.openxmlformats.org/officeDocument/2006/relationships" xmlns:p="http://schemas.openxmlformats.org/presentationml/2006/main">
+  <p:cSld>
+    <p:spTree>
+      <p:nvGrpSpPr>
+        <p:cNvPr id="1" name=""/>
+        <p:cNvGrpSpPr/>
+        <p:nvPr/>
+      </p:nvGrpSpPr>
+      <p:grpSpPr>
+        <a:xfrm>
+          <a:off x="0" y="0"/>
+          <a:ext cx="0" cy="0"/>
+          <a:chOff x="0" y="0"/>
+          <a:chExt cx="0" cy="0"/>
+        </a:xfrm>
+      </p:grpSpPr>
+      <p:sp>
+        <p:nvSpPr>
+          <p:cNvPr id="2" name="Titlu 1"/>
+          <p:cNvSpPr>
+            <a:spLocks noGrp="1"/>
+          </p:cNvSpPr>
+          <p:nvPr>
+            <p:ph type="title"/>
+          </p:nvPr>
+        </p:nvSpPr>
+        <p:spPr/>
+        <p:txBody>
+          <a:bodyPr/>
+          <a:lstStyle/>
+          <a:p>
+            <a:r>
+              <a:rPr lang="en-US" dirty="0" err="1"/>
+              <a:t>Sviluppo</a:t>
+            </a:r>
+            <a:r>
+              <a:rPr lang="en-US" dirty="0"/>
+              <a:t> del </a:t>
+            </a:r>
+            <a:r>
+              <a:rPr lang="en-US" dirty="0" err="1"/>
+              <a:t>sito</a:t>
+            </a:r>
+            <a:r>
+              <a:rPr lang="en-US" dirty="0"/>
+              <a:t> web</a:t>
+            </a:r>
+          </a:p>
+        </p:txBody>
+      </p:sp>
+      <p:sp>
+        <p:nvSpPr>
+          <p:cNvPr id="3" name="Substituent conținut 2"/>
+          <p:cNvSpPr>
+            <a:spLocks noGrp="1"/>
+          </p:cNvSpPr>
+          <p:nvPr>
+            <p:ph idx="1"/>
+          </p:nvPr>
+        </p:nvSpPr>
+        <p:spPr>
+          <a:xfrm>
+            <a:off x="1077145" y="3150200"/>
+            <a:ext cx="2732220" cy="676649"/>
+          </a:xfrm>
+        </p:spPr>
+        <p:txBody>
+          <a:bodyPr/>
+          <a:lstStyle/>
+          <a:p>
+            <a:r>
+              <a:rPr lang="en-US" dirty="0" smtClean="0"/>
+              <a:t>MVC pattern</a:t>
+            </a:r>
+            <a:endParaRPr lang="en-US" dirty="0"/>
+          </a:p>
+        </p:txBody>
+      </p:sp>
+      <p:pic>
+        <p:nvPicPr>
+          <p:cNvPr id="4" name="Picture 3" descr="C:\Users\Jolsty\Desktop\SimSimGit\SimSim\Tesi_Sistema_Accessi_IoT_Andrei_Ciulpan_872394\img\mvc.png"/>
+          <p:cNvPicPr>
+            <a:picLocks noChangeAspect="1" noChangeArrowheads="1"/>
+          </p:cNvPicPr>
+          <p:nvPr/>
+        </p:nvPicPr>
+        <p:blipFill>
+          <a:blip r:embed="rId2">
+            <a:extLst>
+              <a:ext uri="{28A0092B-C50C-407E-A947-70E740481C1C}">
+                <a14:useLocalDpi xmlns:a14="http://schemas.microsoft.com/office/drawing/2010/main" val="0"/>
+              </a:ext>
+            </a:extLst>
+          </a:blip>
+          <a:srcRect/>
+          <a:stretch>
+            <a:fillRect/>
+          </a:stretch>
+        </p:blipFill>
+        <p:spPr bwMode="auto">
+          <a:xfrm>
+            <a:off x="4379975" y="1409773"/>
+            <a:ext cx="4419797" cy="4834153"/>
+          </a:xfrm>
+          <a:prstGeom prst="rect">
+            <a:avLst/>
+          </a:prstGeom>
+          <a:noFill/>
+          <a:extLst>
+            <a:ext uri="{909E8E84-426E-40DD-AFC4-6F175D3DCCD1}">
+              <a14:hiddenFill xmlns:a14="http://schemas.microsoft.com/office/drawing/2010/main">
+                <a:solidFill>
+                  <a:srgbClr val="FFFFFF"/>
+                </a:solidFill>
+              </a14:hiddenFill>
+            </a:ext>
+          </a:extLst>
+        </p:spPr>
+      </p:pic>
+    </p:spTree>
+    <p:extLst>
+      <p:ext uri="{BB962C8B-B14F-4D97-AF65-F5344CB8AC3E}">
+        <p14:creationId xmlns:p14="http://schemas.microsoft.com/office/powerpoint/2010/main" val="1719444841"/>
+      </p:ext>
+    </p:extLst>
+  </p:cSld>
+  <p:clrMapOvr>
+    <a:masterClrMapping/>
+  </p:clrMapOvr>
+</p:sld>
+</file>
+
+<file path=ppt/slides/slide6.xml><?xml version="1.0" encoding="utf-8"?>
+<p:sld xmlns:a="http://schemas.openxmlformats.org/drawingml/2006/main" xmlns:r="http://schemas.openxmlformats.org/officeDocument/2006/relationships" xmlns:p="http://schemas.openxmlformats.org/presentationml/2006/main">
+  <p:cSld>
+    <p:spTree>
+      <p:nvGrpSpPr>
+        <p:cNvPr id="1" name=""/>
+        <p:cNvGrpSpPr/>
+        <p:nvPr/>
+      </p:nvGrpSpPr>
+      <p:grpSpPr>
+        <a:xfrm>
+          <a:off x="0" y="0"/>
+          <a:ext cx="0" cy="0"/>
+          <a:chOff x="0" y="0"/>
+          <a:chExt cx="0" cy="0"/>
+        </a:xfrm>
+      </p:grpSpPr>
+      <p:sp>
+        <p:nvSpPr>
+          <p:cNvPr id="2" name="Titlu 1"/>
+          <p:cNvSpPr>
+            <a:spLocks noGrp="1"/>
+          </p:cNvSpPr>
+          <p:nvPr>
+            <p:ph type="title"/>
+          </p:nvPr>
+        </p:nvSpPr>
+        <p:spPr/>
+        <p:txBody>
+          <a:bodyPr/>
+          <a:lstStyle/>
+          <a:p>
+            <a:r>
+              <a:rPr lang="en-US" dirty="0" err="1" smtClean="0"/>
+              <a:t>Sviluppo</a:t>
+            </a:r>
+            <a:r>
+              <a:rPr lang="en-US" dirty="0" smtClean="0"/>
+              <a:t> del </a:t>
+            </a:r>
+            <a:r>
+              <a:rPr lang="en-US" dirty="0" err="1" smtClean="0"/>
+              <a:t>sito</a:t>
+            </a:r>
+            <a:r>
+              <a:rPr lang="en-US" dirty="0" smtClean="0"/>
+              <a:t> web</a:t>
+            </a:r>
+            <a:endParaRPr lang="en-US" dirty="0"/>
+          </a:p>
+        </p:txBody>
+      </p:sp>
+      <p:sp>
+        <p:nvSpPr>
+          <p:cNvPr id="3" name="Substituent conținut 2"/>
+          <p:cNvSpPr>
+            <a:spLocks noGrp="1"/>
+          </p:cNvSpPr>
+          <p:nvPr>
+            <p:ph idx="1"/>
+          </p:nvPr>
+        </p:nvSpPr>
+        <p:spPr>
+          <a:xfrm>
+            <a:off x="769905" y="1600201"/>
+            <a:ext cx="7681000" cy="4478744"/>
+          </a:xfrm>
+        </p:spPr>
+        <p:txBody>
+          <a:bodyPr>
+            <a:normAutofit/>
+          </a:bodyPr>
+          <a:lstStyle/>
+          <a:p>
+            <a:pPr marL="0" indent="0">
+              <a:buNone/>
+            </a:pPr>
+            <a:r>
+              <a:rPr lang="en-US" dirty="0" smtClean="0"/>
+              <a:t>Back-End: JavaScript</a:t>
+            </a:r>
+          </a:p>
+          <a:p>
+            <a:pPr marL="0" indent="0">
+              <a:buNone/>
+            </a:pPr>
+            <a:endParaRPr lang="en-US" dirty="0"/>
+          </a:p>
+          <a:p>
+            <a:r>
+              <a:rPr lang="en-US" dirty="0" smtClean="0"/>
+              <a:t>Node.js</a:t>
+            </a:r>
+            <a:endParaRPr lang="en-US" dirty="0"/>
+          </a:p>
+          <a:p>
+            <a:r>
+              <a:rPr lang="en-US" dirty="0" err="1"/>
+              <a:t>MongoDB</a:t>
+            </a:r>
+            <a:endParaRPr lang="en-US" dirty="0"/>
+          </a:p>
+          <a:p>
+            <a:r>
+              <a:rPr lang="en-US" dirty="0" err="1" smtClean="0"/>
+              <a:t>RESTful</a:t>
+            </a:r>
+            <a:endParaRPr lang="en-US" dirty="0" smtClean="0"/>
+          </a:p>
+          <a:p>
+            <a:pPr marL="0" indent="0">
+              <a:buNone/>
+            </a:pPr>
+            <a:r>
+              <a:rPr lang="en-US" dirty="0" smtClean="0"/>
+              <a:t>		</a:t>
+            </a:r>
+          </a:p>
+        </p:txBody>
+      </p:sp>
+    </p:spTree>
+    <p:extLst>
+      <p:ext uri="{BB962C8B-B14F-4D97-AF65-F5344CB8AC3E}">
+        <p14:creationId xmlns:p14="http://schemas.microsoft.com/office/powerpoint/2010/main" val="471692749"/>
+      </p:ext>
+    </p:extLst>
+  </p:cSld>
+  <p:clrMapOvr>
+    <a:masterClrMapping/>
+  </p:clrMapOvr>
+</p:sld>
+</file>
+
+<file path=ppt/slides/slide7.xml><?xml version="1.0" encoding="utf-8"?>
+<p:sld xmlns:a="http://schemas.openxmlformats.org/drawingml/2006/main" xmlns:r="http://schemas.openxmlformats.org/officeDocument/2006/relationships" xmlns:p="http://schemas.openxmlformats.org/presentationml/2006/main">
+  <p:cSld>
+    <p:spTree>
+      <p:nvGrpSpPr>
+        <p:cNvPr id="1" name=""/>
+        <p:cNvGrpSpPr/>
+        <p:nvPr/>
+      </p:nvGrpSpPr>
+      <p:grpSpPr>
+        <a:xfrm>
+          <a:off x="0" y="0"/>
+          <a:ext cx="0" cy="0"/>
+          <a:chOff x="0" y="0"/>
+          <a:chExt cx="0" cy="0"/>
+        </a:xfrm>
+      </p:grpSpPr>
+      <p:sp>
+        <p:nvSpPr>
+          <p:cNvPr id="2" name="Titlu 1"/>
+          <p:cNvSpPr>
+            <a:spLocks noGrp="1"/>
+          </p:cNvSpPr>
+          <p:nvPr>
+            <p:ph type="title"/>
+          </p:nvPr>
+        </p:nvSpPr>
+        <p:spPr/>
+        <p:txBody>
+          <a:bodyPr/>
+          <a:lstStyle/>
+          <a:p>
+            <a:r>
+              <a:rPr lang="en-US" dirty="0" err="1" smtClean="0"/>
+              <a:t>Sviluppo</a:t>
+            </a:r>
+            <a:r>
+              <a:rPr lang="en-US" dirty="0" smtClean="0"/>
+              <a:t> del </a:t>
+            </a:r>
+            <a:r>
+              <a:rPr lang="en-US" dirty="0" err="1" smtClean="0"/>
+              <a:t>sito</a:t>
+            </a:r>
+            <a:r>
+              <a:rPr lang="en-US" dirty="0" smtClean="0"/>
+              <a:t> web</a:t>
+            </a:r>
+            <a:endParaRPr lang="en-US" dirty="0"/>
+          </a:p>
+        </p:txBody>
+      </p:sp>
+      <p:sp>
+        <p:nvSpPr>
+          <p:cNvPr id="4" name="Substituent conținut 2"/>
+          <p:cNvSpPr txBox="1">
+            <a:spLocks noGrp="1"/>
+          </p:cNvSpPr>
+          <p:nvPr>
+            <p:ph idx="1"/>
+          </p:nvPr>
+        </p:nvSpPr>
+        <p:spPr>
+          <a:prstGeom prst="rect">
+            <a:avLst/>
+          </a:prstGeom>
+        </p:spPr>
+        <p:txBody>
+          <a:bodyPr vert="horz" lIns="91440" tIns="45720" rIns="91440" bIns="45720" rtlCol="0">
+            <a:normAutofit/>
+          </a:bodyPr>
+          <a:lstStyle>
+            <a:lvl1pPr marL="342900" indent="-342900" algn="l" defTabSz="914400" rtl="0" eaLnBrk="1" latinLnBrk="0" hangingPunct="1">
+              <a:spcBef>
+                <a:spcPct val="20000"/>
+              </a:spcBef>
+              <a:buFont typeface="Arial" pitchFamily="34" charset="0"/>
+              <a:buChar char="•"/>
+              <a:defRPr sz="3200" kern="1200">
+                <a:solidFill>
+                  <a:schemeClr val="tx1"/>
+                </a:solidFill>
+                <a:latin typeface="+mn-lt"/>
+                <a:ea typeface="+mn-ea"/>
+                <a:cs typeface="+mn-cs"/>
+              </a:defRPr>
+            </a:lvl1pPr>
+            <a:lvl2pPr marL="742950" indent="-285750" algn="l" defTabSz="914400" rtl="0" eaLnBrk="1" latinLnBrk="0" hangingPunct="1">
+              <a:spcBef>
+                <a:spcPct val="20000"/>
+              </a:spcBef>
+              <a:buFont typeface="Arial" pitchFamily="34" charset="0"/>
+              <a:buChar char="–"/>
+              <a:defRPr sz="2800" kern="1200">
+                <a:solidFill>
+                  <a:schemeClr val="tx1"/>
+                </a:solidFill>
+                <a:latin typeface="+mn-lt"/>
+                <a:ea typeface="+mn-ea"/>
+                <a:cs typeface="+mn-cs"/>
+              </a:defRPr>
+            </a:lvl2pPr>
+            <a:lvl3pPr marL="1143000" indent="-228600" algn="l" defTabSz="914400" rtl="0" eaLnBrk="1" latinLnBrk="0" hangingPunct="1">
+              <a:spcBef>
+                <a:spcPct val="20000"/>
+              </a:spcBef>
+              <a:buFont typeface="Arial" pitchFamily="34" charset="0"/>
+              <a:buChar char="•"/>
+              <a:defRPr sz="2400" kern="1200">
+                <a:solidFill>
+                  <a:schemeClr val="tx1"/>
+                </a:solidFill>
+                <a:latin typeface="+mn-lt"/>
+                <a:ea typeface="+mn-ea"/>
+                <a:cs typeface="+mn-cs"/>
+              </a:defRPr>
+            </a:lvl3pPr>
+            <a:lvl4pPr marL="1600200" indent="-228600" algn="l" defTabSz="914400" rtl="0" eaLnBrk="1" latinLnBrk="0" hangingPunct="1">
+              <a:spcBef>
+                <a:spcPct val="20000"/>
+              </a:spcBef>
+              <a:buFont typeface="Arial" pitchFamily="34" charset="0"/>
+              <a:buChar char="–"/>
+              <a:defRPr sz="2000" kern="1200">
+                <a:solidFill>
+                  <a:schemeClr val="tx1"/>
+                </a:solidFill>
+                <a:latin typeface="+mn-lt"/>
+                <a:ea typeface="+mn-ea"/>
+                <a:cs typeface="+mn-cs"/>
+              </a:defRPr>
+            </a:lvl4pPr>
+            <a:lvl5pPr marL="2057400" indent="-228600" algn="l" defTabSz="914400" rtl="0" eaLnBrk="1" latinLnBrk="0" hangingPunct="1">
+              <a:spcBef>
+                <a:spcPct val="20000"/>
+              </a:spcBef>
+              <a:buFont typeface="Arial" pitchFamily="34" charset="0"/>
+              <a:buChar char="»"/>
+              <a:defRPr sz="2000" kern="1200">
+                <a:solidFill>
+                  <a:schemeClr val="tx1"/>
+                </a:solidFill>
+                <a:latin typeface="+mn-lt"/>
+                <a:ea typeface="+mn-ea"/>
+                <a:cs typeface="+mn-cs"/>
+              </a:defRPr>
+            </a:lvl5pPr>
+            <a:lvl6pPr marL="2514600" indent="-228600" algn="l" defTabSz="914400" rtl="0" eaLnBrk="1" latinLnBrk="0" hangingPunct="1">
+              <a:spcBef>
+                <a:spcPct val="20000"/>
+              </a:spcBef>
+              <a:buFont typeface="Arial" pitchFamily="34" charset="0"/>
+              <a:buChar char="•"/>
+              <a:defRPr sz="2000" kern="1200">
+                <a:solidFill>
+                  <a:schemeClr val="tx1"/>
+                </a:solidFill>
+                <a:latin typeface="+mn-lt"/>
+                <a:ea typeface="+mn-ea"/>
+                <a:cs typeface="+mn-cs"/>
+              </a:defRPr>
+            </a:lvl6pPr>
+            <a:lvl7pPr marL="2971800" indent="-228600" algn="l" defTabSz="914400" rtl="0" eaLnBrk="1" latinLnBrk="0" hangingPunct="1">
+              <a:spcBef>
+                <a:spcPct val="20000"/>
+              </a:spcBef>
+              <a:buFont typeface="Arial" pitchFamily="34" charset="0"/>
+              <a:buChar char="•"/>
+              <a:defRPr sz="2000" kern="1200">
+                <a:solidFill>
+                  <a:schemeClr val="tx1"/>
+                </a:solidFill>
+                <a:latin typeface="+mn-lt"/>
+                <a:ea typeface="+mn-ea"/>
+                <a:cs typeface="+mn-cs"/>
+              </a:defRPr>
+            </a:lvl7pPr>
+            <a:lvl8pPr marL="3429000" indent="-228600" algn="l" defTabSz="914400" rtl="0" eaLnBrk="1" latinLnBrk="0" hangingPunct="1">
+              <a:spcBef>
+                <a:spcPct val="20000"/>
+              </a:spcBef>
+              <a:buFont typeface="Arial" pitchFamily="34" charset="0"/>
+              <a:buChar char="•"/>
+              <a:defRPr sz="2000" kern="1200">
+                <a:solidFill>
+                  <a:schemeClr val="tx1"/>
+                </a:solidFill>
+                <a:latin typeface="+mn-lt"/>
+                <a:ea typeface="+mn-ea"/>
+                <a:cs typeface="+mn-cs"/>
+              </a:defRPr>
+            </a:lvl8pPr>
+            <a:lvl9pPr marL="3886200" indent="-228600" algn="l" defTabSz="914400" rtl="0" eaLnBrk="1" latinLnBrk="0" hangingPunct="1">
+              <a:spcBef>
+                <a:spcPct val="20000"/>
+              </a:spcBef>
+              <a:buFont typeface="Arial" pitchFamily="34" charset="0"/>
+              <a:buChar char="•"/>
+              <a:defRPr sz="2000" kern="1200">
+                <a:solidFill>
+                  <a:schemeClr val="tx1"/>
+                </a:solidFill>
+                <a:latin typeface="+mn-lt"/>
+                <a:ea typeface="+mn-ea"/>
+                <a:cs typeface="+mn-cs"/>
+              </a:defRPr>
+            </a:lvl9pPr>
+          </a:lstStyle>
+          <a:p>
+            <a:pPr marL="0" indent="0">
+              <a:buNone/>
+            </a:pPr>
+            <a:r>
+              <a:rPr lang="en-US" dirty="0" smtClean="0"/>
+              <a:t>Front-End: HTML5 / CSS / JavaScript</a:t>
+            </a:r>
+          </a:p>
+          <a:p>
+            <a:pPr marL="0" indent="0">
+              <a:buNone/>
+            </a:pPr>
+            <a:endParaRPr lang="en-US" dirty="0" smtClean="0"/>
+          </a:p>
+          <a:p>
+            <a:r>
+              <a:rPr lang="en-US" dirty="0" smtClean="0"/>
+              <a:t>jQuery</a:t>
+            </a:r>
+            <a:endParaRPr lang="en-US" dirty="0"/>
+          </a:p>
+          <a:p>
+            <a:r>
+              <a:rPr lang="en-US" dirty="0"/>
+              <a:t>EJS</a:t>
+            </a:r>
+          </a:p>
+          <a:p>
+            <a:r>
+              <a:rPr lang="en-US" dirty="0"/>
+              <a:t>W3CSS </a:t>
+            </a:r>
+            <a:r>
+              <a:rPr lang="en-US" dirty="0" smtClean="0"/>
+              <a:t>	 			</a:t>
+            </a:r>
+          </a:p>
+        </p:txBody>
+      </p:sp>
+    </p:spTree>
+    <p:extLst>
+      <p:ext uri="{BB962C8B-B14F-4D97-AF65-F5344CB8AC3E}">
+        <p14:creationId xmlns:p14="http://schemas.microsoft.com/office/powerpoint/2010/main" val="2244204773"/>
+      </p:ext>
+    </p:extLst>
+  </p:cSld>
+  <p:clrMapOvr>
+    <a:masterClrMapping/>
+  </p:clrMapOvr>
+</p:sld>
+</file>
+
+<file path=ppt/slides/slide8.xml><?xml version="1.0" encoding="utf-8"?>
+<p:sld xmlns:a="http://schemas.openxmlformats.org/drawingml/2006/main" xmlns:r="http://schemas.openxmlformats.org/officeDocument/2006/relationships" xmlns:p="http://schemas.openxmlformats.org/presentationml/2006/main">
+  <p:cSld>
+    <p:spTree>
+      <p:nvGrpSpPr>
+        <p:cNvPr id="1" name=""/>
+        <p:cNvGrpSpPr/>
+        <p:nvPr/>
+      </p:nvGrpSpPr>
+      <p:grpSpPr>
+        <a:xfrm>
+          <a:off x="0" y="0"/>
+          <a:ext cx="0" cy="0"/>
+          <a:chOff x="0" y="0"/>
+          <a:chExt cx="0" cy="0"/>
+        </a:xfrm>
+      </p:grpSpPr>
+      <p:sp>
+        <p:nvSpPr>
+          <p:cNvPr id="2" name="Titlu 1"/>
+          <p:cNvSpPr>
+            <a:spLocks noGrp="1"/>
+          </p:cNvSpPr>
+          <p:nvPr>
+            <p:ph type="title"/>
+          </p:nvPr>
+        </p:nvSpPr>
+        <p:spPr/>
+        <p:txBody>
+          <a:bodyPr/>
+          <a:lstStyle/>
+          <a:p>
+            <a:r>
+              <a:rPr lang="en-US" dirty="0" err="1" smtClean="0"/>
+              <a:t>Problemi</a:t>
+            </a:r>
+            <a:r>
+              <a:rPr lang="en-US" dirty="0" smtClean="0"/>
+              <a:t> </a:t>
+            </a:r>
+            <a:r>
+              <a:rPr lang="en-US" dirty="0" err="1" smtClean="0"/>
+              <a:t>affrontati</a:t>
+            </a:r>
+            <a:endParaRPr lang="en-US" dirty="0"/>
+          </a:p>
+        </p:txBody>
+      </p:sp>
+      <p:sp>
+        <p:nvSpPr>
+          <p:cNvPr id="3" name="Substituent conținut 2"/>
+          <p:cNvSpPr>
+            <a:spLocks noGrp="1"/>
+          </p:cNvSpPr>
+          <p:nvPr>
+            <p:ph idx="1"/>
+          </p:nvPr>
+        </p:nvSpPr>
+        <p:spPr>
+          <a:xfrm>
+            <a:off x="457200" y="1854395"/>
+            <a:ext cx="8229600" cy="3566176"/>
+          </a:xfrm>
+        </p:spPr>
+        <p:txBody>
+          <a:bodyPr>
+            <a:normAutofit fontScale="92500" lnSpcReduction="20000"/>
+          </a:bodyPr>
+          <a:lstStyle/>
+          <a:p>
+            <a:pPr marL="0" indent="0">
+              <a:buNone/>
+            </a:pPr>
+            <a:endParaRPr lang="en-US" dirty="0" smtClean="0"/>
+          </a:p>
+          <a:p>
+            <a:r>
+              <a:rPr lang="en-US" dirty="0" smtClean="0"/>
+              <a:t>Raspberry </a:t>
+            </a:r>
+            <a:r>
+              <a:rPr lang="en-US" dirty="0" err="1" smtClean="0"/>
+              <a:t>senza</a:t>
+            </a:r>
+            <a:r>
+              <a:rPr lang="en-US" dirty="0" smtClean="0"/>
+              <a:t> </a:t>
+            </a:r>
+            <a:r>
+              <a:rPr lang="en-US" dirty="0" err="1" smtClean="0"/>
+              <a:t>connessione</a:t>
+            </a:r>
+            <a:r>
+              <a:rPr lang="en-US" dirty="0" smtClean="0"/>
+              <a:t> Internet: RTC </a:t>
+            </a:r>
+          </a:p>
+          <a:p>
+            <a:r>
+              <a:rPr lang="en-US" dirty="0" err="1" smtClean="0"/>
+              <a:t>Incompatibilità</a:t>
+            </a:r>
+            <a:r>
+              <a:rPr lang="en-US" dirty="0" smtClean="0"/>
+              <a:t> </a:t>
+            </a:r>
+            <a:r>
+              <a:rPr lang="en-US" dirty="0" err="1" smtClean="0"/>
+              <a:t>tra</a:t>
+            </a:r>
+            <a:r>
+              <a:rPr lang="en-US" dirty="0" smtClean="0"/>
+              <a:t> </a:t>
+            </a:r>
+            <a:r>
+              <a:rPr lang="en-US" dirty="0" err="1" smtClean="0"/>
+              <a:t>Raspbian</a:t>
+            </a:r>
+            <a:r>
+              <a:rPr lang="en-US" dirty="0" smtClean="0"/>
+              <a:t> e </a:t>
+            </a:r>
+            <a:r>
+              <a:rPr lang="en-US" dirty="0" err="1" smtClean="0"/>
+              <a:t>architettura</a:t>
+            </a:r>
+            <a:r>
+              <a:rPr lang="en-US" dirty="0" smtClean="0"/>
+              <a:t> 64 bit -&gt; </a:t>
+            </a:r>
+            <a:r>
+              <a:rPr lang="en-US" dirty="0" err="1" smtClean="0"/>
+              <a:t>openSUSE</a:t>
+            </a:r>
+            <a:r>
+              <a:rPr lang="en-US" dirty="0" smtClean="0"/>
+              <a:t> </a:t>
+            </a:r>
+          </a:p>
+          <a:p>
+            <a:r>
+              <a:rPr lang="en-US" dirty="0" err="1" smtClean="0"/>
+              <a:t>Problema</a:t>
+            </a:r>
+            <a:r>
+              <a:rPr lang="en-US" dirty="0" smtClean="0"/>
+              <a:t> di </a:t>
+            </a:r>
+            <a:r>
+              <a:rPr lang="en-US" dirty="0" err="1" smtClean="0"/>
+              <a:t>sicurezza</a:t>
+            </a:r>
+            <a:r>
+              <a:rPr lang="en-US" dirty="0" smtClean="0"/>
+              <a:t> </a:t>
+            </a:r>
+            <a:r>
+              <a:rPr lang="en-US" dirty="0" err="1" smtClean="0"/>
+              <a:t>all’interno</a:t>
+            </a:r>
+            <a:r>
+              <a:rPr lang="en-US" dirty="0" smtClean="0"/>
+              <a:t> </a:t>
+            </a:r>
+            <a:r>
+              <a:rPr lang="en-US" dirty="0" err="1" smtClean="0"/>
+              <a:t>della</a:t>
+            </a:r>
+            <a:r>
+              <a:rPr lang="en-US" dirty="0" smtClean="0"/>
+              <a:t> rete locale -&gt; router </a:t>
+            </a:r>
+            <a:r>
+              <a:rPr lang="en-US" dirty="0" err="1" smtClean="0"/>
+              <a:t>dedicato</a:t>
+            </a:r>
+            <a:r>
+              <a:rPr lang="en-US" dirty="0" smtClean="0"/>
+              <a:t> ad </a:t>
+            </a:r>
+            <a:r>
+              <a:rPr lang="en-US" dirty="0" err="1" smtClean="0"/>
+              <a:t>una</a:t>
+            </a:r>
+            <a:r>
+              <a:rPr lang="en-US" dirty="0" smtClean="0"/>
+              <a:t> LAN </a:t>
+            </a:r>
+            <a:r>
+              <a:rPr lang="en-US" dirty="0" err="1" smtClean="0"/>
+              <a:t>privata</a:t>
+            </a:r>
+            <a:r>
+              <a:rPr lang="en-US" dirty="0" smtClean="0"/>
+              <a:t> </a:t>
+            </a:r>
+          </a:p>
+          <a:p>
+            <a:r>
+              <a:rPr lang="en-US" dirty="0" err="1" smtClean="0"/>
+              <a:t>Disattivazione</a:t>
+            </a:r>
+            <a:r>
+              <a:rPr lang="en-US" dirty="0" smtClean="0"/>
+              <a:t> </a:t>
+            </a:r>
+            <a:r>
+              <a:rPr lang="en-US" dirty="0" err="1" smtClean="0"/>
+              <a:t>tessere</a:t>
+            </a:r>
+            <a:r>
+              <a:rPr lang="en-US" dirty="0" smtClean="0"/>
+              <a:t> </a:t>
+            </a:r>
+            <a:r>
+              <a:rPr lang="en-US" dirty="0" err="1" smtClean="0"/>
+              <a:t>soci</a:t>
+            </a:r>
+            <a:r>
+              <a:rPr lang="en-US" dirty="0" smtClean="0"/>
+              <a:t> non </a:t>
+            </a:r>
+            <a:r>
+              <a:rPr lang="en-US" dirty="0" err="1" smtClean="0"/>
+              <a:t>più</a:t>
+            </a:r>
+            <a:r>
+              <a:rPr lang="en-US" dirty="0" smtClean="0"/>
+              <a:t> </a:t>
+            </a:r>
+            <a:r>
+              <a:rPr lang="en-US" dirty="0" err="1" smtClean="0"/>
+              <a:t>iscritti</a:t>
+            </a:r>
+            <a:r>
+              <a:rPr lang="en-US" dirty="0" smtClean="0"/>
+              <a:t> -&gt; scheduler</a:t>
+            </a:r>
+          </a:p>
+        </p:txBody>
+      </p:sp>
+    </p:spTree>
+    <p:extLst>
+      <p:ext uri="{BB962C8B-B14F-4D97-AF65-F5344CB8AC3E}">
+        <p14:creationId xmlns:p14="http://schemas.microsoft.com/office/powerpoint/2010/main" val="2287646342"/>
+      </p:ext>
+    </p:extLst>
+  </p:cSld>
+  <p:clrMapOvr>
+    <a:masterClrMapping/>
+  </p:clrMapOvr>
+</p:sld>
+</file>
+
+<file path=ppt/slides/slide9.xml><?xml version="1.0" encoding="utf-8"?>
+<p:sld xmlns:a="http://schemas.openxmlformats.org/drawingml/2006/main" xmlns:r="http://schemas.openxmlformats.org/officeDocument/2006/relationships" xmlns:p="http://schemas.openxmlformats.org/presentationml/2006/main">
+  <p:cSld>
+    <p:spTree>
+      <p:nvGrpSpPr>
+        <p:cNvPr id="1" name=""/>
+        <p:cNvGrpSpPr/>
+        <p:nvPr/>
+      </p:nvGrpSpPr>
+      <p:grpSpPr>
+        <a:xfrm>
+          <a:off x="0" y="0"/>
+          <a:ext cx="0" cy="0"/>
+          <a:chOff x="0" y="0"/>
+          <a:chExt cx="0" cy="0"/>
+        </a:xfrm>
+      </p:grpSpPr>
+      <p:sp>
+        <p:nvSpPr>
+          <p:cNvPr id="2" name="Titlu 1"/>
+          <p:cNvSpPr>
+            <a:spLocks noGrp="1"/>
+          </p:cNvSpPr>
+          <p:nvPr>
+            <p:ph type="title"/>
+          </p:nvPr>
+        </p:nvSpPr>
+        <p:spPr/>
+        <p:txBody>
+          <a:bodyPr/>
+          <a:lstStyle/>
+          <a:p>
+            <a:r>
+              <a:rPr lang="en-US" dirty="0" err="1" smtClean="0"/>
+              <a:t>Possibili</a:t>
+            </a:r>
+            <a:r>
+              <a:rPr lang="en-US" dirty="0" smtClean="0"/>
+              <a:t> </a:t>
+            </a:r>
+            <a:r>
+              <a:rPr lang="en-US" dirty="0" err="1" smtClean="0"/>
+              <a:t>miglioramenti</a:t>
+            </a:r>
+            <a:endParaRPr lang="en-US" dirty="0"/>
+          </a:p>
+        </p:txBody>
+      </p:sp>
+      <p:sp>
+        <p:nvSpPr>
+          <p:cNvPr id="3" name="Substituent conținut 2"/>
+          <p:cNvSpPr>
+            <a:spLocks noGrp="1"/>
+          </p:cNvSpPr>
+          <p:nvPr>
+            <p:ph idx="1"/>
+          </p:nvPr>
+        </p:nvSpPr>
+        <p:spPr/>
+        <p:txBody>
+          <a:bodyPr>
+            <a:normAutofit lnSpcReduction="10000"/>
+          </a:bodyPr>
+          <a:lstStyle/>
+          <a:p>
+            <a:pPr marL="0" indent="0">
+              <a:buNone/>
+            </a:pPr>
+            <a:r>
+              <a:rPr lang="en-US" dirty="0" smtClean="0"/>
+              <a:t>Per </a:t>
+            </a:r>
+            <a:r>
+              <a:rPr lang="en-US" dirty="0" err="1" smtClean="0"/>
+              <a:t>alzare</a:t>
+            </a:r>
+            <a:r>
+              <a:rPr lang="en-US" dirty="0" smtClean="0"/>
+              <a:t> </a:t>
+            </a:r>
+            <a:r>
+              <a:rPr lang="en-US" dirty="0" err="1" smtClean="0"/>
+              <a:t>il</a:t>
+            </a:r>
+            <a:r>
+              <a:rPr lang="en-US" dirty="0" smtClean="0"/>
+              <a:t> </a:t>
+            </a:r>
+            <a:r>
+              <a:rPr lang="en-US" dirty="0" err="1" smtClean="0"/>
+              <a:t>progetto</a:t>
+            </a:r>
+            <a:r>
+              <a:rPr lang="en-US" dirty="0" smtClean="0"/>
+              <a:t> </a:t>
+            </a:r>
+            <a:r>
+              <a:rPr lang="en-US" dirty="0" err="1" smtClean="0"/>
+              <a:t>agli</a:t>
+            </a:r>
+            <a:r>
+              <a:rPr lang="en-US" dirty="0" smtClean="0"/>
+              <a:t> standard </a:t>
+            </a:r>
+            <a:r>
+              <a:rPr lang="en-US" dirty="0" err="1" smtClean="0"/>
+              <a:t>dei</a:t>
+            </a:r>
+            <a:r>
+              <a:rPr lang="en-US" dirty="0" smtClean="0"/>
+              <a:t> </a:t>
+            </a:r>
+            <a:r>
+              <a:rPr lang="en-US" dirty="0" err="1" smtClean="0"/>
+              <a:t>sistemi</a:t>
+            </a:r>
+            <a:r>
+              <a:rPr lang="en-US" dirty="0" smtClean="0"/>
+              <a:t> </a:t>
+            </a:r>
+            <a:r>
+              <a:rPr lang="en-US" dirty="0" err="1" smtClean="0"/>
+              <a:t>commerciali</a:t>
+            </a:r>
+            <a:endParaRPr lang="en-US" dirty="0" smtClean="0"/>
+          </a:p>
+          <a:p>
+            <a:pPr marL="0" indent="0">
+              <a:buNone/>
+            </a:pPr>
+            <a:endParaRPr lang="en-US" dirty="0" smtClean="0"/>
+          </a:p>
+          <a:p>
+            <a:r>
+              <a:rPr lang="en-US" dirty="0" err="1" smtClean="0"/>
+              <a:t>Sistema</a:t>
+            </a:r>
+            <a:r>
+              <a:rPr lang="en-US" dirty="0" smtClean="0"/>
+              <a:t> di login </a:t>
+            </a:r>
+          </a:p>
+          <a:p>
+            <a:r>
+              <a:rPr lang="en-US" dirty="0" smtClean="0"/>
+              <a:t>Fascia </a:t>
+            </a:r>
+            <a:r>
+              <a:rPr lang="en-US" dirty="0" err="1" smtClean="0"/>
+              <a:t>oraria</a:t>
+            </a:r>
+            <a:r>
+              <a:rPr lang="en-US" dirty="0" smtClean="0"/>
+              <a:t> di </a:t>
+            </a:r>
+            <a:r>
+              <a:rPr lang="en-US" dirty="0" err="1" smtClean="0"/>
+              <a:t>lavoro</a:t>
+            </a:r>
+            <a:endParaRPr lang="en-US" dirty="0" smtClean="0"/>
+          </a:p>
+          <a:p>
+            <a:r>
+              <a:rPr lang="en-US" dirty="0" err="1" smtClean="0"/>
+              <a:t>Sensore</a:t>
+            </a:r>
+            <a:r>
+              <a:rPr lang="en-US" dirty="0" smtClean="0"/>
+              <a:t> di </a:t>
+            </a:r>
+            <a:r>
+              <a:rPr lang="en-US" dirty="0" err="1" smtClean="0"/>
+              <a:t>rilevamento</a:t>
+            </a:r>
+            <a:endParaRPr lang="en-US" dirty="0" smtClean="0"/>
+          </a:p>
+          <a:p>
+            <a:r>
+              <a:rPr lang="en-US" dirty="0" err="1" smtClean="0"/>
+              <a:t>Videocamera</a:t>
+            </a:r>
+            <a:endParaRPr lang="en-US" dirty="0" smtClean="0"/>
+          </a:p>
+          <a:p>
+            <a:r>
+              <a:rPr lang="en-US" dirty="0" err="1" smtClean="0"/>
+              <a:t>Sistema</a:t>
+            </a:r>
+            <a:r>
+              <a:rPr lang="en-US" dirty="0" smtClean="0"/>
+              <a:t> di </a:t>
+            </a:r>
+            <a:r>
+              <a:rPr lang="en-US" dirty="0" err="1" smtClean="0"/>
+              <a:t>allarme</a:t>
+            </a:r>
+            <a:endParaRPr lang="en-US" dirty="0"/>
+          </a:p>
+        </p:txBody>
+      </p:sp>
+    </p:spTree>
+    <p:extLst>
+      <p:ext uri="{BB962C8B-B14F-4D97-AF65-F5344CB8AC3E}">
+        <p14:creationId xmlns:p14="http://schemas.microsoft.com/office/powerpoint/2010/main" val="2081365751"/>
       </p:ext>
     </p:extLst>
   </p:cSld>

</xml_diff>

<commit_message>
elaborato il testo di alcune slide della presentazione
</commit_message>
<xml_diff>
--- a/Tesi_Sistema_Accessi_IoT_Andrei_Ciulpan_872394/presentazione/Sistema Accessi IoT.pptx
+++ b/Tesi_Sistema_Accessi_IoT_Andrei_Ciulpan_872394/presentazione/Sistema Accessi IoT.pptx
@@ -2,8 +2,11 @@
 <file path=ppt/presentation.xml><?xml version="1.0" encoding="utf-8"?>
 <p:presentation xmlns:a="http://schemas.openxmlformats.org/drawingml/2006/main" xmlns:r="http://schemas.openxmlformats.org/officeDocument/2006/relationships" xmlns:p="http://schemas.openxmlformats.org/presentationml/2006/main" saveSubsetFonts="1">
   <p:sldMasterIdLst>
-    <p:sldMasterId id="2147483648" r:id="rId1"/>
+    <p:sldMasterId id="2147484560" r:id="rId1"/>
   </p:sldMasterIdLst>
+  <p:notesMasterIdLst>
+    <p:notesMasterId r:id="rId13"/>
+  </p:notesMasterIdLst>
   <p:sldIdLst>
     <p:sldId id="256" r:id="rId2"/>
     <p:sldId id="257" r:id="rId3"/>
@@ -138,6 +141,356 @@
 </p:presentation>
 </file>
 
+<file path=ppt/notesMasters/notesMaster1.xml><?xml version="1.0" encoding="utf-8"?>
+<p:notesMaster xmlns:a="http://schemas.openxmlformats.org/drawingml/2006/main" xmlns:r="http://schemas.openxmlformats.org/officeDocument/2006/relationships" xmlns:p="http://schemas.openxmlformats.org/presentationml/2006/main">
+  <p:cSld>
+    <p:bg>
+      <p:bgRef idx="1001">
+        <a:schemeClr val="bg1"/>
+      </p:bgRef>
+    </p:bg>
+    <p:spTree>
+      <p:nvGrpSpPr>
+        <p:cNvPr id="1" name=""/>
+        <p:cNvGrpSpPr/>
+        <p:nvPr/>
+      </p:nvGrpSpPr>
+      <p:grpSpPr>
+        <a:xfrm>
+          <a:off x="0" y="0"/>
+          <a:ext cx="0" cy="0"/>
+          <a:chOff x="0" y="0"/>
+          <a:chExt cx="0" cy="0"/>
+        </a:xfrm>
+      </p:grpSpPr>
+      <p:sp>
+        <p:nvSpPr>
+          <p:cNvPr id="2" name="Substituent antet 1"/>
+          <p:cNvSpPr>
+            <a:spLocks noGrp="1"/>
+          </p:cNvSpPr>
+          <p:nvPr>
+            <p:ph type="hdr" sz="quarter"/>
+          </p:nvPr>
+        </p:nvSpPr>
+        <p:spPr>
+          <a:xfrm>
+            <a:off x="0" y="0"/>
+            <a:ext cx="2971800" cy="457200"/>
+          </a:xfrm>
+          <a:prstGeom prst="rect">
+            <a:avLst/>
+          </a:prstGeom>
+        </p:spPr>
+        <p:txBody>
+          <a:bodyPr vert="horz" lIns="91440" tIns="45720" rIns="91440" bIns="45720" rtlCol="0"/>
+          <a:lstStyle>
+            <a:lvl1pPr algn="l">
+              <a:defRPr sz="1200"/>
+            </a:lvl1pPr>
+          </a:lstStyle>
+          <a:p>
+            <a:endParaRPr lang="en-US"/>
+          </a:p>
+        </p:txBody>
+      </p:sp>
+      <p:sp>
+        <p:nvSpPr>
+          <p:cNvPr id="3" name="Substituent dată 2"/>
+          <p:cNvSpPr>
+            <a:spLocks noGrp="1"/>
+          </p:cNvSpPr>
+          <p:nvPr>
+            <p:ph type="dt" idx="1"/>
+          </p:nvPr>
+        </p:nvSpPr>
+        <p:spPr>
+          <a:xfrm>
+            <a:off x="3884613" y="0"/>
+            <a:ext cx="2971800" cy="457200"/>
+          </a:xfrm>
+          <a:prstGeom prst="rect">
+            <a:avLst/>
+          </a:prstGeom>
+        </p:spPr>
+        <p:txBody>
+          <a:bodyPr vert="horz" lIns="91440" tIns="45720" rIns="91440" bIns="45720" rtlCol="0"/>
+          <a:lstStyle>
+            <a:lvl1pPr algn="r">
+              <a:defRPr sz="1200"/>
+            </a:lvl1pPr>
+          </a:lstStyle>
+          <a:p>
+            <a:fld id="{7E2CBA20-3CC6-4CA7-A64E-677853DDDBDD}" type="datetimeFigureOut">
+              <a:rPr lang="en-US" smtClean="0"/>
+              <a:t>21-Jun-19</a:t>
+            </a:fld>
+            <a:endParaRPr lang="en-US"/>
+          </a:p>
+        </p:txBody>
+      </p:sp>
+      <p:sp>
+        <p:nvSpPr>
+          <p:cNvPr id="4" name="Substituent imagine diapozitiv 3"/>
+          <p:cNvSpPr>
+            <a:spLocks noGrp="1" noRot="1" noChangeAspect="1"/>
+          </p:cNvSpPr>
+          <p:nvPr>
+            <p:ph type="sldImg" idx="2"/>
+          </p:nvPr>
+        </p:nvSpPr>
+        <p:spPr>
+          <a:xfrm>
+            <a:off x="1143000" y="685800"/>
+            <a:ext cx="4572000" cy="3429000"/>
+          </a:xfrm>
+          <a:prstGeom prst="rect">
+            <a:avLst/>
+          </a:prstGeom>
+          <a:noFill/>
+          <a:ln w="12700">
+            <a:solidFill>
+              <a:prstClr val="black"/>
+            </a:solidFill>
+          </a:ln>
+        </p:spPr>
+        <p:txBody>
+          <a:bodyPr vert="horz" lIns="91440" tIns="45720" rIns="91440" bIns="45720" rtlCol="0" anchor="ctr"/>
+          <a:lstStyle/>
+          <a:p>
+            <a:endParaRPr lang="en-US"/>
+          </a:p>
+        </p:txBody>
+      </p:sp>
+      <p:sp>
+        <p:nvSpPr>
+          <p:cNvPr id="5" name="Substituent note 4"/>
+          <p:cNvSpPr>
+            <a:spLocks noGrp="1"/>
+          </p:cNvSpPr>
+          <p:nvPr>
+            <p:ph type="body" sz="quarter" idx="3"/>
+          </p:nvPr>
+        </p:nvSpPr>
+        <p:spPr>
+          <a:xfrm>
+            <a:off x="685800" y="4343400"/>
+            <a:ext cx="5486400" cy="4114800"/>
+          </a:xfrm>
+          <a:prstGeom prst="rect">
+            <a:avLst/>
+          </a:prstGeom>
+        </p:spPr>
+        <p:txBody>
+          <a:bodyPr vert="horz" lIns="91440" tIns="45720" rIns="91440" bIns="45720" rtlCol="0"/>
+          <a:lstStyle/>
+          <a:p>
+            <a:pPr lvl="0"/>
+            <a:r>
+              <a:rPr lang="ro-RO" smtClean="0"/>
+              <a:t>Clic pentru editare stiluri text Coordonator</a:t>
+            </a:r>
+          </a:p>
+          <a:p>
+            <a:pPr lvl="1"/>
+            <a:r>
+              <a:rPr lang="ro-RO" smtClean="0"/>
+              <a:t>Al doilea nivel</a:t>
+            </a:r>
+          </a:p>
+          <a:p>
+            <a:pPr lvl="2"/>
+            <a:r>
+              <a:rPr lang="ro-RO" smtClean="0"/>
+              <a:t>Al treilea nivel</a:t>
+            </a:r>
+          </a:p>
+          <a:p>
+            <a:pPr lvl="3"/>
+            <a:r>
+              <a:rPr lang="ro-RO" smtClean="0"/>
+              <a:t>Al patrulea nivel</a:t>
+            </a:r>
+          </a:p>
+          <a:p>
+            <a:pPr lvl="4"/>
+            <a:r>
+              <a:rPr lang="ro-RO" smtClean="0"/>
+              <a:t>Al cincilea nivel</a:t>
+            </a:r>
+            <a:endParaRPr lang="en-US"/>
+          </a:p>
+        </p:txBody>
+      </p:sp>
+      <p:sp>
+        <p:nvSpPr>
+          <p:cNvPr id="6" name="Substituent subsol 5"/>
+          <p:cNvSpPr>
+            <a:spLocks noGrp="1"/>
+          </p:cNvSpPr>
+          <p:nvPr>
+            <p:ph type="ftr" sz="quarter" idx="4"/>
+          </p:nvPr>
+        </p:nvSpPr>
+        <p:spPr>
+          <a:xfrm>
+            <a:off x="0" y="8685213"/>
+            <a:ext cx="2971800" cy="457200"/>
+          </a:xfrm>
+          <a:prstGeom prst="rect">
+            <a:avLst/>
+          </a:prstGeom>
+        </p:spPr>
+        <p:txBody>
+          <a:bodyPr vert="horz" lIns="91440" tIns="45720" rIns="91440" bIns="45720" rtlCol="0" anchor="b"/>
+          <a:lstStyle>
+            <a:lvl1pPr algn="l">
+              <a:defRPr sz="1200"/>
+            </a:lvl1pPr>
+          </a:lstStyle>
+          <a:p>
+            <a:endParaRPr lang="en-US"/>
+          </a:p>
+        </p:txBody>
+      </p:sp>
+      <p:sp>
+        <p:nvSpPr>
+          <p:cNvPr id="7" name="Substituent număr diapozitiv 6"/>
+          <p:cNvSpPr>
+            <a:spLocks noGrp="1"/>
+          </p:cNvSpPr>
+          <p:nvPr>
+            <p:ph type="sldNum" sz="quarter" idx="5"/>
+          </p:nvPr>
+        </p:nvSpPr>
+        <p:spPr>
+          <a:xfrm>
+            <a:off x="3884613" y="8685213"/>
+            <a:ext cx="2971800" cy="457200"/>
+          </a:xfrm>
+          <a:prstGeom prst="rect">
+            <a:avLst/>
+          </a:prstGeom>
+        </p:spPr>
+        <p:txBody>
+          <a:bodyPr vert="horz" lIns="91440" tIns="45720" rIns="91440" bIns="45720" rtlCol="0" anchor="b"/>
+          <a:lstStyle>
+            <a:lvl1pPr algn="r">
+              <a:defRPr sz="1200"/>
+            </a:lvl1pPr>
+          </a:lstStyle>
+          <a:p>
+            <a:fld id="{5D5D8A57-A6DA-4DCE-ADC7-3F4B291DAEDD}" type="slidenum">
+              <a:rPr lang="en-US" smtClean="0"/>
+              <a:t>‹#›</a:t>
+            </a:fld>
+            <a:endParaRPr lang="en-US"/>
+          </a:p>
+        </p:txBody>
+      </p:sp>
+    </p:spTree>
+    <p:extLst>
+      <p:ext uri="{BB962C8B-B14F-4D97-AF65-F5344CB8AC3E}">
+        <p14:creationId xmlns:p14="http://schemas.microsoft.com/office/powerpoint/2010/main" val="1265387136"/>
+      </p:ext>
+    </p:extLst>
+  </p:cSld>
+  <p:clrMap bg1="lt1" tx1="dk1" bg2="lt2" tx2="dk2" accent1="accent1" accent2="accent2" accent3="accent3" accent4="accent4" accent5="accent5" accent6="accent6" hlink="hlink" folHlink="folHlink"/>
+  <p:notesStyle>
+    <a:lvl1pPr marL="0" algn="l" defTabSz="914400" rtl="0" eaLnBrk="1" latinLnBrk="0" hangingPunct="1">
+      <a:defRPr sz="1200" kern="1200">
+        <a:solidFill>
+          <a:schemeClr val="tx1"/>
+        </a:solidFill>
+        <a:latin typeface="+mn-lt"/>
+        <a:ea typeface="+mn-ea"/>
+        <a:cs typeface="+mn-cs"/>
+      </a:defRPr>
+    </a:lvl1pPr>
+    <a:lvl2pPr marL="457200" algn="l" defTabSz="914400" rtl="0" eaLnBrk="1" latinLnBrk="0" hangingPunct="1">
+      <a:defRPr sz="1200" kern="1200">
+        <a:solidFill>
+          <a:schemeClr val="tx1"/>
+        </a:solidFill>
+        <a:latin typeface="+mn-lt"/>
+        <a:ea typeface="+mn-ea"/>
+        <a:cs typeface="+mn-cs"/>
+      </a:defRPr>
+    </a:lvl2pPr>
+    <a:lvl3pPr marL="914400" algn="l" defTabSz="914400" rtl="0" eaLnBrk="1" latinLnBrk="0" hangingPunct="1">
+      <a:defRPr sz="1200" kern="1200">
+        <a:solidFill>
+          <a:schemeClr val="tx1"/>
+        </a:solidFill>
+        <a:latin typeface="+mn-lt"/>
+        <a:ea typeface="+mn-ea"/>
+        <a:cs typeface="+mn-cs"/>
+      </a:defRPr>
+    </a:lvl3pPr>
+    <a:lvl4pPr marL="1371600" algn="l" defTabSz="914400" rtl="0" eaLnBrk="1" latinLnBrk="0" hangingPunct="1">
+      <a:defRPr sz="1200" kern="1200">
+        <a:solidFill>
+          <a:schemeClr val="tx1"/>
+        </a:solidFill>
+        <a:latin typeface="+mn-lt"/>
+        <a:ea typeface="+mn-ea"/>
+        <a:cs typeface="+mn-cs"/>
+      </a:defRPr>
+    </a:lvl4pPr>
+    <a:lvl5pPr marL="1828800" algn="l" defTabSz="914400" rtl="0" eaLnBrk="1" latinLnBrk="0" hangingPunct="1">
+      <a:defRPr sz="1200" kern="1200">
+        <a:solidFill>
+          <a:schemeClr val="tx1"/>
+        </a:solidFill>
+        <a:latin typeface="+mn-lt"/>
+        <a:ea typeface="+mn-ea"/>
+        <a:cs typeface="+mn-cs"/>
+      </a:defRPr>
+    </a:lvl5pPr>
+    <a:lvl6pPr marL="2286000" algn="l" defTabSz="914400" rtl="0" eaLnBrk="1" latinLnBrk="0" hangingPunct="1">
+      <a:defRPr sz="1200" kern="1200">
+        <a:solidFill>
+          <a:schemeClr val="tx1"/>
+        </a:solidFill>
+        <a:latin typeface="+mn-lt"/>
+        <a:ea typeface="+mn-ea"/>
+        <a:cs typeface="+mn-cs"/>
+      </a:defRPr>
+    </a:lvl6pPr>
+    <a:lvl7pPr marL="2743200" algn="l" defTabSz="914400" rtl="0" eaLnBrk="1" latinLnBrk="0" hangingPunct="1">
+      <a:defRPr sz="1200" kern="1200">
+        <a:solidFill>
+          <a:schemeClr val="tx1"/>
+        </a:solidFill>
+        <a:latin typeface="+mn-lt"/>
+        <a:ea typeface="+mn-ea"/>
+        <a:cs typeface="+mn-cs"/>
+      </a:defRPr>
+    </a:lvl7pPr>
+    <a:lvl8pPr marL="3200400" algn="l" defTabSz="914400" rtl="0" eaLnBrk="1" latinLnBrk="0" hangingPunct="1">
+      <a:defRPr sz="1200" kern="1200">
+        <a:solidFill>
+          <a:schemeClr val="tx1"/>
+        </a:solidFill>
+        <a:latin typeface="+mn-lt"/>
+        <a:ea typeface="+mn-ea"/>
+        <a:cs typeface="+mn-cs"/>
+      </a:defRPr>
+    </a:lvl8pPr>
+    <a:lvl9pPr marL="3657600" algn="l" defTabSz="914400" rtl="0" eaLnBrk="1" latinLnBrk="0" hangingPunct="1">
+      <a:defRPr sz="1200" kern="1200">
+        <a:solidFill>
+          <a:schemeClr val="tx1"/>
+        </a:solidFill>
+        <a:latin typeface="+mn-lt"/>
+        <a:ea typeface="+mn-ea"/>
+        <a:cs typeface="+mn-cs"/>
+      </a:defRPr>
+    </a:lvl9pPr>
+  </p:notesStyle>
+</p:notesMaster>
+</file>
+
 <file path=ppt/slideLayouts/slideLayout1.xml><?xml version="1.0" encoding="utf-8"?>
 <p:sldLayout xmlns:a="http://schemas.openxmlformats.org/drawingml/2006/main" xmlns:r="http://schemas.openxmlformats.org/officeDocument/2006/relationships" xmlns:p="http://schemas.openxmlformats.org/presentationml/2006/main" type="title" preserve="1">
   <p:cSld name="Diapozitiv titlu">
@@ -157,7 +510,7 @@
       </p:grpSpPr>
       <p:sp>
         <p:nvSpPr>
-          <p:cNvPr id="2" name="Titlu 1"/>
+          <p:cNvPr id="2" name="Title 1"/>
           <p:cNvSpPr>
             <a:spLocks noGrp="1"/>
           </p:cNvSpPr>
@@ -167,25 +520,36 @@
         </p:nvSpPr>
         <p:spPr>
           <a:xfrm>
-            <a:off x="685800" y="2130425"/>
-            <a:ext cx="7772400" cy="1470025"/>
+            <a:off x="685800" y="1905000"/>
+            <a:ext cx="7543800" cy="2593975"/>
           </a:xfrm>
         </p:spPr>
         <p:txBody>
-          <a:bodyPr/>
-          <a:lstStyle/>
+          <a:bodyPr anchor="b"/>
+          <a:lstStyle>
+            <a:lvl1pPr>
+              <a:defRPr sz="6600">
+                <a:ln>
+                  <a:noFill/>
+                </a:ln>
+                <a:solidFill>
+                  <a:schemeClr val="tx2"/>
+                </a:solidFill>
+              </a:defRPr>
+            </a:lvl1pPr>
+          </a:lstStyle>
           <a:p>
             <a:r>
               <a:rPr lang="ro-RO" smtClean="0"/>
               <a:t>Clic pentru editare stil titlu</a:t>
             </a:r>
-            <a:endParaRPr lang="en-US"/>
-          </a:p>
-        </p:txBody>
-      </p:sp>
-      <p:sp>
-        <p:nvSpPr>
-          <p:cNvPr id="3" name="Subtitlu 2"/>
+            <a:endParaRPr lang="en-US" dirty="0"/>
+          </a:p>
+        </p:txBody>
+      </p:sp>
+      <p:sp>
+        <p:nvSpPr>
+          <p:cNvPr id="3" name="Subtitle 2"/>
           <p:cNvSpPr>
             <a:spLocks noGrp="1"/>
           </p:cNvSpPr>
@@ -195,16 +559,18 @@
         </p:nvSpPr>
         <p:spPr>
           <a:xfrm>
-            <a:off x="1371600" y="3886200"/>
-            <a:ext cx="6400800" cy="1752600"/>
+            <a:off x="685800" y="4572000"/>
+            <a:ext cx="6461760" cy="1066800"/>
           </a:xfrm>
         </p:spPr>
         <p:txBody>
-          <a:bodyPr/>
+          <a:bodyPr anchor="t">
+            <a:normAutofit/>
+          </a:bodyPr>
           <a:lstStyle>
-            <a:lvl1pPr marL="0" indent="0" algn="ctr">
-              <a:buNone/>
-              <a:defRPr>
+            <a:lvl1pPr marL="0" indent="0" algn="l">
+              <a:buNone/>
+              <a:defRPr sz="2000">
                 <a:solidFill>
                   <a:schemeClr val="tx1">
                     <a:tint val="75000"/>
@@ -298,13 +664,13 @@
               <a:rPr lang="ro-RO" smtClean="0"/>
               <a:t>Clic pentru a edita stilul de subtitlu</a:t>
             </a:r>
-            <a:endParaRPr lang="en-US"/>
-          </a:p>
-        </p:txBody>
-      </p:sp>
-      <p:sp>
-        <p:nvSpPr>
-          <p:cNvPr id="4" name="Substituent dată 3"/>
+            <a:endParaRPr lang="en-US" dirty="0"/>
+          </a:p>
+        </p:txBody>
+      </p:sp>
+      <p:sp>
+        <p:nvSpPr>
+          <p:cNvPr id="4" name="Date Placeholder 3"/>
           <p:cNvSpPr>
             <a:spLocks noGrp="1"/>
           </p:cNvSpPr>
@@ -319,7 +685,7 @@
           <a:p>
             <a:fld id="{179DE077-2B25-4D43-8A5F-B5A94BA1672D}" type="datetimeFigureOut">
               <a:rPr lang="en-US" smtClean="0"/>
-              <a:t>18-Jun-19</a:t>
+              <a:t>21-Jun-19</a:t>
             </a:fld>
             <a:endParaRPr lang="en-US"/>
           </a:p>
@@ -327,7 +693,7 @@
       </p:sp>
       <p:sp>
         <p:nvSpPr>
-          <p:cNvPr id="5" name="Substituent subsol 4"/>
+          <p:cNvPr id="5" name="Footer Placeholder 4"/>
           <p:cNvSpPr>
             <a:spLocks noGrp="1"/>
           </p:cNvSpPr>
@@ -346,7 +712,7 @@
       </p:sp>
       <p:sp>
         <p:nvSpPr>
-          <p:cNvPr id="6" name="Substituent număr diapozitiv 5"/>
+          <p:cNvPr id="6" name="Slide Number Placeholder 5"/>
           <p:cNvSpPr>
             <a:spLocks noGrp="1"/>
           </p:cNvSpPr>
@@ -368,11 +734,6 @@
         </p:txBody>
       </p:sp>
     </p:spTree>
-    <p:extLst>
-      <p:ext uri="{BB962C8B-B14F-4D97-AF65-F5344CB8AC3E}">
-        <p14:creationId xmlns:p14="http://schemas.microsoft.com/office/powerpoint/2010/main" val="804969795"/>
-      </p:ext>
-    </p:extLst>
   </p:cSld>
   <p:clrMapOvr>
     <a:masterClrMapping/>
@@ -399,7 +760,7 @@
       </p:grpSpPr>
       <p:sp>
         <p:nvSpPr>
-          <p:cNvPr id="2" name="Titlu 1"/>
+          <p:cNvPr id="2" name="Title 1"/>
           <p:cNvSpPr>
             <a:spLocks noGrp="1"/>
           </p:cNvSpPr>
@@ -422,7 +783,7 @@
       </p:sp>
       <p:sp>
         <p:nvSpPr>
-          <p:cNvPr id="3" name="Substituent text vertical 2"/>
+          <p:cNvPr id="3" name="Vertical Text Placeholder 2"/>
           <p:cNvSpPr>
             <a:spLocks noGrp="1"/>
           </p:cNvSpPr>
@@ -474,7 +835,7 @@
       </p:sp>
       <p:sp>
         <p:nvSpPr>
-          <p:cNvPr id="4" name="Substituent dată 3"/>
+          <p:cNvPr id="4" name="Date Placeholder 3"/>
           <p:cNvSpPr>
             <a:spLocks noGrp="1"/>
           </p:cNvSpPr>
@@ -489,7 +850,7 @@
           <a:p>
             <a:fld id="{179DE077-2B25-4D43-8A5F-B5A94BA1672D}" type="datetimeFigureOut">
               <a:rPr lang="en-US" smtClean="0"/>
-              <a:t>18-Jun-19</a:t>
+              <a:t>21-Jun-19</a:t>
             </a:fld>
             <a:endParaRPr lang="en-US"/>
           </a:p>
@@ -497,7 +858,7 @@
       </p:sp>
       <p:sp>
         <p:nvSpPr>
-          <p:cNvPr id="5" name="Substituent subsol 4"/>
+          <p:cNvPr id="5" name="Footer Placeholder 4"/>
           <p:cNvSpPr>
             <a:spLocks noGrp="1"/>
           </p:cNvSpPr>
@@ -516,7 +877,7 @@
       </p:sp>
       <p:sp>
         <p:nvSpPr>
-          <p:cNvPr id="6" name="Substituent număr diapozitiv 5"/>
+          <p:cNvPr id="6" name="Slide Number Placeholder 5"/>
           <p:cNvSpPr>
             <a:spLocks noGrp="1"/>
           </p:cNvSpPr>
@@ -538,11 +899,6 @@
         </p:txBody>
       </p:sp>
     </p:spTree>
-    <p:extLst>
-      <p:ext uri="{BB962C8B-B14F-4D97-AF65-F5344CB8AC3E}">
-        <p14:creationId xmlns:p14="http://schemas.microsoft.com/office/powerpoint/2010/main" val="3946264090"/>
-      </p:ext>
-    </p:extLst>
   </p:cSld>
   <p:clrMapOvr>
     <a:masterClrMapping/>
@@ -569,7 +925,7 @@
       </p:grpSpPr>
       <p:sp>
         <p:nvSpPr>
-          <p:cNvPr id="2" name="Titlu vertical 1"/>
+          <p:cNvPr id="2" name="Vertical Title 1"/>
           <p:cNvSpPr>
             <a:spLocks noGrp="1"/>
           </p:cNvSpPr>
@@ -580,24 +936,24 @@
         <p:spPr>
           <a:xfrm>
             <a:off x="6629400" y="274638"/>
-            <a:ext cx="2057400" cy="5851525"/>
+            <a:ext cx="1752600" cy="5851525"/>
           </a:xfrm>
         </p:spPr>
         <p:txBody>
-          <a:bodyPr vert="eaVert"/>
+          <a:bodyPr vert="eaVert" anchor="b" anchorCtr="0"/>
           <a:lstStyle/>
           <a:p>
             <a:r>
               <a:rPr lang="ro-RO" smtClean="0"/>
               <a:t>Clic pentru editare stil titlu</a:t>
             </a:r>
-            <a:endParaRPr lang="en-US"/>
-          </a:p>
-        </p:txBody>
-      </p:sp>
-      <p:sp>
-        <p:nvSpPr>
-          <p:cNvPr id="3" name="Substituent text vertical 2"/>
+            <a:endParaRPr lang="en-US" dirty="0"/>
+          </a:p>
+        </p:txBody>
+      </p:sp>
+      <p:sp>
+        <p:nvSpPr>
+          <p:cNvPr id="3" name="Vertical Text Placeholder 2"/>
           <p:cNvSpPr>
             <a:spLocks noGrp="1"/>
           </p:cNvSpPr>
@@ -654,7 +1010,7 @@
       </p:sp>
       <p:sp>
         <p:nvSpPr>
-          <p:cNvPr id="4" name="Substituent dată 3"/>
+          <p:cNvPr id="4" name="Date Placeholder 3"/>
           <p:cNvSpPr>
             <a:spLocks noGrp="1"/>
           </p:cNvSpPr>
@@ -669,7 +1025,7 @@
           <a:p>
             <a:fld id="{179DE077-2B25-4D43-8A5F-B5A94BA1672D}" type="datetimeFigureOut">
               <a:rPr lang="en-US" smtClean="0"/>
-              <a:t>18-Jun-19</a:t>
+              <a:t>21-Jun-19</a:t>
             </a:fld>
             <a:endParaRPr lang="en-US"/>
           </a:p>
@@ -677,7 +1033,7 @@
       </p:sp>
       <p:sp>
         <p:nvSpPr>
-          <p:cNvPr id="5" name="Substituent subsol 4"/>
+          <p:cNvPr id="5" name="Footer Placeholder 4"/>
           <p:cNvSpPr>
             <a:spLocks noGrp="1"/>
           </p:cNvSpPr>
@@ -696,7 +1052,7 @@
       </p:sp>
       <p:sp>
         <p:nvSpPr>
-          <p:cNvPr id="6" name="Substituent număr diapozitiv 5"/>
+          <p:cNvPr id="6" name="Slide Number Placeholder 5"/>
           <p:cNvSpPr>
             <a:spLocks noGrp="1"/>
           </p:cNvSpPr>
@@ -718,11 +1074,6 @@
         </p:txBody>
       </p:sp>
     </p:spTree>
-    <p:extLst>
-      <p:ext uri="{BB962C8B-B14F-4D97-AF65-F5344CB8AC3E}">
-        <p14:creationId xmlns:p14="http://schemas.microsoft.com/office/powerpoint/2010/main" val="1376807116"/>
-      </p:ext>
-    </p:extLst>
   </p:cSld>
   <p:clrMapOvr>
     <a:masterClrMapping/>
@@ -749,7 +1100,7 @@
       </p:grpSpPr>
       <p:sp>
         <p:nvSpPr>
-          <p:cNvPr id="2" name="Titlu 1"/>
+          <p:cNvPr id="2" name="Title 1"/>
           <p:cNvSpPr>
             <a:spLocks noGrp="1"/>
           </p:cNvSpPr>
@@ -772,7 +1123,7 @@
       </p:sp>
       <p:sp>
         <p:nvSpPr>
-          <p:cNvPr id="3" name="Substituent conținut 2"/>
+          <p:cNvPr id="3" name="Content Placeholder 2"/>
           <p:cNvSpPr>
             <a:spLocks noGrp="1"/>
           </p:cNvSpPr>
@@ -824,7 +1175,7 @@
       </p:sp>
       <p:sp>
         <p:nvSpPr>
-          <p:cNvPr id="4" name="Substituent dată 3"/>
+          <p:cNvPr id="4" name="Date Placeholder 3"/>
           <p:cNvSpPr>
             <a:spLocks noGrp="1"/>
           </p:cNvSpPr>
@@ -839,7 +1190,7 @@
           <a:p>
             <a:fld id="{179DE077-2B25-4D43-8A5F-B5A94BA1672D}" type="datetimeFigureOut">
               <a:rPr lang="en-US" smtClean="0"/>
-              <a:t>18-Jun-19</a:t>
+              <a:t>21-Jun-19</a:t>
             </a:fld>
             <a:endParaRPr lang="en-US"/>
           </a:p>
@@ -847,7 +1198,7 @@
       </p:sp>
       <p:sp>
         <p:nvSpPr>
-          <p:cNvPr id="5" name="Substituent subsol 4"/>
+          <p:cNvPr id="5" name="Footer Placeholder 4"/>
           <p:cNvSpPr>
             <a:spLocks noGrp="1"/>
           </p:cNvSpPr>
@@ -866,7 +1217,7 @@
       </p:sp>
       <p:sp>
         <p:nvSpPr>
-          <p:cNvPr id="6" name="Substituent număr diapozitiv 5"/>
+          <p:cNvPr id="6" name="Slide Number Placeholder 5"/>
           <p:cNvSpPr>
             <a:spLocks noGrp="1"/>
           </p:cNvSpPr>
@@ -888,11 +1239,6 @@
         </p:txBody>
       </p:sp>
     </p:spTree>
-    <p:extLst>
-      <p:ext uri="{BB962C8B-B14F-4D97-AF65-F5344CB8AC3E}">
-        <p14:creationId xmlns:p14="http://schemas.microsoft.com/office/powerpoint/2010/main" val="3035847792"/>
-      </p:ext>
-    </p:extLst>
   </p:cSld>
   <p:clrMapOvr>
     <a:masterClrMapping/>
@@ -919,7 +1265,7 @@
       </p:grpSpPr>
       <p:sp>
         <p:nvSpPr>
-          <p:cNvPr id="2" name="Titlu 1"/>
+          <p:cNvPr id="2" name="Title 1"/>
           <p:cNvSpPr>
             <a:spLocks noGrp="1"/>
           </p:cNvSpPr>
@@ -929,15 +1275,15 @@
         </p:nvSpPr>
         <p:spPr>
           <a:xfrm>
-            <a:off x="722313" y="4406900"/>
-            <a:ext cx="7772400" cy="1362075"/>
+            <a:off x="722313" y="5486400"/>
+            <a:ext cx="7659687" cy="1168400"/>
           </a:xfrm>
         </p:spPr>
         <p:txBody>
           <a:bodyPr anchor="t"/>
           <a:lstStyle>
             <a:lvl1pPr algn="l">
-              <a:defRPr sz="4000" b="1" cap="all"/>
+              <a:defRPr sz="3600" b="0" cap="all"/>
             </a:lvl1pPr>
           </a:lstStyle>
           <a:p>
@@ -945,13 +1291,13 @@
               <a:rPr lang="ro-RO" smtClean="0"/>
               <a:t>Clic pentru editare stil titlu</a:t>
             </a:r>
-            <a:endParaRPr lang="en-US"/>
-          </a:p>
-        </p:txBody>
-      </p:sp>
-      <p:sp>
-        <p:nvSpPr>
-          <p:cNvPr id="3" name="Substituent text 2"/>
+            <a:endParaRPr lang="en-US" dirty="0"/>
+          </a:p>
+        </p:txBody>
+      </p:sp>
+      <p:sp>
+        <p:nvSpPr>
+          <p:cNvPr id="3" name="Text Placeholder 2"/>
           <p:cNvSpPr>
             <a:spLocks noGrp="1"/>
           </p:cNvSpPr>
@@ -961,8 +1307,8 @@
         </p:nvSpPr>
         <p:spPr>
           <a:xfrm>
-            <a:off x="722313" y="2906713"/>
-            <a:ext cx="7772400" cy="1500187"/>
+            <a:off x="722313" y="3852863"/>
+            <a:ext cx="6135687" cy="1633538"/>
           </a:xfrm>
         </p:spPr>
         <p:txBody>
@@ -1070,7 +1416,7 @@
       </p:sp>
       <p:sp>
         <p:nvSpPr>
-          <p:cNvPr id="4" name="Substituent dată 3"/>
+          <p:cNvPr id="4" name="Date Placeholder 3"/>
           <p:cNvSpPr>
             <a:spLocks noGrp="1"/>
           </p:cNvSpPr>
@@ -1085,7 +1431,7 @@
           <a:p>
             <a:fld id="{179DE077-2B25-4D43-8A5F-B5A94BA1672D}" type="datetimeFigureOut">
               <a:rPr lang="en-US" smtClean="0"/>
-              <a:t>18-Jun-19</a:t>
+              <a:t>21-Jun-19</a:t>
             </a:fld>
             <a:endParaRPr lang="en-US"/>
           </a:p>
@@ -1093,7 +1439,7 @@
       </p:sp>
       <p:sp>
         <p:nvSpPr>
-          <p:cNvPr id="5" name="Substituent subsol 4"/>
+          <p:cNvPr id="5" name="Footer Placeholder 4"/>
           <p:cNvSpPr>
             <a:spLocks noGrp="1"/>
           </p:cNvSpPr>
@@ -1112,7 +1458,7 @@
       </p:sp>
       <p:sp>
         <p:nvSpPr>
-          <p:cNvPr id="6" name="Substituent număr diapozitiv 5"/>
+          <p:cNvPr id="6" name="Slide Number Placeholder 5"/>
           <p:cNvSpPr>
             <a:spLocks noGrp="1"/>
           </p:cNvSpPr>
@@ -1134,11 +1480,6 @@
         </p:txBody>
       </p:sp>
     </p:spTree>
-    <p:extLst>
-      <p:ext uri="{BB962C8B-B14F-4D97-AF65-F5344CB8AC3E}">
-        <p14:creationId xmlns:p14="http://schemas.microsoft.com/office/powerpoint/2010/main" val="4195911037"/>
-      </p:ext>
-    </p:extLst>
   </p:cSld>
   <p:clrMapOvr>
     <a:masterClrMapping/>
@@ -1165,7 +1506,7 @@
       </p:grpSpPr>
       <p:sp>
         <p:nvSpPr>
-          <p:cNvPr id="2" name="Titlu 1"/>
+          <p:cNvPr id="2" name="Title 1"/>
           <p:cNvSpPr>
             <a:spLocks noGrp="1"/>
           </p:cNvSpPr>
@@ -1188,7 +1529,7 @@
       </p:sp>
       <p:sp>
         <p:nvSpPr>
-          <p:cNvPr id="3" name="Substituent conținut 2"/>
+          <p:cNvPr id="3" name="Content Placeholder 2"/>
           <p:cNvSpPr>
             <a:spLocks noGrp="1"/>
           </p:cNvSpPr>
@@ -1198,8 +1539,8 @@
         </p:nvSpPr>
         <p:spPr>
           <a:xfrm>
-            <a:off x="457200" y="1600200"/>
-            <a:ext cx="4038600" cy="4525963"/>
+            <a:off x="457200" y="1536192"/>
+            <a:ext cx="3657600" cy="4590288"/>
           </a:xfrm>
         </p:spPr>
         <p:txBody>
@@ -1267,13 +1608,13 @@
               <a:rPr lang="ro-RO" smtClean="0"/>
               <a:t>Al cincilea nivel</a:t>
             </a:r>
-            <a:endParaRPr lang="en-US"/>
-          </a:p>
-        </p:txBody>
-      </p:sp>
-      <p:sp>
-        <p:nvSpPr>
-          <p:cNvPr id="4" name="Substituent conținut 3"/>
+            <a:endParaRPr lang="en-US" dirty="0"/>
+          </a:p>
+        </p:txBody>
+      </p:sp>
+      <p:sp>
+        <p:nvSpPr>
+          <p:cNvPr id="4" name="Content Placeholder 3"/>
           <p:cNvSpPr>
             <a:spLocks noGrp="1"/>
           </p:cNvSpPr>
@@ -1283,8 +1624,8 @@
         </p:nvSpPr>
         <p:spPr>
           <a:xfrm>
-            <a:off x="4648200" y="1600200"/>
-            <a:ext cx="4038600" cy="4525963"/>
+            <a:off x="4419600" y="1536192"/>
+            <a:ext cx="3657600" cy="4590288"/>
           </a:xfrm>
         </p:spPr>
         <p:txBody>
@@ -1352,13 +1693,13 @@
               <a:rPr lang="ro-RO" smtClean="0"/>
               <a:t>Al cincilea nivel</a:t>
             </a:r>
-            <a:endParaRPr lang="en-US"/>
-          </a:p>
-        </p:txBody>
-      </p:sp>
-      <p:sp>
-        <p:nvSpPr>
-          <p:cNvPr id="5" name="Substituent dată 4"/>
+            <a:endParaRPr lang="en-US" dirty="0"/>
+          </a:p>
+        </p:txBody>
+      </p:sp>
+      <p:sp>
+        <p:nvSpPr>
+          <p:cNvPr id="5" name="Date Placeholder 4"/>
           <p:cNvSpPr>
             <a:spLocks noGrp="1"/>
           </p:cNvSpPr>
@@ -1373,7 +1714,7 @@
           <a:p>
             <a:fld id="{179DE077-2B25-4D43-8A5F-B5A94BA1672D}" type="datetimeFigureOut">
               <a:rPr lang="en-US" smtClean="0"/>
-              <a:t>18-Jun-19</a:t>
+              <a:t>21-Jun-19</a:t>
             </a:fld>
             <a:endParaRPr lang="en-US"/>
           </a:p>
@@ -1381,7 +1722,7 @@
       </p:sp>
       <p:sp>
         <p:nvSpPr>
-          <p:cNvPr id="6" name="Substituent subsol 5"/>
+          <p:cNvPr id="6" name="Footer Placeholder 5"/>
           <p:cNvSpPr>
             <a:spLocks noGrp="1"/>
           </p:cNvSpPr>
@@ -1400,7 +1741,7 @@
       </p:sp>
       <p:sp>
         <p:nvSpPr>
-          <p:cNvPr id="7" name="Substituent număr diapozitiv 6"/>
+          <p:cNvPr id="7" name="Slide Number Placeholder 6"/>
           <p:cNvSpPr>
             <a:spLocks noGrp="1"/>
           </p:cNvSpPr>
@@ -1422,11 +1763,6 @@
         </p:txBody>
       </p:sp>
     </p:spTree>
-    <p:extLst>
-      <p:ext uri="{BB962C8B-B14F-4D97-AF65-F5344CB8AC3E}">
-        <p14:creationId xmlns:p14="http://schemas.microsoft.com/office/powerpoint/2010/main" val="3046397833"/>
-      </p:ext>
-    </p:extLst>
   </p:cSld>
   <p:clrMapOvr>
     <a:masterClrMapping/>
@@ -1453,7 +1789,7 @@
       </p:grpSpPr>
       <p:sp>
         <p:nvSpPr>
-          <p:cNvPr id="2" name="Titlu 1"/>
+          <p:cNvPr id="2" name="Title 1"/>
           <p:cNvSpPr>
             <a:spLocks noGrp="1"/>
           </p:cNvSpPr>
@@ -1480,7 +1816,7 @@
       </p:sp>
       <p:sp>
         <p:nvSpPr>
-          <p:cNvPr id="3" name="Substituent text 2"/>
+          <p:cNvPr id="3" name="Text Placeholder 2"/>
           <p:cNvSpPr>
             <a:spLocks noGrp="1"/>
           </p:cNvSpPr>
@@ -1491,15 +1827,21 @@
         <p:spPr>
           <a:xfrm>
             <a:off x="457200" y="1535113"/>
-            <a:ext cx="4040188" cy="639762"/>
+            <a:ext cx="3657600" cy="639762"/>
           </a:xfrm>
         </p:spPr>
         <p:txBody>
-          <a:bodyPr anchor="b"/>
+          <a:bodyPr anchor="b">
+            <a:noAutofit/>
+          </a:bodyPr>
           <a:lstStyle>
-            <a:lvl1pPr marL="0" indent="0">
-              <a:buNone/>
-              <a:defRPr sz="2400" b="1"/>
+            <a:lvl1pPr marL="0" indent="0" algn="ctr">
+              <a:buNone/>
+              <a:defRPr sz="2000" b="1">
+                <a:solidFill>
+                  <a:schemeClr val="tx2"/>
+                </a:solidFill>
+              </a:defRPr>
             </a:lvl1pPr>
             <a:lvl2pPr marL="457200" indent="0">
               <a:buNone/>
@@ -1545,7 +1887,7 @@
       </p:sp>
       <p:sp>
         <p:nvSpPr>
-          <p:cNvPr id="4" name="Substituent conținut 3"/>
+          <p:cNvPr id="4" name="Content Placeholder 3"/>
           <p:cNvSpPr>
             <a:spLocks noGrp="1"/>
           </p:cNvSpPr>
@@ -1556,7 +1898,7 @@
         <p:spPr>
           <a:xfrm>
             <a:off x="457200" y="2174875"/>
-            <a:ext cx="4040188" cy="3951288"/>
+            <a:ext cx="3657600" cy="3951288"/>
           </a:xfrm>
         </p:spPr>
         <p:txBody>
@@ -1624,13 +1966,13 @@
               <a:rPr lang="ro-RO" smtClean="0"/>
               <a:t>Al cincilea nivel</a:t>
             </a:r>
-            <a:endParaRPr lang="en-US"/>
-          </a:p>
-        </p:txBody>
-      </p:sp>
-      <p:sp>
-        <p:nvSpPr>
-          <p:cNvPr id="5" name="Substituent text 4"/>
+            <a:endParaRPr lang="en-US" dirty="0"/>
+          </a:p>
+        </p:txBody>
+      </p:sp>
+      <p:sp>
+        <p:nvSpPr>
+          <p:cNvPr id="5" name="Text Placeholder 4"/>
           <p:cNvSpPr>
             <a:spLocks noGrp="1"/>
           </p:cNvSpPr>
@@ -1640,16 +1982,22 @@
         </p:nvSpPr>
         <p:spPr>
           <a:xfrm>
-            <a:off x="4645025" y="1535113"/>
-            <a:ext cx="4041775" cy="639762"/>
+            <a:off x="4419600" y="1535113"/>
+            <a:ext cx="3657600" cy="639762"/>
           </a:xfrm>
         </p:spPr>
         <p:txBody>
-          <a:bodyPr anchor="b"/>
+          <a:bodyPr anchor="b">
+            <a:noAutofit/>
+          </a:bodyPr>
           <a:lstStyle>
-            <a:lvl1pPr marL="0" indent="0">
-              <a:buNone/>
-              <a:defRPr sz="2400" b="1"/>
+            <a:lvl1pPr marL="0" indent="0" algn="ctr">
+              <a:buNone/>
+              <a:defRPr sz="2000" b="1">
+                <a:solidFill>
+                  <a:schemeClr val="tx2"/>
+                </a:solidFill>
+              </a:defRPr>
             </a:lvl1pPr>
             <a:lvl2pPr marL="457200" indent="0">
               <a:buNone/>
@@ -1695,7 +2043,7 @@
       </p:sp>
       <p:sp>
         <p:nvSpPr>
-          <p:cNvPr id="6" name="Substituent conținut 5"/>
+          <p:cNvPr id="6" name="Content Placeholder 5"/>
           <p:cNvSpPr>
             <a:spLocks noGrp="1"/>
           </p:cNvSpPr>
@@ -1705,8 +2053,8 @@
         </p:nvSpPr>
         <p:spPr>
           <a:xfrm>
-            <a:off x="4645025" y="2174875"/>
-            <a:ext cx="4041775" cy="3951288"/>
+            <a:off x="4419600" y="2174875"/>
+            <a:ext cx="3657600" cy="3951288"/>
           </a:xfrm>
         </p:spPr>
         <p:txBody>
@@ -1780,7 +2128,7 @@
       </p:sp>
       <p:sp>
         <p:nvSpPr>
-          <p:cNvPr id="7" name="Substituent dată 6"/>
+          <p:cNvPr id="7" name="Date Placeholder 6"/>
           <p:cNvSpPr>
             <a:spLocks noGrp="1"/>
           </p:cNvSpPr>
@@ -1795,7 +2143,7 @@
           <a:p>
             <a:fld id="{179DE077-2B25-4D43-8A5F-B5A94BA1672D}" type="datetimeFigureOut">
               <a:rPr lang="en-US" smtClean="0"/>
-              <a:t>18-Jun-19</a:t>
+              <a:t>21-Jun-19</a:t>
             </a:fld>
             <a:endParaRPr lang="en-US"/>
           </a:p>
@@ -1803,7 +2151,7 @@
       </p:sp>
       <p:sp>
         <p:nvSpPr>
-          <p:cNvPr id="8" name="Substituent subsol 7"/>
+          <p:cNvPr id="8" name="Footer Placeholder 7"/>
           <p:cNvSpPr>
             <a:spLocks noGrp="1"/>
           </p:cNvSpPr>
@@ -1822,7 +2170,7 @@
       </p:sp>
       <p:sp>
         <p:nvSpPr>
-          <p:cNvPr id="9" name="Substituent număr diapozitiv 8"/>
+          <p:cNvPr id="9" name="Slide Number Placeholder 8"/>
           <p:cNvSpPr>
             <a:spLocks noGrp="1"/>
           </p:cNvSpPr>
@@ -1844,11 +2192,6 @@
         </p:txBody>
       </p:sp>
     </p:spTree>
-    <p:extLst>
-      <p:ext uri="{BB962C8B-B14F-4D97-AF65-F5344CB8AC3E}">
-        <p14:creationId xmlns:p14="http://schemas.microsoft.com/office/powerpoint/2010/main" val="4060009656"/>
-      </p:ext>
-    </p:extLst>
   </p:cSld>
   <p:clrMapOvr>
     <a:masterClrMapping/>
@@ -1875,7 +2218,7 @@
       </p:grpSpPr>
       <p:sp>
         <p:nvSpPr>
-          <p:cNvPr id="2" name="Titlu 1"/>
+          <p:cNvPr id="2" name="Title 1"/>
           <p:cNvSpPr>
             <a:spLocks noGrp="1"/>
           </p:cNvSpPr>
@@ -1898,7 +2241,7 @@
       </p:sp>
       <p:sp>
         <p:nvSpPr>
-          <p:cNvPr id="3" name="Substituent dată 2"/>
+          <p:cNvPr id="3" name="Date Placeholder 2"/>
           <p:cNvSpPr>
             <a:spLocks noGrp="1"/>
           </p:cNvSpPr>
@@ -1913,7 +2256,7 @@
           <a:p>
             <a:fld id="{179DE077-2B25-4D43-8A5F-B5A94BA1672D}" type="datetimeFigureOut">
               <a:rPr lang="en-US" smtClean="0"/>
-              <a:t>18-Jun-19</a:t>
+              <a:t>21-Jun-19</a:t>
             </a:fld>
             <a:endParaRPr lang="en-US"/>
           </a:p>
@@ -1921,7 +2264,7 @@
       </p:sp>
       <p:sp>
         <p:nvSpPr>
-          <p:cNvPr id="4" name="Substituent subsol 3"/>
+          <p:cNvPr id="4" name="Footer Placeholder 3"/>
           <p:cNvSpPr>
             <a:spLocks noGrp="1"/>
           </p:cNvSpPr>
@@ -1940,7 +2283,7 @@
       </p:sp>
       <p:sp>
         <p:nvSpPr>
-          <p:cNvPr id="5" name="Substituent număr diapozitiv 4"/>
+          <p:cNvPr id="5" name="Slide Number Placeholder 4"/>
           <p:cNvSpPr>
             <a:spLocks noGrp="1"/>
           </p:cNvSpPr>
@@ -1962,11 +2305,6 @@
         </p:txBody>
       </p:sp>
     </p:spTree>
-    <p:extLst>
-      <p:ext uri="{BB962C8B-B14F-4D97-AF65-F5344CB8AC3E}">
-        <p14:creationId xmlns:p14="http://schemas.microsoft.com/office/powerpoint/2010/main" val="1944657642"/>
-      </p:ext>
-    </p:extLst>
   </p:cSld>
   <p:clrMapOvr>
     <a:masterClrMapping/>
@@ -1993,7 +2331,7 @@
       </p:grpSpPr>
       <p:sp>
         <p:nvSpPr>
-          <p:cNvPr id="2" name="Substituent dată 1"/>
+          <p:cNvPr id="2" name="Date Placeholder 1"/>
           <p:cNvSpPr>
             <a:spLocks noGrp="1"/>
           </p:cNvSpPr>
@@ -2008,7 +2346,7 @@
           <a:p>
             <a:fld id="{179DE077-2B25-4D43-8A5F-B5A94BA1672D}" type="datetimeFigureOut">
               <a:rPr lang="en-US" smtClean="0"/>
-              <a:t>18-Jun-19</a:t>
+              <a:t>21-Jun-19</a:t>
             </a:fld>
             <a:endParaRPr lang="en-US"/>
           </a:p>
@@ -2016,7 +2354,7 @@
       </p:sp>
       <p:sp>
         <p:nvSpPr>
-          <p:cNvPr id="3" name="Substituent subsol 2"/>
+          <p:cNvPr id="3" name="Footer Placeholder 2"/>
           <p:cNvSpPr>
             <a:spLocks noGrp="1"/>
           </p:cNvSpPr>
@@ -2035,7 +2373,7 @@
       </p:sp>
       <p:sp>
         <p:nvSpPr>
-          <p:cNvPr id="4" name="Substituent număr diapozitiv 3"/>
+          <p:cNvPr id="4" name="Slide Number Placeholder 3"/>
           <p:cNvSpPr>
             <a:spLocks noGrp="1"/>
           </p:cNvSpPr>
@@ -2057,11 +2395,6 @@
         </p:txBody>
       </p:sp>
     </p:spTree>
-    <p:extLst>
-      <p:ext uri="{BB962C8B-B14F-4D97-AF65-F5344CB8AC3E}">
-        <p14:creationId xmlns:p14="http://schemas.microsoft.com/office/powerpoint/2010/main" val="2611679662"/>
-      </p:ext>
-    </p:extLst>
   </p:cSld>
   <p:clrMapOvr>
     <a:masterClrMapping/>
@@ -2088,7 +2421,7 @@
       </p:grpSpPr>
       <p:sp>
         <p:nvSpPr>
-          <p:cNvPr id="2" name="Titlu 1"/>
+          <p:cNvPr id="2" name="Title 1"/>
           <p:cNvSpPr>
             <a:spLocks noGrp="1"/>
           </p:cNvSpPr>
@@ -2098,15 +2431,15 @@
         </p:nvSpPr>
         <p:spPr>
           <a:xfrm>
-            <a:off x="457200" y="273050"/>
-            <a:ext cx="3008313" cy="1162050"/>
+            <a:off x="304801" y="5495544"/>
+            <a:ext cx="7772400" cy="594360"/>
           </a:xfrm>
         </p:spPr>
         <p:txBody>
           <a:bodyPr anchor="b"/>
           <a:lstStyle>
-            <a:lvl1pPr algn="l">
-              <a:defRPr sz="2000" b="1"/>
+            <a:lvl1pPr algn="ctr">
+              <a:defRPr sz="2200" b="1"/>
             </a:lvl1pPr>
           </a:lstStyle>
           <a:p>
@@ -2114,117 +2447,34 @@
               <a:rPr lang="ro-RO" smtClean="0"/>
               <a:t>Clic pentru editare stil titlu</a:t>
             </a:r>
-            <a:endParaRPr lang="en-US"/>
-          </a:p>
-        </p:txBody>
-      </p:sp>
-      <p:sp>
-        <p:nvSpPr>
-          <p:cNvPr id="3" name="Substituent conținut 2"/>
-          <p:cNvSpPr>
-            <a:spLocks noGrp="1"/>
-          </p:cNvSpPr>
-          <p:nvPr>
-            <p:ph idx="1"/>
+            <a:endParaRPr lang="en-US" dirty="0"/>
+          </a:p>
+        </p:txBody>
+      </p:sp>
+      <p:sp>
+        <p:nvSpPr>
+          <p:cNvPr id="4" name="Text Placeholder 3"/>
+          <p:cNvSpPr>
+            <a:spLocks noGrp="1"/>
+          </p:cNvSpPr>
+          <p:nvPr>
+            <p:ph type="body" sz="half" idx="2"/>
           </p:nvPr>
         </p:nvSpPr>
         <p:spPr>
           <a:xfrm>
-            <a:off x="3575050" y="273050"/>
-            <a:ext cx="5111750" cy="5853113"/>
+            <a:off x="304799" y="6096000"/>
+            <a:ext cx="7772401" cy="609600"/>
           </a:xfrm>
         </p:spPr>
         <p:txBody>
-          <a:bodyPr/>
+          <a:bodyPr>
+            <a:normAutofit/>
+          </a:bodyPr>
           <a:lstStyle>
-            <a:lvl1pPr>
-              <a:defRPr sz="3200"/>
-            </a:lvl1pPr>
-            <a:lvl2pPr>
-              <a:defRPr sz="2800"/>
-            </a:lvl2pPr>
-            <a:lvl3pPr>
-              <a:defRPr sz="2400"/>
-            </a:lvl3pPr>
-            <a:lvl4pPr>
-              <a:defRPr sz="2000"/>
-            </a:lvl4pPr>
-            <a:lvl5pPr>
-              <a:defRPr sz="2000"/>
-            </a:lvl5pPr>
-            <a:lvl6pPr>
-              <a:defRPr sz="2000"/>
-            </a:lvl6pPr>
-            <a:lvl7pPr>
-              <a:defRPr sz="2000"/>
-            </a:lvl7pPr>
-            <a:lvl8pPr>
-              <a:defRPr sz="2000"/>
-            </a:lvl8pPr>
-            <a:lvl9pPr>
-              <a:defRPr sz="2000"/>
-            </a:lvl9pPr>
-          </a:lstStyle>
-          <a:p>
-            <a:pPr lvl="0"/>
-            <a:r>
-              <a:rPr lang="ro-RO" smtClean="0"/>
-              <a:t>Clic pentru editare stiluri text Coordonator</a:t>
-            </a:r>
-          </a:p>
-          <a:p>
-            <a:pPr lvl="1"/>
-            <a:r>
-              <a:rPr lang="ro-RO" smtClean="0"/>
-              <a:t>Al doilea nivel</a:t>
-            </a:r>
-          </a:p>
-          <a:p>
-            <a:pPr lvl="2"/>
-            <a:r>
-              <a:rPr lang="ro-RO" smtClean="0"/>
-              <a:t>Al treilea nivel</a:t>
-            </a:r>
-          </a:p>
-          <a:p>
-            <a:pPr lvl="3"/>
-            <a:r>
-              <a:rPr lang="ro-RO" smtClean="0"/>
-              <a:t>Al patrulea nivel</a:t>
-            </a:r>
-          </a:p>
-          <a:p>
-            <a:pPr lvl="4"/>
-            <a:r>
-              <a:rPr lang="ro-RO" smtClean="0"/>
-              <a:t>Al cincilea nivel</a:t>
-            </a:r>
-            <a:endParaRPr lang="en-US"/>
-          </a:p>
-        </p:txBody>
-      </p:sp>
-      <p:sp>
-        <p:nvSpPr>
-          <p:cNvPr id="4" name="Substituent text 3"/>
-          <p:cNvSpPr>
-            <a:spLocks noGrp="1"/>
-          </p:cNvSpPr>
-          <p:nvPr>
-            <p:ph type="body" sz="half" idx="2"/>
-          </p:nvPr>
-        </p:nvSpPr>
-        <p:spPr>
-          <a:xfrm>
-            <a:off x="457200" y="1435100"/>
-            <a:ext cx="3008313" cy="4691063"/>
-          </a:xfrm>
-        </p:spPr>
-        <p:txBody>
-          <a:bodyPr/>
-          <a:lstStyle>
-            <a:lvl1pPr marL="0" indent="0">
-              <a:buNone/>
-              <a:defRPr sz="1400"/>
+            <a:lvl1pPr marL="0" indent="0" algn="ctr">
+              <a:buNone/>
+              <a:defRPr sz="1600"/>
             </a:lvl1pPr>
             <a:lvl2pPr marL="457200" indent="0">
               <a:buNone/>
@@ -2270,7 +2520,7 @@
       </p:sp>
       <p:sp>
         <p:nvSpPr>
-          <p:cNvPr id="5" name="Substituent dată 4"/>
+          <p:cNvPr id="5" name="Date Placeholder 4"/>
           <p:cNvSpPr>
             <a:spLocks noGrp="1"/>
           </p:cNvSpPr>
@@ -2285,7 +2535,7 @@
           <a:p>
             <a:fld id="{179DE077-2B25-4D43-8A5F-B5A94BA1672D}" type="datetimeFigureOut">
               <a:rPr lang="en-US" smtClean="0"/>
-              <a:t>18-Jun-19</a:t>
+              <a:t>21-Jun-19</a:t>
             </a:fld>
             <a:endParaRPr lang="en-US"/>
           </a:p>
@@ -2293,7 +2543,7 @@
       </p:sp>
       <p:sp>
         <p:nvSpPr>
-          <p:cNvPr id="6" name="Substituent subsol 5"/>
+          <p:cNvPr id="6" name="Footer Placeholder 5"/>
           <p:cNvSpPr>
             <a:spLocks noGrp="1"/>
           </p:cNvSpPr>
@@ -2312,7 +2562,7 @@
       </p:sp>
       <p:sp>
         <p:nvSpPr>
-          <p:cNvPr id="7" name="Substituent număr diapozitiv 6"/>
+          <p:cNvPr id="7" name="Slide Number Placeholder 6"/>
           <p:cNvSpPr>
             <a:spLocks noGrp="1"/>
           </p:cNvSpPr>
@@ -2333,12 +2583,64 @@
           </a:p>
         </p:txBody>
       </p:sp>
+      <p:sp>
+        <p:nvSpPr>
+          <p:cNvPr id="9" name="Content Placeholder 8"/>
+          <p:cNvSpPr>
+            <a:spLocks noGrp="1"/>
+          </p:cNvSpPr>
+          <p:nvPr>
+            <p:ph sz="quarter" idx="13"/>
+          </p:nvPr>
+        </p:nvSpPr>
+        <p:spPr>
+          <a:xfrm>
+            <a:off x="304800" y="381000"/>
+            <a:ext cx="7772400" cy="4942840"/>
+          </a:xfrm>
+        </p:spPr>
+        <p:txBody>
+          <a:bodyPr/>
+          <a:lstStyle/>
+          <a:p>
+            <a:pPr lvl="0"/>
+            <a:r>
+              <a:rPr lang="ro-RO" smtClean="0"/>
+              <a:t>Clic pentru editare stiluri text Coordonator</a:t>
+            </a:r>
+          </a:p>
+          <a:p>
+            <a:pPr lvl="1"/>
+            <a:r>
+              <a:rPr lang="ro-RO" smtClean="0"/>
+              <a:t>Al doilea nivel</a:t>
+            </a:r>
+          </a:p>
+          <a:p>
+            <a:pPr lvl="2"/>
+            <a:r>
+              <a:rPr lang="ro-RO" smtClean="0"/>
+              <a:t>Al treilea nivel</a:t>
+            </a:r>
+          </a:p>
+          <a:p>
+            <a:pPr lvl="3"/>
+            <a:r>
+              <a:rPr lang="ro-RO" smtClean="0"/>
+              <a:t>Al patrulea nivel</a:t>
+            </a:r>
+          </a:p>
+          <a:p>
+            <a:pPr lvl="4"/>
+            <a:r>
+              <a:rPr lang="ro-RO" smtClean="0"/>
+              <a:t>Al cincilea nivel</a:t>
+            </a:r>
+            <a:endParaRPr lang="en-US"/>
+          </a:p>
+        </p:txBody>
+      </p:sp>
     </p:spTree>
-    <p:extLst>
-      <p:ext uri="{BB962C8B-B14F-4D97-AF65-F5344CB8AC3E}">
-        <p14:creationId xmlns:p14="http://schemas.microsoft.com/office/powerpoint/2010/main" val="519679451"/>
-      </p:ext>
-    </p:extLst>
   </p:cSld>
   <p:clrMapOvr>
     <a:masterClrMapping/>
@@ -2365,7 +2667,7 @@
       </p:grpSpPr>
       <p:sp>
         <p:nvSpPr>
-          <p:cNvPr id="2" name="Titlu 1"/>
+          <p:cNvPr id="2" name="Title 1"/>
           <p:cNvSpPr>
             <a:spLocks noGrp="1"/>
           </p:cNvSpPr>
@@ -2375,15 +2677,22 @@
         </p:nvSpPr>
         <p:spPr>
           <a:xfrm>
-            <a:off x="1792288" y="4800600"/>
-            <a:ext cx="5486400" cy="566738"/>
+            <a:off x="301752" y="5495278"/>
+            <a:ext cx="7772400" cy="594626"/>
           </a:xfrm>
         </p:spPr>
         <p:txBody>
           <a:bodyPr anchor="b"/>
           <a:lstStyle>
-            <a:lvl1pPr algn="l">
-              <a:defRPr sz="2000" b="1"/>
+            <a:lvl1pPr algn="ctr">
+              <a:defRPr sz="2200" b="1">
+                <a:ln>
+                  <a:noFill/>
+                </a:ln>
+                <a:solidFill>
+                  <a:schemeClr val="tx2"/>
+                </a:solidFill>
+              </a:defRPr>
             </a:lvl1pPr>
           </a:lstStyle>
           <a:p>
@@ -2391,13 +2700,13 @@
               <a:rPr lang="ro-RO" smtClean="0"/>
               <a:t>Clic pentru editare stil titlu</a:t>
             </a:r>
-            <a:endParaRPr lang="en-US"/>
-          </a:p>
-        </p:txBody>
-      </p:sp>
-      <p:sp>
-        <p:nvSpPr>
-          <p:cNvPr id="3" name="Substituent imagine 2"/>
+            <a:endParaRPr lang="en-US" dirty="0"/>
+          </a:p>
+        </p:txBody>
+      </p:sp>
+      <p:sp>
+        <p:nvSpPr>
+          <p:cNvPr id="3" name="Picture Placeholder 2"/>
           <p:cNvSpPr>
             <a:spLocks noGrp="1"/>
           </p:cNvSpPr>
@@ -2407,8 +2716,8 @@
         </p:nvSpPr>
         <p:spPr>
           <a:xfrm>
-            <a:off x="1792288" y="612775"/>
-            <a:ext cx="5486400" cy="4114800"/>
+            <a:off x="0" y="0"/>
+            <a:ext cx="8458200" cy="5486400"/>
           </a:xfrm>
         </p:spPr>
         <p:txBody>
@@ -2452,13 +2761,17 @@
             </a:lvl9pPr>
           </a:lstStyle>
           <a:p>
-            <a:endParaRPr lang="en-US"/>
-          </a:p>
-        </p:txBody>
-      </p:sp>
-      <p:sp>
-        <p:nvSpPr>
-          <p:cNvPr id="4" name="Substituent text 3"/>
+            <a:r>
+              <a:rPr lang="ro-RO" smtClean="0"/>
+              <a:t>Faceți clic pe pictogramă pentru a adăuga o imagine</a:t>
+            </a:r>
+            <a:endParaRPr lang="en-US" dirty="0"/>
+          </a:p>
+        </p:txBody>
+      </p:sp>
+      <p:sp>
+        <p:nvSpPr>
+          <p:cNvPr id="4" name="Text Placeholder 3"/>
           <p:cNvSpPr>
             <a:spLocks noGrp="1"/>
           </p:cNvSpPr>
@@ -2468,16 +2781,18 @@
         </p:nvSpPr>
         <p:spPr>
           <a:xfrm>
-            <a:off x="1792288" y="5367338"/>
-            <a:ext cx="5486400" cy="804862"/>
+            <a:off x="301752" y="6096000"/>
+            <a:ext cx="7772400" cy="612648"/>
           </a:xfrm>
         </p:spPr>
         <p:txBody>
-          <a:bodyPr/>
+          <a:bodyPr>
+            <a:normAutofit/>
+          </a:bodyPr>
           <a:lstStyle>
-            <a:lvl1pPr marL="0" indent="0">
-              <a:buNone/>
-              <a:defRPr sz="1400"/>
+            <a:lvl1pPr marL="0" indent="0" algn="ctr">
+              <a:buNone/>
+              <a:defRPr sz="1600"/>
             </a:lvl1pPr>
             <a:lvl2pPr marL="457200" indent="0">
               <a:buNone/>
@@ -2523,7 +2838,7 @@
       </p:sp>
       <p:sp>
         <p:nvSpPr>
-          <p:cNvPr id="5" name="Substituent dată 4"/>
+          <p:cNvPr id="8" name="Date Placeholder 7"/>
           <p:cNvSpPr>
             <a:spLocks noGrp="1"/>
           </p:cNvSpPr>
@@ -2538,7 +2853,7 @@
           <a:p>
             <a:fld id="{179DE077-2B25-4D43-8A5F-B5A94BA1672D}" type="datetimeFigureOut">
               <a:rPr lang="en-US" smtClean="0"/>
-              <a:t>18-Jun-19</a:t>
+              <a:t>21-Jun-19</a:t>
             </a:fld>
             <a:endParaRPr lang="en-US"/>
           </a:p>
@@ -2546,31 +2861,12 @@
       </p:sp>
       <p:sp>
         <p:nvSpPr>
-          <p:cNvPr id="6" name="Substituent subsol 5"/>
-          <p:cNvSpPr>
-            <a:spLocks noGrp="1"/>
-          </p:cNvSpPr>
-          <p:nvPr>
-            <p:ph type="ftr" sz="quarter" idx="11"/>
-          </p:nvPr>
-        </p:nvSpPr>
-        <p:spPr/>
-        <p:txBody>
-          <a:bodyPr/>
-          <a:lstStyle/>
-          <a:p>
-            <a:endParaRPr lang="en-US"/>
-          </a:p>
-        </p:txBody>
-      </p:sp>
-      <p:sp>
-        <p:nvSpPr>
-          <p:cNvPr id="7" name="Substituent număr diapozitiv 6"/>
-          <p:cNvSpPr>
-            <a:spLocks noGrp="1"/>
-          </p:cNvSpPr>
-          <p:nvPr>
-            <p:ph type="sldNum" sz="quarter" idx="12"/>
+          <p:cNvPr id="9" name="Slide Number Placeholder 8"/>
+          <p:cNvSpPr>
+            <a:spLocks noGrp="1"/>
+          </p:cNvSpPr>
+          <p:nvPr>
+            <p:ph type="sldNum" sz="quarter" idx="11"/>
           </p:nvPr>
         </p:nvSpPr>
         <p:spPr/>
@@ -2586,12 +2882,26 @@
           </a:p>
         </p:txBody>
       </p:sp>
+      <p:sp>
+        <p:nvSpPr>
+          <p:cNvPr id="10" name="Footer Placeholder 9"/>
+          <p:cNvSpPr>
+            <a:spLocks noGrp="1"/>
+          </p:cNvSpPr>
+          <p:nvPr>
+            <p:ph type="ftr" sz="quarter" idx="12"/>
+          </p:nvPr>
+        </p:nvSpPr>
+        <p:spPr/>
+        <p:txBody>
+          <a:bodyPr/>
+          <a:lstStyle/>
+          <a:p>
+            <a:endParaRPr lang="en-US"/>
+          </a:p>
+        </p:txBody>
+      </p:sp>
     </p:spTree>
-    <p:extLst>
-      <p:ext uri="{BB962C8B-B14F-4D97-AF65-F5344CB8AC3E}">
-        <p14:creationId xmlns:p14="http://schemas.microsoft.com/office/powerpoint/2010/main" val="4138665924"/>
-      </p:ext>
-    </p:extLst>
   </p:cSld>
   <p:clrMapOvr>
     <a:masterClrMapping/>
@@ -2603,7 +2913,7 @@
 <p:sldMaster xmlns:a="http://schemas.openxmlformats.org/drawingml/2006/main" xmlns:r="http://schemas.openxmlformats.org/officeDocument/2006/relationships" xmlns:p="http://schemas.openxmlformats.org/presentationml/2006/main">
   <p:cSld>
     <p:bg>
-      <p:bgRef idx="1001">
+      <p:bgRef idx="1002">
         <a:schemeClr val="bg1"/>
       </p:bgRef>
     </p:bg>
@@ -2623,7 +2933,7 @@
       </p:grpSpPr>
       <p:sp>
         <p:nvSpPr>
-          <p:cNvPr id="2" name="Substituent titlu 1"/>
+          <p:cNvPr id="2" name="Title Placeholder 1"/>
           <p:cNvSpPr>
             <a:spLocks noGrp="1"/>
           </p:cNvSpPr>
@@ -2634,7 +2944,7 @@
         <p:spPr>
           <a:xfrm>
             <a:off x="457200" y="274638"/>
-            <a:ext cx="8229600" cy="1143000"/>
+            <a:ext cx="7620000" cy="1143000"/>
           </a:xfrm>
           <a:prstGeom prst="rect">
             <a:avLst/>
@@ -2642,7 +2952,7 @@
         </p:spPr>
         <p:txBody>
           <a:bodyPr vert="horz" lIns="91440" tIns="45720" rIns="91440" bIns="45720" rtlCol="0" anchor="ctr">
-            <a:normAutofit/>
+            <a:noAutofit/>
           </a:bodyPr>
           <a:lstStyle/>
           <a:p>
@@ -2650,13 +2960,13 @@
               <a:rPr lang="ro-RO" smtClean="0"/>
               <a:t>Clic pentru editare stil titlu</a:t>
             </a:r>
-            <a:endParaRPr lang="en-US"/>
-          </a:p>
-        </p:txBody>
-      </p:sp>
-      <p:sp>
-        <p:nvSpPr>
-          <p:cNvPr id="3" name="Substituent text 2"/>
+            <a:endParaRPr lang="en-US" dirty="0"/>
+          </a:p>
+        </p:txBody>
+      </p:sp>
+      <p:sp>
+        <p:nvSpPr>
+          <p:cNvPr id="3" name="Text Placeholder 2"/>
           <p:cNvSpPr>
             <a:spLocks noGrp="1"/>
           </p:cNvSpPr>
@@ -2667,7 +2977,7 @@
         <p:spPr>
           <a:xfrm>
             <a:off x="457200" y="1600200"/>
-            <a:ext cx="8229600" cy="4525963"/>
+            <a:ext cx="7620000" cy="4800600"/>
           </a:xfrm>
           <a:prstGeom prst="rect">
             <a:avLst/>
@@ -2712,24 +3022,162 @@
               <a:rPr lang="ro-RO" smtClean="0"/>
               <a:t>Al cincilea nivel</a:t>
             </a:r>
-            <a:endParaRPr lang="en-US"/>
-          </a:p>
-        </p:txBody>
-      </p:sp>
-      <p:sp>
-        <p:nvSpPr>
-          <p:cNvPr id="4" name="Substituent dată 3"/>
-          <p:cNvSpPr>
-            <a:spLocks noGrp="1"/>
-          </p:cNvSpPr>
-          <p:nvPr>
-            <p:ph type="dt" sz="half" idx="2"/>
-          </p:nvPr>
+            <a:endParaRPr lang="en-US" dirty="0"/>
+          </a:p>
+        </p:txBody>
+      </p:sp>
+      <p:sp>
+        <p:nvSpPr>
+          <p:cNvPr id="7" name="Rectangle 6"/>
+          <p:cNvSpPr/>
+          <p:nvPr/>
         </p:nvSpPr>
         <p:spPr>
           <a:xfrm>
-            <a:off x="457200" y="6356350"/>
-            <a:ext cx="2133600" cy="365125"/>
+            <a:off x="8458200" y="0"/>
+            <a:ext cx="685800" cy="6858000"/>
+          </a:xfrm>
+          <a:prstGeom prst="rect">
+            <a:avLst/>
+          </a:prstGeom>
+          <a:solidFill>
+            <a:schemeClr val="tx2"/>
+          </a:solidFill>
+          <a:ln>
+            <a:noFill/>
+          </a:ln>
+        </p:spPr>
+        <p:style>
+          <a:lnRef idx="2">
+            <a:schemeClr val="accent1">
+              <a:shade val="50000"/>
+            </a:schemeClr>
+          </a:lnRef>
+          <a:fillRef idx="1">
+            <a:schemeClr val="accent1"/>
+          </a:fillRef>
+          <a:effectRef idx="0">
+            <a:schemeClr val="accent1"/>
+          </a:effectRef>
+          <a:fontRef idx="minor">
+            <a:schemeClr val="lt1"/>
+          </a:fontRef>
+        </p:style>
+        <p:txBody>
+          <a:bodyPr rtlCol="0" anchor="ctr"/>
+          <a:lstStyle/>
+          <a:p>
+            <a:pPr algn="ctr"/>
+            <a:endParaRPr lang="en-US"/>
+          </a:p>
+        </p:txBody>
+      </p:sp>
+      <p:sp>
+        <p:nvSpPr>
+          <p:cNvPr id="8" name="Rectangle 7"/>
+          <p:cNvSpPr/>
+          <p:nvPr/>
+        </p:nvSpPr>
+        <p:spPr>
+          <a:xfrm>
+            <a:off x="8458200" y="5486400"/>
+            <a:ext cx="685800" cy="685800"/>
+          </a:xfrm>
+          <a:prstGeom prst="rect">
+            <a:avLst/>
+          </a:prstGeom>
+          <a:solidFill>
+            <a:schemeClr val="accent1"/>
+          </a:solidFill>
+          <a:ln>
+            <a:noFill/>
+          </a:ln>
+        </p:spPr>
+        <p:style>
+          <a:lnRef idx="2">
+            <a:schemeClr val="accent1">
+              <a:shade val="50000"/>
+            </a:schemeClr>
+          </a:lnRef>
+          <a:fillRef idx="1">
+            <a:schemeClr val="accent1"/>
+          </a:fillRef>
+          <a:effectRef idx="0">
+            <a:schemeClr val="accent1"/>
+          </a:effectRef>
+          <a:fontRef idx="minor">
+            <a:schemeClr val="lt1"/>
+          </a:fontRef>
+        </p:style>
+        <p:txBody>
+          <a:bodyPr rtlCol="0" anchor="ctr"/>
+          <a:lstStyle/>
+          <a:p>
+            <a:pPr algn="ctr"/>
+            <a:endParaRPr lang="en-US"/>
+          </a:p>
+        </p:txBody>
+      </p:sp>
+      <p:sp>
+        <p:nvSpPr>
+          <p:cNvPr id="6" name="Slide Number Placeholder 5"/>
+          <p:cNvSpPr>
+            <a:spLocks noGrp="1"/>
+          </p:cNvSpPr>
+          <p:nvPr>
+            <p:ph type="sldNum" sz="quarter" idx="4"/>
+          </p:nvPr>
+        </p:nvSpPr>
+        <p:spPr>
+          <a:xfrm>
+            <a:off x="8531788" y="5648960"/>
+            <a:ext cx="548640" cy="396240"/>
+          </a:xfrm>
+          <a:prstGeom prst="bracketPair">
+            <a:avLst>
+              <a:gd name="adj" fmla="val 17949"/>
+            </a:avLst>
+          </a:prstGeom>
+          <a:ln w="19050">
+            <a:solidFill>
+              <a:srgbClr val="FFFFFF"/>
+            </a:solidFill>
+          </a:ln>
+        </p:spPr>
+        <p:txBody>
+          <a:bodyPr vert="horz" lIns="0" tIns="0" rIns="0" bIns="0" rtlCol="0" anchor="ctr"/>
+          <a:lstStyle>
+            <a:lvl1pPr algn="ctr">
+              <a:defRPr sz="1800">
+                <a:solidFill>
+                  <a:srgbClr val="FFFFFF"/>
+                </a:solidFill>
+              </a:defRPr>
+            </a:lvl1pPr>
+          </a:lstStyle>
+          <a:p>
+            <a:fld id="{9F855DB4-963A-454A-9663-37B456B468AD}" type="slidenum">
+              <a:rPr lang="en-US" smtClean="0"/>
+              <a:t>‹#›</a:t>
+            </a:fld>
+            <a:endParaRPr lang="en-US"/>
+          </a:p>
+        </p:txBody>
+      </p:sp>
+      <p:sp>
+        <p:nvSpPr>
+          <p:cNvPr id="5" name="Footer Placeholder 4"/>
+          <p:cNvSpPr>
+            <a:spLocks noGrp="1"/>
+          </p:cNvSpPr>
+          <p:nvPr>
+            <p:ph type="ftr" sz="quarter" idx="3"/>
+          </p:nvPr>
+        </p:nvSpPr>
+        <p:spPr>
+          <a:xfrm rot="16200000">
+            <a:off x="7586910" y="4048760"/>
+            <a:ext cx="2367281" cy="365760"/>
           </a:xfrm>
           <a:prstGeom prst="rect">
             <a:avLst/>
@@ -2738,39 +3186,33 @@
         <p:txBody>
           <a:bodyPr vert="horz" lIns="91440" tIns="45720" rIns="91440" bIns="45720" rtlCol="0" anchor="ctr"/>
           <a:lstStyle>
-            <a:lvl1pPr algn="l">
+            <a:lvl1pPr algn="r">
               <a:defRPr sz="1200">
                 <a:solidFill>
-                  <a:schemeClr val="tx1">
-                    <a:tint val="75000"/>
-                  </a:schemeClr>
+                  <a:schemeClr val="bg2"/>
                 </a:solidFill>
               </a:defRPr>
             </a:lvl1pPr>
           </a:lstStyle>
           <a:p>
-            <a:fld id="{179DE077-2B25-4D43-8A5F-B5A94BA1672D}" type="datetimeFigureOut">
-              <a:rPr lang="en-US" smtClean="0"/>
-              <a:t>18-Jun-19</a:t>
-            </a:fld>
             <a:endParaRPr lang="en-US"/>
           </a:p>
         </p:txBody>
       </p:sp>
       <p:sp>
         <p:nvSpPr>
-          <p:cNvPr id="5" name="Substituent subsol 4"/>
-          <p:cNvSpPr>
-            <a:spLocks noGrp="1"/>
-          </p:cNvSpPr>
-          <p:nvPr>
-            <p:ph type="ftr" sz="quarter" idx="3"/>
+          <p:cNvPr id="4" name="Date Placeholder 3"/>
+          <p:cNvSpPr>
+            <a:spLocks noGrp="1"/>
+          </p:cNvSpPr>
+          <p:nvPr>
+            <p:ph type="dt" sz="half" idx="2"/>
           </p:nvPr>
         </p:nvSpPr>
         <p:spPr>
-          <a:xfrm>
-            <a:off x="3124200" y="6356350"/>
-            <a:ext cx="2895600" cy="365125"/>
+          <a:xfrm rot="16200000">
+            <a:off x="7551351" y="1645920"/>
+            <a:ext cx="2438399" cy="365760"/>
           </a:xfrm>
           <a:prstGeom prst="rect">
             <a:avLst/>
@@ -2779,94 +3221,54 @@
         <p:txBody>
           <a:bodyPr vert="horz" lIns="91440" tIns="45720" rIns="91440" bIns="45720" rtlCol="0" anchor="ctr"/>
           <a:lstStyle>
-            <a:lvl1pPr algn="ctr">
+            <a:lvl1pPr algn="l">
               <a:defRPr sz="1200">
                 <a:solidFill>
-                  <a:schemeClr val="tx1">
-                    <a:tint val="75000"/>
-                  </a:schemeClr>
+                  <a:schemeClr val="bg2"/>
                 </a:solidFill>
               </a:defRPr>
             </a:lvl1pPr>
           </a:lstStyle>
           <a:p>
-            <a:endParaRPr lang="en-US"/>
-          </a:p>
-        </p:txBody>
-      </p:sp>
-      <p:sp>
-        <p:nvSpPr>
-          <p:cNvPr id="6" name="Substituent număr diapozitiv 5"/>
-          <p:cNvSpPr>
-            <a:spLocks noGrp="1"/>
-          </p:cNvSpPr>
-          <p:nvPr>
-            <p:ph type="sldNum" sz="quarter" idx="4"/>
-          </p:nvPr>
-        </p:nvSpPr>
-        <p:spPr>
-          <a:xfrm>
-            <a:off x="6553200" y="6356350"/>
-            <a:ext cx="2133600" cy="365125"/>
-          </a:xfrm>
-          <a:prstGeom prst="rect">
-            <a:avLst/>
-          </a:prstGeom>
-        </p:spPr>
-        <p:txBody>
-          <a:bodyPr vert="horz" lIns="91440" tIns="45720" rIns="91440" bIns="45720" rtlCol="0" anchor="ctr"/>
-          <a:lstStyle>
-            <a:lvl1pPr algn="r">
-              <a:defRPr sz="1200">
-                <a:solidFill>
-                  <a:schemeClr val="tx1">
-                    <a:tint val="75000"/>
-                  </a:schemeClr>
-                </a:solidFill>
-              </a:defRPr>
-            </a:lvl1pPr>
-          </a:lstStyle>
-          <a:p>
-            <a:fld id="{9F855DB4-963A-454A-9663-37B456B468AD}" type="slidenum">
+            <a:fld id="{179DE077-2B25-4D43-8A5F-B5A94BA1672D}" type="datetimeFigureOut">
               <a:rPr lang="en-US" smtClean="0"/>
-              <a:t>‹#›</a:t>
+              <a:t>21-Jun-19</a:t>
             </a:fld>
             <a:endParaRPr lang="en-US"/>
           </a:p>
         </p:txBody>
       </p:sp>
     </p:spTree>
-    <p:extLst>
-      <p:ext uri="{BB962C8B-B14F-4D97-AF65-F5344CB8AC3E}">
-        <p14:creationId xmlns:p14="http://schemas.microsoft.com/office/powerpoint/2010/main" val="1741405076"/>
-      </p:ext>
-    </p:extLst>
   </p:cSld>
   <p:clrMap bg1="lt1" tx1="dk1" bg2="lt2" tx2="dk2" accent1="accent1" accent2="accent2" accent3="accent3" accent4="accent4" accent5="accent5" accent6="accent6" hlink="hlink" folHlink="folHlink"/>
   <p:sldLayoutIdLst>
-    <p:sldLayoutId id="2147483649" r:id="rId1"/>
-    <p:sldLayoutId id="2147483650" r:id="rId2"/>
-    <p:sldLayoutId id="2147483651" r:id="rId3"/>
-    <p:sldLayoutId id="2147483652" r:id="rId4"/>
-    <p:sldLayoutId id="2147483653" r:id="rId5"/>
-    <p:sldLayoutId id="2147483654" r:id="rId6"/>
-    <p:sldLayoutId id="2147483655" r:id="rId7"/>
-    <p:sldLayoutId id="2147483656" r:id="rId8"/>
-    <p:sldLayoutId id="2147483657" r:id="rId9"/>
-    <p:sldLayoutId id="2147483658" r:id="rId10"/>
-    <p:sldLayoutId id="2147483659" r:id="rId11"/>
+    <p:sldLayoutId id="2147484561" r:id="rId1"/>
+    <p:sldLayoutId id="2147484562" r:id="rId2"/>
+    <p:sldLayoutId id="2147484563" r:id="rId3"/>
+    <p:sldLayoutId id="2147484564" r:id="rId4"/>
+    <p:sldLayoutId id="2147484565" r:id="rId5"/>
+    <p:sldLayoutId id="2147484566" r:id="rId6"/>
+    <p:sldLayoutId id="2147484567" r:id="rId7"/>
+    <p:sldLayoutId id="2147484568" r:id="rId8"/>
+    <p:sldLayoutId id="2147484569" r:id="rId9"/>
+    <p:sldLayoutId id="2147484570" r:id="rId10"/>
+    <p:sldLayoutId id="2147484571" r:id="rId11"/>
   </p:sldLayoutIdLst>
   <p:txStyles>
     <p:titleStyle>
-      <a:lvl1pPr algn="ctr" defTabSz="914400" rtl="0" eaLnBrk="1" latinLnBrk="0" hangingPunct="1">
+      <a:lvl1pPr algn="l" defTabSz="914400" rtl="0" eaLnBrk="1" latinLnBrk="0" hangingPunct="1">
         <a:spcBef>
           <a:spcPct val="0"/>
         </a:spcBef>
         <a:buNone/>
-        <a:defRPr sz="4400" kern="1200">
+        <a:defRPr sz="4600" kern="1200" cap="none" spc="-100" baseline="0">
+          <a:ln>
+            <a:noFill/>
+          </a:ln>
           <a:solidFill>
-            <a:schemeClr val="tx1"/>
+            <a:schemeClr val="tx2"/>
           </a:solidFill>
+          <a:effectLst/>
           <a:latin typeface="+mj-lt"/>
           <a:ea typeface="+mj-ea"/>
           <a:cs typeface="+mj-cs"/>
@@ -2874,13 +3276,16 @@
       </a:lvl1pPr>
     </p:titleStyle>
     <p:bodyStyle>
-      <a:lvl1pPr marL="342900" indent="-342900" algn="l" defTabSz="914400" rtl="0" eaLnBrk="1" latinLnBrk="0" hangingPunct="1">
+      <a:lvl1pPr marL="342900" indent="-228600" algn="l" defTabSz="914400" rtl="0" eaLnBrk="1" latinLnBrk="0" hangingPunct="1">
         <a:spcBef>
           <a:spcPct val="20000"/>
         </a:spcBef>
+        <a:buClr>
+          <a:schemeClr val="accent1"/>
+        </a:buClr>
         <a:buFont typeface="Arial" pitchFamily="34" charset="0"/>
         <a:buChar char="•"/>
-        <a:defRPr sz="3200" kern="1200">
+        <a:defRPr sz="2200" kern="1200">
           <a:solidFill>
             <a:schemeClr val="tx1"/>
           </a:solidFill>
@@ -2889,70 +3294,13 @@
           <a:cs typeface="+mn-cs"/>
         </a:defRPr>
       </a:lvl1pPr>
-      <a:lvl2pPr marL="742950" indent="-285750" algn="l" defTabSz="914400" rtl="0" eaLnBrk="1" latinLnBrk="0" hangingPunct="1">
+      <a:lvl2pPr marL="640080" indent="-228600" algn="l" defTabSz="914400" rtl="0" eaLnBrk="1" latinLnBrk="0" hangingPunct="1">
         <a:spcBef>
           <a:spcPct val="20000"/>
         </a:spcBef>
-        <a:buFont typeface="Arial" pitchFamily="34" charset="0"/>
-        <a:buChar char="–"/>
-        <a:defRPr sz="2800" kern="1200">
-          <a:solidFill>
-            <a:schemeClr val="tx1"/>
-          </a:solidFill>
-          <a:latin typeface="+mn-lt"/>
-          <a:ea typeface="+mn-ea"/>
-          <a:cs typeface="+mn-cs"/>
-        </a:defRPr>
-      </a:lvl2pPr>
-      <a:lvl3pPr marL="1143000" indent="-228600" algn="l" defTabSz="914400" rtl="0" eaLnBrk="1" latinLnBrk="0" hangingPunct="1">
-        <a:spcBef>
-          <a:spcPct val="20000"/>
-        </a:spcBef>
-        <a:buFont typeface="Arial" pitchFamily="34" charset="0"/>
-        <a:buChar char="•"/>
-        <a:defRPr sz="2400" kern="1200">
-          <a:solidFill>
-            <a:schemeClr val="tx1"/>
-          </a:solidFill>
-          <a:latin typeface="+mn-lt"/>
-          <a:ea typeface="+mn-ea"/>
-          <a:cs typeface="+mn-cs"/>
-        </a:defRPr>
-      </a:lvl3pPr>
-      <a:lvl4pPr marL="1600200" indent="-228600" algn="l" defTabSz="914400" rtl="0" eaLnBrk="1" latinLnBrk="0" hangingPunct="1">
-        <a:spcBef>
-          <a:spcPct val="20000"/>
-        </a:spcBef>
-        <a:buFont typeface="Arial" pitchFamily="34" charset="0"/>
-        <a:buChar char="–"/>
-        <a:defRPr sz="2000" kern="1200">
-          <a:solidFill>
-            <a:schemeClr val="tx1"/>
-          </a:solidFill>
-          <a:latin typeface="+mn-lt"/>
-          <a:ea typeface="+mn-ea"/>
-          <a:cs typeface="+mn-cs"/>
-        </a:defRPr>
-      </a:lvl4pPr>
-      <a:lvl5pPr marL="2057400" indent="-228600" algn="l" defTabSz="914400" rtl="0" eaLnBrk="1" latinLnBrk="0" hangingPunct="1">
-        <a:spcBef>
-          <a:spcPct val="20000"/>
-        </a:spcBef>
-        <a:buFont typeface="Arial" pitchFamily="34" charset="0"/>
-        <a:buChar char="»"/>
-        <a:defRPr sz="2000" kern="1200">
-          <a:solidFill>
-            <a:schemeClr val="tx1"/>
-          </a:solidFill>
-          <a:latin typeface="+mn-lt"/>
-          <a:ea typeface="+mn-ea"/>
-          <a:cs typeface="+mn-cs"/>
-        </a:defRPr>
-      </a:lvl5pPr>
-      <a:lvl6pPr marL="2514600" indent="-228600" algn="l" defTabSz="914400" rtl="0" eaLnBrk="1" latinLnBrk="0" hangingPunct="1">
-        <a:spcBef>
-          <a:spcPct val="20000"/>
-        </a:spcBef>
+        <a:buClr>
+          <a:schemeClr val="accent2"/>
+        </a:buClr>
         <a:buFont typeface="Arial" pitchFamily="34" charset="0"/>
         <a:buChar char="•"/>
         <a:defRPr sz="2000" kern="1200">
@@ -2963,14 +3311,89 @@
           <a:ea typeface="+mn-ea"/>
           <a:cs typeface="+mn-cs"/>
         </a:defRPr>
-      </a:lvl6pPr>
-      <a:lvl7pPr marL="2971800" indent="-228600" algn="l" defTabSz="914400" rtl="0" eaLnBrk="1" latinLnBrk="0" hangingPunct="1">
+      </a:lvl2pPr>
+      <a:lvl3pPr marL="1005840" indent="-228600" algn="l" defTabSz="914400" rtl="0" eaLnBrk="1" latinLnBrk="0" hangingPunct="1">
         <a:spcBef>
           <a:spcPct val="20000"/>
         </a:spcBef>
+        <a:buClr>
+          <a:schemeClr val="accent3"/>
+        </a:buClr>
         <a:buFont typeface="Arial" pitchFamily="34" charset="0"/>
         <a:buChar char="•"/>
-        <a:defRPr sz="2000" kern="1200">
+        <a:defRPr sz="1800" kern="1200">
+          <a:solidFill>
+            <a:schemeClr val="tx1"/>
+          </a:solidFill>
+          <a:latin typeface="+mn-lt"/>
+          <a:ea typeface="+mn-ea"/>
+          <a:cs typeface="+mn-cs"/>
+        </a:defRPr>
+      </a:lvl3pPr>
+      <a:lvl4pPr marL="1280160" indent="-228600" algn="l" defTabSz="914400" rtl="0" eaLnBrk="1" latinLnBrk="0" hangingPunct="1">
+        <a:spcBef>
+          <a:spcPct val="20000"/>
+        </a:spcBef>
+        <a:buClr>
+          <a:schemeClr val="accent4"/>
+        </a:buClr>
+        <a:buFont typeface="Arial" pitchFamily="34" charset="0"/>
+        <a:buChar char="•"/>
+        <a:defRPr sz="1600" kern="1200">
+          <a:solidFill>
+            <a:schemeClr val="tx1"/>
+          </a:solidFill>
+          <a:latin typeface="+mn-lt"/>
+          <a:ea typeface="+mn-ea"/>
+          <a:cs typeface="+mn-cs"/>
+        </a:defRPr>
+      </a:lvl4pPr>
+      <a:lvl5pPr marL="1554480" indent="-228600" algn="l" defTabSz="914400" rtl="0" eaLnBrk="1" latinLnBrk="0" hangingPunct="1">
+        <a:spcBef>
+          <a:spcPct val="20000"/>
+        </a:spcBef>
+        <a:buClr>
+          <a:schemeClr val="accent5"/>
+        </a:buClr>
+        <a:buFont typeface="Arial" pitchFamily="34" charset="0"/>
+        <a:buChar char="•"/>
+        <a:defRPr sz="1400" kern="1200" baseline="0">
+          <a:solidFill>
+            <a:schemeClr val="tx1"/>
+          </a:solidFill>
+          <a:latin typeface="+mn-lt"/>
+          <a:ea typeface="+mn-ea"/>
+          <a:cs typeface="+mn-cs"/>
+        </a:defRPr>
+      </a:lvl5pPr>
+      <a:lvl6pPr marL="1737360" indent="-182880" algn="l" defTabSz="914400" rtl="0" eaLnBrk="1" latinLnBrk="0" hangingPunct="1">
+        <a:spcBef>
+          <a:spcPct val="20000"/>
+        </a:spcBef>
+        <a:buClr>
+          <a:schemeClr val="accent1"/>
+        </a:buClr>
+        <a:buFont typeface="Arial" pitchFamily="34" charset="0"/>
+        <a:buChar char="•"/>
+        <a:defRPr sz="1400" kern="1200" baseline="0">
+          <a:solidFill>
+            <a:schemeClr val="tx1"/>
+          </a:solidFill>
+          <a:latin typeface="+mn-lt"/>
+          <a:ea typeface="+mn-ea"/>
+          <a:cs typeface="+mn-cs"/>
+        </a:defRPr>
+      </a:lvl6pPr>
+      <a:lvl7pPr marL="1920240" indent="-182880" algn="l" defTabSz="914400" rtl="0" eaLnBrk="1" latinLnBrk="0" hangingPunct="1">
+        <a:spcBef>
+          <a:spcPct val="20000"/>
+        </a:spcBef>
+        <a:buClr>
+          <a:schemeClr val="accent2"/>
+        </a:buClr>
+        <a:buFont typeface="Arial" pitchFamily="34" charset="0"/>
+        <a:buChar char="•"/>
+        <a:defRPr sz="1400" kern="1200">
           <a:solidFill>
             <a:schemeClr val="tx1"/>
           </a:solidFill>
@@ -2979,13 +3402,16 @@
           <a:cs typeface="+mn-cs"/>
         </a:defRPr>
       </a:lvl7pPr>
-      <a:lvl8pPr marL="3429000" indent="-228600" algn="l" defTabSz="914400" rtl="0" eaLnBrk="1" latinLnBrk="0" hangingPunct="1">
+      <a:lvl8pPr marL="2103120" indent="-182880" algn="l" defTabSz="914400" rtl="0" eaLnBrk="1" latinLnBrk="0" hangingPunct="1">
         <a:spcBef>
           <a:spcPct val="20000"/>
         </a:spcBef>
+        <a:buClr>
+          <a:schemeClr val="accent3"/>
+        </a:buClr>
         <a:buFont typeface="Arial" pitchFamily="34" charset="0"/>
         <a:buChar char="•"/>
-        <a:defRPr sz="2000" kern="1200">
+        <a:defRPr sz="1400" kern="1200">
           <a:solidFill>
             <a:schemeClr val="tx1"/>
           </a:solidFill>
@@ -2994,13 +3420,16 @@
           <a:cs typeface="+mn-cs"/>
         </a:defRPr>
       </a:lvl8pPr>
-      <a:lvl9pPr marL="3886200" indent="-228600" algn="l" defTabSz="914400" rtl="0" eaLnBrk="1" latinLnBrk="0" hangingPunct="1">
+      <a:lvl9pPr marL="2286000" indent="-182880" algn="l" defTabSz="914400" rtl="0" eaLnBrk="1" latinLnBrk="0" hangingPunct="1">
         <a:spcBef>
           <a:spcPct val="20000"/>
         </a:spcBef>
+        <a:buClr>
+          <a:schemeClr val="accent4"/>
+        </a:buClr>
         <a:buFont typeface="Arial" pitchFamily="34" charset="0"/>
         <a:buChar char="•"/>
-        <a:defRPr sz="2000" kern="1200">
+        <a:defRPr sz="1400" kern="1200">
           <a:solidFill>
             <a:schemeClr val="tx1"/>
           </a:solidFill>
@@ -3138,8 +3567,8 @@
         </p:nvSpPr>
         <p:spPr>
           <a:xfrm>
-            <a:off x="838200" y="1066800"/>
-            <a:ext cx="7772400" cy="1470025"/>
+            <a:off x="838200" y="587030"/>
+            <a:ext cx="5730860" cy="1470025"/>
           </a:xfrm>
         </p:spPr>
         <p:txBody>
@@ -3184,8 +3613,8 @@
         </p:nvSpPr>
         <p:spPr>
           <a:xfrm>
-            <a:off x="1904999" y="2667000"/>
-            <a:ext cx="6008235" cy="1371600"/>
+            <a:off x="828985" y="2315255"/>
+            <a:ext cx="5730860" cy="1066409"/>
           </a:xfrm>
         </p:spPr>
         <p:txBody>
@@ -3201,7 +3630,7 @@
             </a:r>
             <a:r>
               <a:rPr lang="en-US" sz="2800" dirty="0" smtClean="0"/>
-              <a:t>: 		</a:t>
+              <a:t>: 		   </a:t>
             </a:r>
             <a:r>
               <a:rPr lang="en-US" sz="2800" b="1" dirty="0" smtClean="0"/>
@@ -3217,19 +3646,19 @@
             </a:r>
             <a:r>
               <a:rPr lang="en-US" sz="2800" dirty="0" smtClean="0"/>
-              <a:t>: 		</a:t>
+              <a:t>: </a:t>
+            </a:r>
+            <a:r>
+              <a:rPr lang="en-US" sz="2800" dirty="0"/>
+              <a:t> </a:t>
+            </a:r>
+            <a:r>
+              <a:rPr lang="en-US" sz="2800" dirty="0" smtClean="0"/>
+              <a:t>             </a:t>
             </a:r>
             <a:r>
               <a:rPr lang="en-US" sz="2800" b="1" dirty="0" smtClean="0"/>
-              <a:t>Marco </a:t>
-            </a:r>
-            <a:r>
-              <a:rPr lang="en-US" sz="2800" b="1" dirty="0"/>
-              <a:t> </a:t>
-            </a:r>
-            <a:r>
-              <a:rPr lang="en-US" sz="2800" b="1" dirty="0" smtClean="0"/>
-              <a:t> LANZA</a:t>
+              <a:t>Marco   LANZA</a:t>
             </a:r>
             <a:endParaRPr lang="en-US" sz="2800" b="1" dirty="0"/>
           </a:p>
@@ -3258,8 +3687,8 @@
         </p:blipFill>
         <p:spPr bwMode="auto">
           <a:xfrm>
-            <a:off x="304800" y="5029200"/>
-            <a:ext cx="4724400" cy="1362076"/>
+            <a:off x="424260" y="4581150"/>
+            <a:ext cx="4262955" cy="1362076"/>
           </a:xfrm>
           <a:prstGeom prst="rect">
             <a:avLst/>
@@ -3278,14 +3707,14 @@
       </p:pic>
       <p:pic>
         <p:nvPicPr>
-          <p:cNvPr id="1027" name="Picture 3" descr="C:\Users\Jolsty\Desktop\SimSimGit\SimSim\Tesi_Sistema_Accessi_IoT_Andrei_Ciulpan_872394\presentazione\img\yatta_logo.png"/>
+          <p:cNvPr id="4" name="Picture 2" descr="C:\Users\Jolsty\Desktop\SimSimGit\SimSim\Tesi_Sistema_Accessi_IoT_Andrei_Ciulpan_872394\presentazione\img\yatta_logo.png"/>
           <p:cNvPicPr>
             <a:picLocks noChangeAspect="1" noChangeArrowheads="1"/>
           </p:cNvPicPr>
           <p:nvPr/>
         </p:nvPicPr>
         <p:blipFill>
-          <a:blip r:embed="rId3">
+          <a:blip r:embed="rId3" cstate="print">
             <a:extLst>
               <a:ext uri="{28A0092B-C50C-407E-A947-70E740481C1C}">
                 <a14:useLocalDpi xmlns:a14="http://schemas.microsoft.com/office/drawing/2010/main" val="0"/>
@@ -3299,8 +3728,8 @@
         </p:blipFill>
         <p:spPr bwMode="auto">
           <a:xfrm>
-            <a:off x="5562600" y="5105400"/>
-            <a:ext cx="2847975" cy="1209675"/>
+            <a:off x="5071265" y="4832074"/>
+            <a:ext cx="2995590" cy="1111152"/>
           </a:xfrm>
           <a:prstGeom prst="rect">
             <a:avLst/>
@@ -3327,6 +3756,13 @@
   <p:clrMapOvr>
     <a:masterClrMapping/>
   </p:clrMapOvr>
+  <p:timing>
+    <p:tnLst>
+      <p:par>
+        <p:cTn id="1" dur="indefinite" restart="never" nodeType="tmRoot"/>
+      </p:par>
+    </p:tnLst>
+  </p:timing>
 </p:sld>
 </file>
 
@@ -3586,9 +4022,13 @@
         </p:nvSpPr>
         <p:spPr>
           <a:xfrm>
-            <a:off x="457200" y="228600"/>
-            <a:ext cx="8229600" cy="1143000"/>
+            <a:off x="325839" y="548625"/>
+            <a:ext cx="3286036" cy="1143000"/>
           </a:xfrm>
+          <a:noFill/>
+          <a:ln>
+            <a:noFill/>
+          </a:ln>
         </p:spPr>
         <p:txBody>
           <a:bodyPr>
@@ -3596,9 +4036,8 @@
           </a:bodyPr>
           <a:lstStyle/>
           <a:p>
-            <a:pPr algn="l"/>
-            <a:r>
-              <a:rPr lang="en-US" sz="5400" dirty="0" err="1" smtClean="0"/>
+            <a:r>
+              <a:rPr lang="en-US" sz="5400" dirty="0" smtClean="0"/>
               <a:t>Sommario</a:t>
             </a:r>
             <a:endParaRPr lang="en-US" sz="5400" dirty="0"/>
@@ -3617,118 +4056,141 @@
         </p:nvSpPr>
         <p:spPr>
           <a:xfrm>
-            <a:off x="533400" y="1600200"/>
-            <a:ext cx="8229600" cy="4525963"/>
+            <a:off x="325859" y="1931205"/>
+            <a:ext cx="5590316" cy="4525963"/>
           </a:xfrm>
         </p:spPr>
         <p:txBody>
           <a:bodyPr>
-            <a:normAutofit fontScale="92500" lnSpcReduction="20000"/>
+            <a:noAutofit/>
           </a:bodyPr>
           <a:lstStyle/>
           <a:p>
-            <a:r>
-              <a:rPr lang="en-US" dirty="0" err="1" smtClean="0"/>
-              <a:t>Scopo</a:t>
-            </a:r>
-            <a:r>
-              <a:rPr lang="en-US" dirty="0" smtClean="0"/>
-              <a:t> e </a:t>
-            </a:r>
-            <a:r>
-              <a:rPr lang="en-US" dirty="0" err="1" smtClean="0"/>
+            <a:pPr>
+              <a:buFont typeface="Wingdings" pitchFamily="2" charset="2"/>
+              <a:buChar char="Ø"/>
+            </a:pPr>
+            <a:r>
+              <a:rPr lang="en-US" sz="2600" dirty="0" smtClean="0"/>
+              <a:t>Scopo e </a:t>
+            </a:r>
+            <a:r>
+              <a:rPr lang="en-US" sz="2600" dirty="0" err="1" smtClean="0"/>
               <a:t>requisiti</a:t>
             </a:r>
             <a:r>
-              <a:rPr lang="en-US" dirty="0" smtClean="0"/>
+              <a:rPr lang="en-US" sz="2600" dirty="0" smtClean="0"/>
               <a:t> del </a:t>
             </a:r>
             <a:r>
-              <a:rPr lang="en-US" dirty="0" err="1" smtClean="0"/>
+              <a:rPr lang="en-US" sz="2600" dirty="0" err="1" smtClean="0"/>
               <a:t>progetto</a:t>
             </a:r>
-            <a:endParaRPr lang="en-US" dirty="0" smtClean="0"/>
-          </a:p>
-          <a:p>
-            <a:endParaRPr lang="en-US" dirty="0" smtClean="0"/>
-          </a:p>
-          <a:p>
-            <a:r>
-              <a:rPr lang="en-US" dirty="0" err="1" smtClean="0"/>
+            <a:r>
+              <a:rPr lang="en-US" sz="2600" dirty="0"/>
+              <a:t/>
+            </a:r>
+            <a:br>
+              <a:rPr lang="en-US" sz="2600" dirty="0"/>
+            </a:br>
+            <a:endParaRPr lang="en-US" sz="2600" dirty="0" smtClean="0"/>
+          </a:p>
+          <a:p>
+            <a:pPr>
+              <a:buFont typeface="Wingdings" pitchFamily="2" charset="2"/>
+              <a:buChar char="Ø"/>
+            </a:pPr>
+            <a:r>
+              <a:rPr lang="en-US" sz="2600" dirty="0" err="1" smtClean="0"/>
               <a:t>Sviluppo</a:t>
             </a:r>
             <a:r>
-              <a:rPr lang="en-US" dirty="0" smtClean="0"/>
+              <a:rPr lang="en-US" sz="2600" dirty="0" smtClean="0"/>
               <a:t> del </a:t>
             </a:r>
             <a:r>
-              <a:rPr lang="en-US" dirty="0" err="1" smtClean="0"/>
+              <a:rPr lang="en-US" sz="2600" dirty="0" err="1" smtClean="0"/>
               <a:t>sistema</a:t>
             </a:r>
             <a:r>
-              <a:rPr lang="en-US" dirty="0" smtClean="0"/>
+              <a:rPr lang="en-US" sz="2600" dirty="0" smtClean="0"/>
               <a:t> embedded </a:t>
             </a:r>
-          </a:p>
-          <a:p>
-            <a:endParaRPr lang="en-US" dirty="0" smtClean="0"/>
-          </a:p>
-          <a:p>
-            <a:r>
-              <a:rPr lang="en-US" dirty="0" err="1" smtClean="0"/>
+            <a:br>
+              <a:rPr lang="en-US" sz="2600" dirty="0" smtClean="0"/>
+            </a:br>
+            <a:endParaRPr lang="en-US" sz="2600" dirty="0" smtClean="0"/>
+          </a:p>
+          <a:p>
+            <a:pPr>
+              <a:buFont typeface="Wingdings" pitchFamily="2" charset="2"/>
+              <a:buChar char="Ø"/>
+            </a:pPr>
+            <a:r>
+              <a:rPr lang="en-US" sz="2600" dirty="0" err="1" smtClean="0"/>
               <a:t>Sviluppo</a:t>
             </a:r>
             <a:r>
-              <a:rPr lang="en-US" dirty="0" smtClean="0"/>
+              <a:rPr lang="en-US" sz="2600" dirty="0" smtClean="0"/>
               <a:t> del </a:t>
             </a:r>
             <a:r>
-              <a:rPr lang="en-US" dirty="0" err="1" smtClean="0"/>
+              <a:rPr lang="en-US" sz="2600" dirty="0" err="1" smtClean="0"/>
               <a:t>sito</a:t>
             </a:r>
             <a:r>
-              <a:rPr lang="en-US" dirty="0" smtClean="0"/>
+              <a:rPr lang="en-US" sz="2600" dirty="0" smtClean="0"/>
               <a:t> web </a:t>
             </a:r>
-          </a:p>
-          <a:p>
-            <a:endParaRPr lang="en-US" dirty="0" smtClean="0"/>
-          </a:p>
-          <a:p>
-            <a:r>
-              <a:rPr lang="en-US" dirty="0" err="1" smtClean="0"/>
+            <a:br>
+              <a:rPr lang="en-US" sz="2600" dirty="0" smtClean="0"/>
+            </a:br>
+            <a:endParaRPr lang="en-US" sz="2600" dirty="0" smtClean="0"/>
+          </a:p>
+          <a:p>
+            <a:pPr>
+              <a:buFont typeface="Wingdings" pitchFamily="2" charset="2"/>
+              <a:buChar char="Ø"/>
+            </a:pPr>
+            <a:r>
+              <a:rPr lang="en-US" sz="2600" dirty="0" err="1" smtClean="0"/>
               <a:t>Problemi</a:t>
             </a:r>
             <a:r>
-              <a:rPr lang="en-US" dirty="0" smtClean="0"/>
+              <a:rPr lang="en-US" sz="2600" dirty="0" smtClean="0"/>
               <a:t> </a:t>
             </a:r>
             <a:r>
-              <a:rPr lang="en-US" dirty="0" err="1" smtClean="0"/>
+              <a:rPr lang="en-US" sz="2600" dirty="0" err="1" smtClean="0"/>
               <a:t>affrontati</a:t>
             </a:r>
             <a:r>
-              <a:rPr lang="en-US" dirty="0" smtClean="0"/>
+              <a:rPr lang="en-US" sz="2600" dirty="0" smtClean="0"/>
               <a:t> </a:t>
             </a:r>
-          </a:p>
-          <a:p>
-            <a:endParaRPr lang="en-US" dirty="0" smtClean="0"/>
-          </a:p>
-          <a:p>
-            <a:r>
-              <a:rPr lang="en-US" dirty="0" err="1" smtClean="0"/>
+            <a:br>
+              <a:rPr lang="en-US" sz="2600" dirty="0" smtClean="0"/>
+            </a:br>
+            <a:endParaRPr lang="en-US" sz="2600" dirty="0" smtClean="0"/>
+          </a:p>
+          <a:p>
+            <a:pPr>
+              <a:buFont typeface="Wingdings" pitchFamily="2" charset="2"/>
+              <a:buChar char="Ø"/>
+            </a:pPr>
+            <a:r>
+              <a:rPr lang="en-US" sz="2600" dirty="0" err="1" smtClean="0"/>
               <a:t>Eventuali</a:t>
             </a:r>
             <a:r>
-              <a:rPr lang="en-US" dirty="0" smtClean="0"/>
+              <a:rPr lang="en-US" sz="2600" dirty="0" smtClean="0"/>
               <a:t> </a:t>
             </a:r>
             <a:r>
-              <a:rPr lang="en-US" dirty="0" err="1" smtClean="0"/>
+              <a:rPr lang="en-US" sz="2600" dirty="0" err="1" smtClean="0"/>
               <a:t>miglioramenti</a:t>
             </a:r>
-            <a:endParaRPr lang="en-US" dirty="0"/>
+            <a:endParaRPr lang="en-US" sz="2600" dirty="0"/>
           </a:p>
         </p:txBody>
       </p:sp>
@@ -3742,6 +4204,13 @@
   <p:clrMapOvr>
     <a:masterClrMapping/>
   </p:clrMapOvr>
+  <p:timing>
+    <p:tnLst>
+      <p:par>
+        <p:cTn id="1" dur="indefinite" restart="never" nodeType="tmRoot"/>
+      </p:par>
+    </p:tnLst>
+  </p:timing>
 </p:sld>
 </file>
 
@@ -3785,8 +4254,8 @@
         </p:blipFill>
         <p:spPr bwMode="auto">
           <a:xfrm>
-            <a:off x="142707" y="0"/>
-            <a:ext cx="8991600" cy="6705600"/>
+            <a:off x="1422790" y="663840"/>
+            <a:ext cx="5780193" cy="5376700"/>
           </a:xfrm>
           <a:prstGeom prst="rect">
             <a:avLst/>
@@ -3813,6 +4282,13 @@
   <p:clrMapOvr>
     <a:masterClrMapping/>
   </p:clrMapOvr>
+  <p:timing>
+    <p:tnLst>
+      <p:par>
+        <p:cTn id="1" dur="indefinite" restart="never" nodeType="tmRoot"/>
+      </p:par>
+    </p:tnLst>
+  </p:timing>
 </p:sld>
 </file>
 
@@ -3845,7 +4321,9 @@
         </p:nvSpPr>
         <p:spPr/>
         <p:txBody>
-          <a:bodyPr/>
+          <a:bodyPr>
+            <a:normAutofit fontScale="90000"/>
+          </a:bodyPr>
           <a:lstStyle/>
           <a:p>
             <a:r>
@@ -3878,10 +4356,15 @@
             <p:ph idx="1"/>
           </p:nvPr>
         </p:nvSpPr>
-        <p:spPr/>
+        <p:spPr>
+          <a:xfrm>
+            <a:off x="457200" y="1600200"/>
+            <a:ext cx="7620000" cy="4017885"/>
+          </a:xfrm>
+        </p:spPr>
         <p:txBody>
           <a:bodyPr>
-            <a:normAutofit fontScale="85000" lnSpcReduction="20000"/>
+            <a:normAutofit/>
           </a:bodyPr>
           <a:lstStyle/>
           <a:p>
@@ -3913,18 +4396,12 @@
           </a:p>
           <a:p>
             <a:r>
-              <a:rPr lang="en-US" dirty="0" smtClean="0"/>
-              <a:t>Raspberry Pi: server hosting</a:t>
-            </a:r>
-          </a:p>
-          <a:p>
-            <a:r>
               <a:rPr lang="en-US" dirty="0" err="1" smtClean="0"/>
               <a:t>Arduino</a:t>
             </a:r>
             <a:r>
               <a:rPr lang="en-US" dirty="0" smtClean="0"/>
-              <a:t> UNO: MCU</a:t>
+              <a:t> UNO</a:t>
             </a:r>
           </a:p>
           <a:p>
@@ -3934,30 +4411,30 @@
             </a:r>
             <a:r>
               <a:rPr lang="en-US" dirty="0" smtClean="0"/>
-              <a:t> RF: </a:t>
-            </a:r>
+              <a:t> RF</a:t>
+            </a:r>
+          </a:p>
+          <a:p>
             <a:r>
               <a:rPr lang="en-US" dirty="0" err="1" smtClean="0"/>
-              <a:t>telecomando</a:t>
+              <a:t>Lettore</a:t>
+            </a:r>
+            <a:r>
+              <a:rPr lang="en-US" dirty="0" smtClean="0"/>
+              <a:t> RFID</a:t>
             </a:r>
             <a:endParaRPr lang="en-US" dirty="0" smtClean="0"/>
           </a:p>
           <a:p>
             <a:r>
               <a:rPr lang="en-US" dirty="0" smtClean="0"/>
-              <a:t>RFID: tag</a:t>
+              <a:t>Keypad 4x4</a:t>
             </a:r>
           </a:p>
           <a:p>
             <a:r>
               <a:rPr lang="en-US" dirty="0" smtClean="0"/>
-              <a:t>Keypad 4x4: password</a:t>
-            </a:r>
-          </a:p>
-          <a:p>
-            <a:r>
-              <a:rPr lang="en-US" dirty="0" smtClean="0"/>
-              <a:t>LCD 16x2: display</a:t>
+              <a:t>LCD 16x2</a:t>
             </a:r>
           </a:p>
           <a:p>
@@ -3965,24 +4442,12 @@
               <a:rPr lang="en-US" dirty="0" err="1" smtClean="0"/>
               <a:t>Servomotore</a:t>
             </a:r>
+            <a:endParaRPr lang="en-US" dirty="0" smtClean="0"/>
+          </a:p>
+          <a:p>
             <a:r>
               <a:rPr lang="en-US" dirty="0" smtClean="0"/>
-              <a:t>: </a:t>
-            </a:r>
-            <a:r>
-              <a:rPr lang="en-US" dirty="0" err="1" smtClean="0"/>
-              <a:t>attuatore</a:t>
-            </a:r>
-            <a:endParaRPr lang="en-US" dirty="0" smtClean="0"/>
-          </a:p>
-          <a:p>
-            <a:r>
-              <a:rPr lang="en-US" dirty="0" smtClean="0"/>
-              <a:t>ESP8266: </a:t>
-            </a:r>
-            <a:r>
-              <a:rPr lang="en-US" dirty="0" err="1" smtClean="0"/>
-              <a:t>WiFi</a:t>
+              <a:t>ESP8266</a:t>
             </a:r>
             <a:endParaRPr lang="en-US" dirty="0" smtClean="0"/>
           </a:p>
@@ -3998,6 +4463,13 @@
   <p:clrMapOvr>
     <a:masterClrMapping/>
   </p:clrMapOvr>
+  <p:timing>
+    <p:tnLst>
+      <p:par>
+        <p:cTn id="1" dur="indefinite" restart="never" nodeType="tmRoot"/>
+      </p:par>
+    </p:tnLst>
+  </p:timing>
 </p:sld>
 </file>
 
@@ -4069,7 +4541,9 @@
           </a:xfrm>
         </p:spPr>
         <p:txBody>
-          <a:bodyPr/>
+          <a:bodyPr>
+            <a:normAutofit/>
+          </a:bodyPr>
           <a:lstStyle/>
           <a:p>
             <a:r>
@@ -4131,6 +4605,13 @@
   <p:clrMapOvr>
     <a:masterClrMapping/>
   </p:clrMapOvr>
+  <p:timing>
+    <p:tnLst>
+      <p:par>
+        <p:cTn id="1" dur="indefinite" restart="never" nodeType="tmRoot"/>
+      </p:par>
+    </p:tnLst>
+  </p:timing>
 </p:sld>
 </file>
 
@@ -4201,6 +4682,9 @@
             <a:off x="769905" y="1600201"/>
             <a:ext cx="7681000" cy="4478744"/>
           </a:xfrm>
+          <a:solidFill>
+            <a:schemeClr val="bg1"/>
+          </a:solidFill>
         </p:spPr>
         <p:txBody>
           <a:bodyPr>
@@ -4213,35 +4697,60 @@
             </a:pPr>
             <a:r>
               <a:rPr lang="en-US" dirty="0" smtClean="0"/>
-              <a:t>Back-End: JavaScript</a:t>
+              <a:t>Back-End: </a:t>
+            </a:r>
+            <a:r>
+              <a:rPr lang="en-US" dirty="0" smtClean="0"/>
+              <a:t>JavaScript</a:t>
             </a:r>
           </a:p>
           <a:p>
             <a:pPr marL="0" indent="0">
               <a:buNone/>
             </a:pPr>
-            <a:endParaRPr lang="en-US" dirty="0"/>
-          </a:p>
-          <a:p>
+            <a:endParaRPr lang="en-US" dirty="0" smtClean="0"/>
+          </a:p>
+          <a:p>
+            <a:pPr>
+              <a:buFont typeface="Wingdings" pitchFamily="2" charset="2"/>
+              <a:buChar char="Ø"/>
+            </a:pPr>
+            <a:r>
+              <a:rPr lang="en-US" dirty="0" smtClean="0"/>
+              <a:t>Raspberry Pi</a:t>
+            </a:r>
+          </a:p>
+          <a:p>
+            <a:pPr>
+              <a:buFont typeface="Wingdings" pitchFamily="2" charset="2"/>
+              <a:buChar char="Ø"/>
+            </a:pPr>
             <a:r>
               <a:rPr lang="en-US" dirty="0" smtClean="0"/>
               <a:t>Node.js</a:t>
             </a:r>
-            <a:endParaRPr lang="en-US" dirty="0"/>
-          </a:p>
-          <a:p>
-            <a:r>
-              <a:rPr lang="en-US" dirty="0" err="1"/>
+          </a:p>
+          <a:p>
+            <a:pPr>
+              <a:buFont typeface="Wingdings" pitchFamily="2" charset="2"/>
+              <a:buChar char="Ø"/>
+            </a:pPr>
+            <a:r>
+              <a:rPr lang="en-US" dirty="0" err="1" smtClean="0"/>
               <a:t>MongoDB</a:t>
             </a:r>
-            <a:endParaRPr lang="en-US" dirty="0"/>
-          </a:p>
-          <a:p>
+            <a:endParaRPr lang="en-US" dirty="0" smtClean="0"/>
+          </a:p>
+          <a:p>
+            <a:pPr>
+              <a:buFont typeface="Wingdings" pitchFamily="2" charset="2"/>
+              <a:buChar char="Ø"/>
+            </a:pPr>
             <a:r>
               <a:rPr lang="en-US" dirty="0" err="1" smtClean="0"/>
               <a:t>RESTful</a:t>
             </a:r>
-            <a:endParaRPr lang="en-US" dirty="0" smtClean="0"/>
+            <a:endParaRPr lang="en-US" dirty="0"/>
           </a:p>
           <a:p>
             <a:pPr marL="0" indent="0">
@@ -4264,6 +4773,13 @@
   <p:clrMapOvr>
     <a:masterClrMapping/>
   </p:clrMapOvr>
+  <p:timing>
+    <p:tnLst>
+      <p:par>
+        <p:cTn id="1" dur="indefinite" restart="never" nodeType="tmRoot"/>
+      </p:par>
+    </p:tnLst>
+  </p:timing>
 </p:sld>
 </file>
 
@@ -4525,6 +5041,13 @@
   <p:clrMapOvr>
     <a:masterClrMapping/>
   </p:clrMapOvr>
+  <p:timing>
+    <p:tnLst>
+      <p:par>
+        <p:cTn id="1" dur="indefinite" restart="never" nodeType="tmRoot"/>
+      </p:par>
+    </p:tnLst>
+  </p:timing>
 </p:sld>
 </file>
 
@@ -4594,7 +5117,7 @@
         </p:spPr>
         <p:txBody>
           <a:bodyPr>
-            <a:normAutofit fontScale="92500" lnSpcReduction="20000"/>
+            <a:normAutofit/>
           </a:bodyPr>
           <a:lstStyle/>
           <a:p>
@@ -4779,6 +5302,13 @@
   <p:clrMapOvr>
     <a:masterClrMapping/>
   </p:clrMapOvr>
+  <p:timing>
+    <p:tnLst>
+      <p:par>
+        <p:cTn id="1" dur="indefinite" restart="never" nodeType="tmRoot"/>
+      </p:par>
+    </p:tnLst>
+  </p:timing>
 </p:sld>
 </file>
 
@@ -4843,7 +5373,7 @@
         <p:spPr/>
         <p:txBody>
           <a:bodyPr>
-            <a:normAutofit lnSpcReduction="10000"/>
+            <a:normAutofit/>
           </a:bodyPr>
           <a:lstStyle/>
           <a:p>
@@ -4996,6 +5526,283 @@
 </file>
 
 <file path=ppt/theme/theme1.xml><?xml version="1.0" encoding="utf-8"?>
+<a:theme xmlns:a="http://schemas.openxmlformats.org/drawingml/2006/main" name="Adiacență">
+  <a:themeElements>
+    <a:clrScheme name="Slipstream">
+      <a:dk1>
+        <a:sysClr val="windowText" lastClr="000000"/>
+      </a:dk1>
+      <a:lt1>
+        <a:sysClr val="window" lastClr="FFFFFF"/>
+      </a:lt1>
+      <a:dk2>
+        <a:srgbClr val="212745"/>
+      </a:dk2>
+      <a:lt2>
+        <a:srgbClr val="B4DCFA"/>
+      </a:lt2>
+      <a:accent1>
+        <a:srgbClr val="4E67C8"/>
+      </a:accent1>
+      <a:accent2>
+        <a:srgbClr val="5ECCF3"/>
+      </a:accent2>
+      <a:accent3>
+        <a:srgbClr val="A7EA52"/>
+      </a:accent3>
+      <a:accent4>
+        <a:srgbClr val="5DCEAF"/>
+      </a:accent4>
+      <a:accent5>
+        <a:srgbClr val="FF8021"/>
+      </a:accent5>
+      <a:accent6>
+        <a:srgbClr val="F14124"/>
+      </a:accent6>
+      <a:hlink>
+        <a:srgbClr val="56C7AA"/>
+      </a:hlink>
+      <a:folHlink>
+        <a:srgbClr val="59A8D1"/>
+      </a:folHlink>
+    </a:clrScheme>
+    <a:fontScheme name="Office">
+      <a:majorFont>
+        <a:latin typeface="Cambria"/>
+        <a:ea typeface=""/>
+        <a:cs typeface=""/>
+        <a:font script="Jpan" typeface="ＭＳ ゴシック"/>
+        <a:font script="Hang" typeface="맑은 고딕"/>
+        <a:font script="Hans" typeface="宋体"/>
+        <a:font script="Hant" typeface="新細明體"/>
+        <a:font script="Arab" typeface="Times New Roman"/>
+        <a:font script="Hebr" typeface="Times New Roman"/>
+        <a:font script="Thai" typeface="Angsana New"/>
+        <a:font script="Ethi" typeface="Nyala"/>
+        <a:font script="Beng" typeface="Vrinda"/>
+        <a:font script="Gujr" typeface="Shruti"/>
+        <a:font script="Khmr" typeface="MoolBoran"/>
+        <a:font script="Knda" typeface="Tunga"/>
+        <a:font script="Guru" typeface="Raavi"/>
+        <a:font script="Cans" typeface="Euphemia"/>
+        <a:font script="Cher" typeface="Plantagenet Cherokee"/>
+        <a:font script="Yiii" typeface="Microsoft Yi Baiti"/>
+        <a:font script="Tibt" typeface="Microsoft Himalaya"/>
+        <a:font script="Thaa" typeface="MV Boli"/>
+        <a:font script="Deva" typeface="Mangal"/>
+        <a:font script="Telu" typeface="Gautami"/>
+        <a:font script="Taml" typeface="Latha"/>
+        <a:font script="Syrc" typeface="Estrangelo Edessa"/>
+        <a:font script="Orya" typeface="Kalinga"/>
+        <a:font script="Mlym" typeface="Kartika"/>
+        <a:font script="Laoo" typeface="DokChampa"/>
+        <a:font script="Sinh" typeface="Iskoola Pota"/>
+        <a:font script="Mong" typeface="Mongolian Baiti"/>
+        <a:font script="Viet" typeface="Times New Roman"/>
+        <a:font script="Uigh" typeface="Microsoft Uighur"/>
+        <a:font script="Geor" typeface="Sylfaen"/>
+      </a:majorFont>
+      <a:minorFont>
+        <a:latin typeface="Calibri"/>
+        <a:ea typeface=""/>
+        <a:cs typeface=""/>
+        <a:font script="Jpan" typeface="ＭＳ 明朝"/>
+        <a:font script="Hang" typeface="맑은 고딕"/>
+        <a:font script="Hans" typeface="宋体"/>
+        <a:font script="Hant" typeface="新細明體"/>
+        <a:font script="Arab" typeface="Arial"/>
+        <a:font script="Hebr" typeface="Arial"/>
+        <a:font script="Thai" typeface="Cordia New"/>
+        <a:font script="Ethi" typeface="Nyala"/>
+        <a:font script="Beng" typeface="Vrinda"/>
+        <a:font script="Gujr" typeface="Shruti"/>
+        <a:font script="Khmr" typeface="DaunPenh"/>
+        <a:font script="Knda" typeface="Tunga"/>
+        <a:font script="Guru" typeface="Raavi"/>
+        <a:font script="Cans" typeface="Euphemia"/>
+        <a:font script="Cher" typeface="Plantagenet Cherokee"/>
+        <a:font script="Yiii" typeface="Microsoft Yi Baiti"/>
+        <a:font script="Tibt" typeface="Microsoft Himalaya"/>
+        <a:font script="Thaa" typeface="MV Boli"/>
+        <a:font script="Deva" typeface="Mangal"/>
+        <a:font script="Telu" typeface="Gautami"/>
+        <a:font script="Taml" typeface="Latha"/>
+        <a:font script="Syrc" typeface="Estrangelo Edessa"/>
+        <a:font script="Orya" typeface="Kalinga"/>
+        <a:font script="Mlym" typeface="Kartika"/>
+        <a:font script="Laoo" typeface="DokChampa"/>
+        <a:font script="Sinh" typeface="Iskoola Pota"/>
+        <a:font script="Mong" typeface="Mongolian Baiti"/>
+        <a:font script="Viet" typeface="Arial"/>
+        <a:font script="Uigh" typeface="Microsoft Uighur"/>
+        <a:font script="Geor" typeface="Sylfaen"/>
+      </a:minorFont>
+    </a:fontScheme>
+    <a:fmtScheme name="Office">
+      <a:fillStyleLst>
+        <a:solidFill>
+          <a:schemeClr val="phClr"/>
+        </a:solidFill>
+        <a:gradFill rotWithShape="1">
+          <a:gsLst>
+            <a:gs pos="0">
+              <a:schemeClr val="phClr">
+                <a:tint val="50000"/>
+                <a:satMod val="300000"/>
+              </a:schemeClr>
+            </a:gs>
+            <a:gs pos="35000">
+              <a:schemeClr val="phClr">
+                <a:tint val="37000"/>
+                <a:satMod val="300000"/>
+              </a:schemeClr>
+            </a:gs>
+            <a:gs pos="100000">
+              <a:schemeClr val="phClr">
+                <a:tint val="15000"/>
+                <a:satMod val="350000"/>
+              </a:schemeClr>
+            </a:gs>
+          </a:gsLst>
+          <a:lin ang="16200000" scaled="1"/>
+        </a:gradFill>
+        <a:gradFill rotWithShape="1">
+          <a:gsLst>
+            <a:gs pos="0">
+              <a:schemeClr val="phClr">
+                <a:shade val="51000"/>
+                <a:satMod val="130000"/>
+              </a:schemeClr>
+            </a:gs>
+            <a:gs pos="80000">
+              <a:schemeClr val="phClr">
+                <a:shade val="93000"/>
+                <a:satMod val="130000"/>
+              </a:schemeClr>
+            </a:gs>
+            <a:gs pos="100000">
+              <a:schemeClr val="phClr">
+                <a:shade val="94000"/>
+                <a:satMod val="135000"/>
+              </a:schemeClr>
+            </a:gs>
+          </a:gsLst>
+          <a:lin ang="16200000" scaled="0"/>
+        </a:gradFill>
+      </a:fillStyleLst>
+      <a:lnStyleLst>
+        <a:ln w="9525" cap="flat" cmpd="sng" algn="ctr">
+          <a:solidFill>
+            <a:schemeClr val="phClr">
+              <a:shade val="95000"/>
+              <a:satMod val="105000"/>
+            </a:schemeClr>
+          </a:solidFill>
+          <a:prstDash val="solid"/>
+        </a:ln>
+        <a:ln w="25400" cap="flat" cmpd="sng" algn="ctr">
+          <a:solidFill>
+            <a:schemeClr val="phClr"/>
+          </a:solidFill>
+          <a:prstDash val="solid"/>
+        </a:ln>
+        <a:ln w="38100" cap="flat" cmpd="sng" algn="ctr">
+          <a:solidFill>
+            <a:schemeClr val="phClr"/>
+          </a:solidFill>
+          <a:prstDash val="solid"/>
+        </a:ln>
+      </a:lnStyleLst>
+      <a:effectStyleLst>
+        <a:effectStyle>
+          <a:effectLst>
+            <a:outerShdw blurRad="40000" dist="20000" dir="5400000" rotWithShape="0">
+              <a:srgbClr val="000000">
+                <a:alpha val="38000"/>
+              </a:srgbClr>
+            </a:outerShdw>
+          </a:effectLst>
+        </a:effectStyle>
+        <a:effectStyle>
+          <a:effectLst>
+            <a:outerShdw blurRad="40000" dist="23000" dir="5400000" rotWithShape="0">
+              <a:srgbClr val="000000">
+                <a:alpha val="35000"/>
+              </a:srgbClr>
+            </a:outerShdw>
+          </a:effectLst>
+        </a:effectStyle>
+        <a:effectStyle>
+          <a:effectLst>
+            <a:outerShdw blurRad="40000" dist="23000" dir="5400000" rotWithShape="0">
+              <a:srgbClr val="000000">
+                <a:alpha val="35000"/>
+              </a:srgbClr>
+            </a:outerShdw>
+          </a:effectLst>
+          <a:scene3d>
+            <a:camera prst="orthographicFront">
+              <a:rot lat="0" lon="0" rev="0"/>
+            </a:camera>
+            <a:lightRig rig="threePt" dir="t">
+              <a:rot lat="0" lon="0" rev="1200000"/>
+            </a:lightRig>
+          </a:scene3d>
+          <a:sp3d>
+            <a:bevelT w="63500" h="25400"/>
+          </a:sp3d>
+        </a:effectStyle>
+      </a:effectStyleLst>
+      <a:bgFillStyleLst>
+        <a:solidFill>
+          <a:schemeClr val="phClr"/>
+        </a:solidFill>
+        <a:gradFill rotWithShape="1">
+          <a:gsLst>
+            <a:gs pos="0">
+              <a:schemeClr val="phClr">
+                <a:tint val="90000"/>
+              </a:schemeClr>
+            </a:gs>
+            <a:gs pos="75000">
+              <a:schemeClr val="phClr">
+                <a:shade val="100000"/>
+                <a:satMod val="115000"/>
+              </a:schemeClr>
+            </a:gs>
+            <a:gs pos="100000">
+              <a:schemeClr val="phClr">
+                <a:shade val="70000"/>
+                <a:satMod val="130000"/>
+              </a:schemeClr>
+            </a:gs>
+          </a:gsLst>
+          <a:path path="circle">
+            <a:fillToRect l="20000" t="50000" r="100000" b="50000"/>
+          </a:path>
+        </a:gradFill>
+        <a:blipFill rotWithShape="1">
+          <a:blip xmlns:r="http://schemas.openxmlformats.org/officeDocument/2006/relationships" r:embed="rId1">
+            <a:duotone>
+              <a:schemeClr val="phClr">
+                <a:tint val="97000"/>
+              </a:schemeClr>
+              <a:schemeClr val="phClr">
+                <a:shade val="96000"/>
+              </a:schemeClr>
+            </a:duotone>
+          </a:blip>
+          <a:tile tx="0" ty="0" sx="32000" sy="32000" flip="none" algn="tl"/>
+        </a:blipFill>
+      </a:bgFillStyleLst>
+    </a:fmtScheme>
+  </a:themeElements>
+  <a:objectDefaults/>
+  <a:extraClrSchemeLst/>
+</a:theme>
+</file>
+
+<file path=ppt/theme/theme2.xml><?xml version="1.0" encoding="utf-8"?>
 <a:theme xmlns:a="http://schemas.openxmlformats.org/drawingml/2006/main" name="Temă Office">
   <a:themeElements>
     <a:clrScheme name="Office">

</xml_diff>

<commit_message>
aggiornato presentazione + testo presentazione, caricato pdf della presentazione per lettura semplice
</commit_message>
<xml_diff>
--- a/Tesi_Sistema_Accessi_IoT_Andrei_Ciulpan_872394/presentazione/Sistema Accessi IoT.pptx
+++ b/Tesi_Sistema_Accessi_IoT_Andrei_Ciulpan_872394/presentazione/Sistema Accessi IoT.pptx
@@ -12,8 +12,8 @@
     <p:sldId id="257" r:id="rId3"/>
     <p:sldId id="258" r:id="rId4"/>
     <p:sldId id="259" r:id="rId5"/>
-    <p:sldId id="264" r:id="rId6"/>
-    <p:sldId id="260" r:id="rId7"/>
+    <p:sldId id="260" r:id="rId6"/>
+    <p:sldId id="264" r:id="rId7"/>
     <p:sldId id="263" r:id="rId8"/>
     <p:sldId id="261" r:id="rId9"/>
     <p:sldId id="262" r:id="rId10"/>
@@ -126,8 +126,8 @@
             <p14:sldId id="257"/>
             <p14:sldId id="258"/>
             <p14:sldId id="259"/>
+            <p14:sldId id="260"/>
             <p14:sldId id="264"/>
-            <p14:sldId id="260"/>
             <p14:sldId id="263"/>
             <p14:sldId id="261"/>
             <p14:sldId id="262"/>
@@ -223,7 +223,7 @@
           <a:p>
             <a:fld id="{7E2CBA20-3CC6-4CA7-A64E-677853DDDBDD}" type="datetimeFigureOut">
               <a:rPr lang="en-US" smtClean="0"/>
-              <a:t>21-Jun-19</a:t>
+              <a:t>23-Jun-19</a:t>
             </a:fld>
             <a:endParaRPr lang="en-US"/>
           </a:p>
@@ -685,7 +685,7 @@
           <a:p>
             <a:fld id="{179DE077-2B25-4D43-8A5F-B5A94BA1672D}" type="datetimeFigureOut">
               <a:rPr lang="en-US" smtClean="0"/>
-              <a:t>21-Jun-19</a:t>
+              <a:t>23-Jun-19</a:t>
             </a:fld>
             <a:endParaRPr lang="en-US"/>
           </a:p>
@@ -850,7 +850,7 @@
           <a:p>
             <a:fld id="{179DE077-2B25-4D43-8A5F-B5A94BA1672D}" type="datetimeFigureOut">
               <a:rPr lang="en-US" smtClean="0"/>
-              <a:t>21-Jun-19</a:t>
+              <a:t>23-Jun-19</a:t>
             </a:fld>
             <a:endParaRPr lang="en-US"/>
           </a:p>
@@ -1025,7 +1025,7 @@
           <a:p>
             <a:fld id="{179DE077-2B25-4D43-8A5F-B5A94BA1672D}" type="datetimeFigureOut">
               <a:rPr lang="en-US" smtClean="0"/>
-              <a:t>21-Jun-19</a:t>
+              <a:t>23-Jun-19</a:t>
             </a:fld>
             <a:endParaRPr lang="en-US"/>
           </a:p>
@@ -1190,7 +1190,7 @@
           <a:p>
             <a:fld id="{179DE077-2B25-4D43-8A5F-B5A94BA1672D}" type="datetimeFigureOut">
               <a:rPr lang="en-US" smtClean="0"/>
-              <a:t>21-Jun-19</a:t>
+              <a:t>23-Jun-19</a:t>
             </a:fld>
             <a:endParaRPr lang="en-US"/>
           </a:p>
@@ -1431,7 +1431,7 @@
           <a:p>
             <a:fld id="{179DE077-2B25-4D43-8A5F-B5A94BA1672D}" type="datetimeFigureOut">
               <a:rPr lang="en-US" smtClean="0"/>
-              <a:t>21-Jun-19</a:t>
+              <a:t>23-Jun-19</a:t>
             </a:fld>
             <a:endParaRPr lang="en-US"/>
           </a:p>
@@ -1714,7 +1714,7 @@
           <a:p>
             <a:fld id="{179DE077-2B25-4D43-8A5F-B5A94BA1672D}" type="datetimeFigureOut">
               <a:rPr lang="en-US" smtClean="0"/>
-              <a:t>21-Jun-19</a:t>
+              <a:t>23-Jun-19</a:t>
             </a:fld>
             <a:endParaRPr lang="en-US"/>
           </a:p>
@@ -2143,7 +2143,7 @@
           <a:p>
             <a:fld id="{179DE077-2B25-4D43-8A5F-B5A94BA1672D}" type="datetimeFigureOut">
               <a:rPr lang="en-US" smtClean="0"/>
-              <a:t>21-Jun-19</a:t>
+              <a:t>23-Jun-19</a:t>
             </a:fld>
             <a:endParaRPr lang="en-US"/>
           </a:p>
@@ -2256,7 +2256,7 @@
           <a:p>
             <a:fld id="{179DE077-2B25-4D43-8A5F-B5A94BA1672D}" type="datetimeFigureOut">
               <a:rPr lang="en-US" smtClean="0"/>
-              <a:t>21-Jun-19</a:t>
+              <a:t>23-Jun-19</a:t>
             </a:fld>
             <a:endParaRPr lang="en-US"/>
           </a:p>
@@ -2346,7 +2346,7 @@
           <a:p>
             <a:fld id="{179DE077-2B25-4D43-8A5F-B5A94BA1672D}" type="datetimeFigureOut">
               <a:rPr lang="en-US" smtClean="0"/>
-              <a:t>21-Jun-19</a:t>
+              <a:t>23-Jun-19</a:t>
             </a:fld>
             <a:endParaRPr lang="en-US"/>
           </a:p>
@@ -2535,7 +2535,7 @@
           <a:p>
             <a:fld id="{179DE077-2B25-4D43-8A5F-B5A94BA1672D}" type="datetimeFigureOut">
               <a:rPr lang="en-US" smtClean="0"/>
-              <a:t>21-Jun-19</a:t>
+              <a:t>23-Jun-19</a:t>
             </a:fld>
             <a:endParaRPr lang="en-US"/>
           </a:p>
@@ -2853,7 +2853,7 @@
           <a:p>
             <a:fld id="{179DE077-2B25-4D43-8A5F-B5A94BA1672D}" type="datetimeFigureOut">
               <a:rPr lang="en-US" smtClean="0"/>
-              <a:t>21-Jun-19</a:t>
+              <a:t>23-Jun-19</a:t>
             </a:fld>
             <a:endParaRPr lang="en-US"/>
           </a:p>
@@ -3232,7 +3232,7 @@
           <a:p>
             <a:fld id="{179DE077-2B25-4D43-8A5F-B5A94BA1672D}" type="datetimeFigureOut">
               <a:rPr lang="en-US" smtClean="0"/>
-              <a:t>21-Jun-19</a:t>
+              <a:t>23-Jun-19</a:t>
             </a:fld>
             <a:endParaRPr lang="en-US"/>
           </a:p>
@@ -3578,24 +3578,8 @@
           <a:lstStyle/>
           <a:p>
             <a:r>
-              <a:rPr lang="en-US" sz="5400" dirty="0" err="1" smtClean="0"/>
-              <a:t>Sistema</a:t>
-            </a:r>
-            <a:r>
               <a:rPr lang="en-US" sz="5400" dirty="0" smtClean="0"/>
-              <a:t> </a:t>
-            </a:r>
-            <a:r>
-              <a:rPr lang="en-US" sz="5400" dirty="0" err="1" smtClean="0"/>
-              <a:t>Accessi</a:t>
-            </a:r>
-            <a:r>
-              <a:rPr lang="en-US" sz="5400" dirty="0" smtClean="0"/>
-              <a:t> </a:t>
-            </a:r>
-            <a:r>
-              <a:rPr lang="en-US" sz="5400" dirty="0" err="1" smtClean="0"/>
-              <a:t>IoT</a:t>
+              <a:t>Sistema Accessi IoT</a:t>
             </a:r>
             <a:endParaRPr lang="en-US" sz="5400" dirty="0"/>
           </a:p>
@@ -3687,7 +3671,7 @@
         </p:blipFill>
         <p:spPr bwMode="auto">
           <a:xfrm>
-            <a:off x="424260" y="4581150"/>
+            <a:off x="309043" y="4547167"/>
             <a:ext cx="4262955" cy="1362076"/>
           </a:xfrm>
           <a:prstGeom prst="rect">
@@ -3728,8 +3712,8 @@
         </p:blipFill>
         <p:spPr bwMode="auto">
           <a:xfrm>
-            <a:off x="5071265" y="4832074"/>
-            <a:ext cx="2995590" cy="1111152"/>
+            <a:off x="4994455" y="4700785"/>
+            <a:ext cx="2636718" cy="1054841"/>
           </a:xfrm>
           <a:prstGeom prst="rect">
             <a:avLst/>
@@ -3746,6 +3730,41 @@
           </a:extLst>
         </p:spPr>
       </p:pic>
+      <p:cxnSp>
+        <p:nvCxnSpPr>
+          <p:cNvPr id="6" name="Conector drept 5"/>
+          <p:cNvCxnSpPr/>
+          <p:nvPr/>
+        </p:nvCxnSpPr>
+        <p:spPr>
+          <a:xfrm>
+            <a:off x="961930" y="2161635"/>
+            <a:ext cx="5491915" cy="0"/>
+          </a:xfrm>
+          <a:prstGeom prst="line">
+            <a:avLst/>
+          </a:prstGeom>
+          <a:ln w="38100">
+            <a:solidFill>
+              <a:schemeClr val="accent1"/>
+            </a:solidFill>
+          </a:ln>
+        </p:spPr>
+        <p:style>
+          <a:lnRef idx="1">
+            <a:schemeClr val="accent1"/>
+          </a:lnRef>
+          <a:fillRef idx="0">
+            <a:schemeClr val="accent1"/>
+          </a:fillRef>
+          <a:effectRef idx="0">
+            <a:schemeClr val="accent1"/>
+          </a:effectRef>
+          <a:fontRef idx="minor">
+            <a:schemeClr val="tx1"/>
+          </a:fontRef>
+        </p:style>
+      </p:cxnSp>
     </p:spTree>
     <p:extLst>
       <p:ext uri="{BB962C8B-B14F-4D97-AF65-F5344CB8AC3E}">
@@ -3837,7 +3856,7 @@
         </p:blipFill>
         <p:spPr bwMode="auto">
           <a:xfrm>
-            <a:off x="885120" y="1542253"/>
+            <a:off x="539475" y="1488619"/>
             <a:ext cx="7373760" cy="3994120"/>
           </a:xfrm>
           <a:prstGeom prst="rect">
@@ -3863,7 +3882,7 @@
         </p:nvSpPr>
         <p:spPr>
           <a:xfrm>
-            <a:off x="2186274" y="5771705"/>
+            <a:off x="1840629" y="5656490"/>
             <a:ext cx="4771452" cy="830997"/>
           </a:xfrm>
           <a:prstGeom prst="rect">
@@ -4254,8 +4273,8 @@
         </p:blipFill>
         <p:spPr bwMode="auto">
           <a:xfrm>
-            <a:off x="1422790" y="663840"/>
-            <a:ext cx="5780193" cy="5376700"/>
+            <a:off x="1653220" y="1574405"/>
+            <a:ext cx="5491915" cy="4762219"/>
           </a:xfrm>
           <a:prstGeom prst="rect">
             <a:avLst/>
@@ -4272,6 +4291,80 @@
           </a:extLst>
         </p:spPr>
       </p:pic>
+      <p:sp>
+        <p:nvSpPr>
+          <p:cNvPr id="4" name="Titlu 1"/>
+          <p:cNvSpPr txBox="1">
+            <a:spLocks/>
+          </p:cNvSpPr>
+          <p:nvPr/>
+        </p:nvSpPr>
+        <p:spPr>
+          <a:xfrm>
+            <a:off x="501070" y="471815"/>
+            <a:ext cx="5730860" cy="833755"/>
+          </a:xfrm>
+          <a:prstGeom prst="rect">
+            <a:avLst/>
+          </a:prstGeom>
+        </p:spPr>
+        <p:txBody>
+          <a:bodyPr vert="horz" lIns="91440" tIns="45720" rIns="91440" bIns="45720" rtlCol="0" anchor="ctr">
+            <a:normAutofit/>
+          </a:bodyPr>
+          <a:lstStyle>
+            <a:lvl1pPr algn="l" defTabSz="914400" rtl="0" eaLnBrk="1" latinLnBrk="0" hangingPunct="1">
+              <a:spcBef>
+                <a:spcPct val="0"/>
+              </a:spcBef>
+              <a:buNone/>
+              <a:defRPr sz="4600" kern="1200" cap="none" spc="-100" baseline="0">
+                <a:ln>
+                  <a:noFill/>
+                </a:ln>
+                <a:solidFill>
+                  <a:schemeClr val="tx2"/>
+                </a:solidFill>
+                <a:effectLst/>
+                <a:latin typeface="+mj-lt"/>
+                <a:ea typeface="+mj-ea"/>
+                <a:cs typeface="+mj-cs"/>
+              </a:defRPr>
+            </a:lvl1pPr>
+          </a:lstStyle>
+          <a:p>
+            <a:r>
+              <a:rPr lang="en-US" sz="4000" dirty="0" err="1" smtClean="0"/>
+              <a:t>Diagramma</a:t>
+            </a:r>
+            <a:r>
+              <a:rPr lang="en-US" sz="4000" dirty="0" smtClean="0"/>
+              <a:t> </a:t>
+            </a:r>
+            <a:r>
+              <a:rPr lang="en-US" sz="4000" dirty="0" err="1" smtClean="0"/>
+              <a:t>dei</a:t>
+            </a:r>
+            <a:r>
+              <a:rPr lang="en-US" sz="4000" dirty="0" smtClean="0"/>
+              <a:t> </a:t>
+            </a:r>
+            <a:r>
+              <a:rPr lang="en-US" sz="4000" dirty="0" err="1" smtClean="0"/>
+              <a:t>casi</a:t>
+            </a:r>
+            <a:r>
+              <a:rPr lang="en-US" sz="4000" dirty="0" smtClean="0"/>
+              <a:t> </a:t>
+            </a:r>
+            <a:r>
+              <a:rPr lang="en-US" sz="4000" dirty="0" err="1" smtClean="0"/>
+              <a:t>d’uso</a:t>
+            </a:r>
+            <a:endParaRPr lang="en-US" sz="4000" dirty="0"/>
+          </a:p>
+        </p:txBody>
+      </p:sp>
     </p:spTree>
     <p:extLst>
       <p:ext uri="{BB962C8B-B14F-4D97-AF65-F5344CB8AC3E}">
@@ -4358,8 +4451,8 @@
         </p:nvSpPr>
         <p:spPr>
           <a:xfrm>
-            <a:off x="457200" y="1600200"/>
-            <a:ext cx="7620000" cy="4017885"/>
+            <a:off x="457200" y="1931205"/>
+            <a:ext cx="6726340" cy="4248314"/>
           </a:xfrm>
         </p:spPr>
         <p:txBody>
@@ -4372,19 +4465,19 @@
               <a:buNone/>
             </a:pPr>
             <a:r>
-              <a:rPr lang="en-US" dirty="0" err="1" smtClean="0"/>
+              <a:rPr lang="en-US" sz="2400" dirty="0" err="1" smtClean="0"/>
               <a:t>Linguaggio</a:t>
             </a:r>
             <a:r>
-              <a:rPr lang="en-US" dirty="0" smtClean="0"/>
+              <a:rPr lang="en-US" sz="2400" dirty="0" smtClean="0"/>
               <a:t>: </a:t>
             </a:r>
             <a:r>
-              <a:rPr lang="en-US" dirty="0" err="1" smtClean="0"/>
+              <a:rPr lang="en-US" sz="2400" dirty="0" err="1" smtClean="0"/>
               <a:t>Arduino</a:t>
             </a:r>
             <a:r>
-              <a:rPr lang="en-US" dirty="0" smtClean="0"/>
+              <a:rPr lang="en-US" sz="2400" dirty="0" smtClean="0"/>
               <a:t> Programming Language</a:t>
             </a:r>
           </a:p>
@@ -4392,64 +4485,90 @@
             <a:pPr marL="0" indent="0">
               <a:buNone/>
             </a:pPr>
-            <a:endParaRPr lang="en-US" dirty="0" smtClean="0"/>
-          </a:p>
-          <a:p>
-            <a:r>
-              <a:rPr lang="en-US" dirty="0" err="1" smtClean="0"/>
+            <a:endParaRPr lang="en-US" sz="2400" dirty="0" smtClean="0"/>
+          </a:p>
+          <a:p>
+            <a:pPr>
+              <a:buFont typeface="Wingdings" pitchFamily="2" charset="2"/>
+              <a:buChar char="Ø"/>
+            </a:pPr>
+            <a:r>
+              <a:rPr lang="en-US" sz="2400" dirty="0" err="1" smtClean="0"/>
               <a:t>Arduino</a:t>
             </a:r>
             <a:r>
-              <a:rPr lang="en-US" dirty="0" smtClean="0"/>
+              <a:rPr lang="en-US" sz="2400" dirty="0" smtClean="0"/>
               <a:t> UNO</a:t>
             </a:r>
           </a:p>
           <a:p>
-            <a:r>
-              <a:rPr lang="en-US" dirty="0" err="1" smtClean="0"/>
+            <a:pPr>
+              <a:buFont typeface="Wingdings" pitchFamily="2" charset="2"/>
+              <a:buChar char="Ø"/>
+            </a:pPr>
+            <a:r>
+              <a:rPr lang="en-US" sz="2400" dirty="0" err="1" smtClean="0"/>
               <a:t>Ricevitore</a:t>
             </a:r>
             <a:r>
-              <a:rPr lang="en-US" dirty="0" smtClean="0"/>
+              <a:rPr lang="en-US" sz="2400" dirty="0" smtClean="0"/>
               <a:t> RF</a:t>
             </a:r>
           </a:p>
           <a:p>
-            <a:r>
-              <a:rPr lang="en-US" dirty="0" err="1" smtClean="0"/>
+            <a:pPr>
+              <a:buFont typeface="Wingdings" pitchFamily="2" charset="2"/>
+              <a:buChar char="Ø"/>
+            </a:pPr>
+            <a:r>
+              <a:rPr lang="en-US" sz="2400" dirty="0" err="1" smtClean="0"/>
               <a:t>Lettore</a:t>
             </a:r>
             <a:r>
-              <a:rPr lang="en-US" dirty="0" smtClean="0"/>
+              <a:rPr lang="en-US" sz="2400" dirty="0" smtClean="0"/>
               <a:t> RFID</a:t>
             </a:r>
-            <a:endParaRPr lang="en-US" dirty="0" smtClean="0"/>
-          </a:p>
-          <a:p>
-            <a:r>
-              <a:rPr lang="en-US" dirty="0" smtClean="0"/>
+          </a:p>
+          <a:p>
+            <a:pPr>
+              <a:buFont typeface="Wingdings" pitchFamily="2" charset="2"/>
+              <a:buChar char="Ø"/>
+            </a:pPr>
+            <a:r>
+              <a:rPr lang="en-US" sz="2400" dirty="0" smtClean="0"/>
               <a:t>Keypad 4x4</a:t>
             </a:r>
           </a:p>
           <a:p>
-            <a:r>
-              <a:rPr lang="en-US" dirty="0" smtClean="0"/>
+            <a:pPr>
+              <a:buFont typeface="Wingdings" pitchFamily="2" charset="2"/>
+              <a:buChar char="Ø"/>
+            </a:pPr>
+            <a:r>
+              <a:rPr lang="en-US" sz="2400" dirty="0" smtClean="0"/>
               <a:t>LCD 16x2</a:t>
             </a:r>
           </a:p>
           <a:p>
-            <a:r>
-              <a:rPr lang="en-US" dirty="0" err="1" smtClean="0"/>
+            <a:pPr>
+              <a:buFont typeface="Wingdings" pitchFamily="2" charset="2"/>
+              <a:buChar char="Ø"/>
+            </a:pPr>
+            <a:r>
+              <a:rPr lang="en-US" sz="2400" dirty="0" err="1" smtClean="0"/>
               <a:t>Servomotore</a:t>
             </a:r>
-            <a:endParaRPr lang="en-US" dirty="0" smtClean="0"/>
-          </a:p>
-          <a:p>
-            <a:r>
-              <a:rPr lang="en-US" dirty="0" smtClean="0"/>
+            <a:endParaRPr lang="en-US" sz="2400" dirty="0" smtClean="0"/>
+          </a:p>
+          <a:p>
+            <a:pPr>
+              <a:buFont typeface="Wingdings" pitchFamily="2" charset="2"/>
+              <a:buChar char="Ø"/>
+            </a:pPr>
+            <a:r>
+              <a:rPr lang="en-US" sz="2400" dirty="0" smtClean="0"/>
               <a:t>ESP8266</a:t>
             </a:r>
-            <a:endParaRPr lang="en-US" dirty="0" smtClean="0"/>
           </a:p>
         </p:txBody>
       </p:sp>
@@ -4506,21 +4625,22 @@
           <a:lstStyle/>
           <a:p>
             <a:r>
-              <a:rPr lang="en-US" dirty="0" err="1"/>
+              <a:rPr lang="en-US" sz="4100" dirty="0" err="1" smtClean="0"/>
               <a:t>Sviluppo</a:t>
             </a:r>
             <a:r>
-              <a:rPr lang="en-US" dirty="0"/>
+              <a:rPr lang="en-US" sz="4100" dirty="0" smtClean="0"/>
               <a:t> del </a:t>
             </a:r>
             <a:r>
-              <a:rPr lang="en-US" dirty="0" err="1"/>
+              <a:rPr lang="en-US" sz="4100" dirty="0" err="1" smtClean="0"/>
               <a:t>sito</a:t>
             </a:r>
             <a:r>
-              <a:rPr lang="en-US" dirty="0"/>
+              <a:rPr lang="en-US" sz="4100" dirty="0" smtClean="0"/>
               <a:t> web</a:t>
             </a:r>
+            <a:endParaRPr lang="en-US" sz="4100" dirty="0"/>
           </a:p>
         </p:txBody>
       </p:sp>
@@ -4536,69 +4656,155 @@
         </p:nvSpPr>
         <p:spPr>
           <a:xfrm>
-            <a:off x="1077145" y="3150200"/>
-            <a:ext cx="2732220" cy="676649"/>
+            <a:off x="454737" y="1969610"/>
+            <a:ext cx="5231008" cy="4339765"/>
           </a:xfrm>
+          <a:solidFill>
+            <a:schemeClr val="bg1"/>
+          </a:solidFill>
         </p:spPr>
         <p:txBody>
           <a:bodyPr>
-            <a:normAutofit/>
+            <a:normAutofit lnSpcReduction="10000"/>
           </a:bodyPr>
           <a:lstStyle/>
           <a:p>
+            <a:pPr marL="0" indent="0">
+              <a:buNone/>
+            </a:pPr>
+            <a:r>
+              <a:rPr lang="en-US" sz="2400" dirty="0" smtClean="0"/>
+              <a:t>Back-End: JavaScript</a:t>
+            </a:r>
+          </a:p>
+          <a:p>
+            <a:pPr marL="0" indent="0">
+              <a:buNone/>
+            </a:pPr>
+            <a:endParaRPr lang="en-US" sz="2400" dirty="0" smtClean="0"/>
+          </a:p>
+          <a:p>
+            <a:pPr>
+              <a:buFont typeface="Wingdings" pitchFamily="2" charset="2"/>
+              <a:buChar char="Ø"/>
+            </a:pPr>
+            <a:r>
+              <a:rPr lang="en-US" sz="2400" dirty="0" smtClean="0"/>
+              <a:t>Raspberry </a:t>
+            </a:r>
+            <a:r>
+              <a:rPr lang="en-US" sz="2400" dirty="0" smtClean="0"/>
+              <a:t>Pi | hosting</a:t>
+            </a:r>
+          </a:p>
+          <a:p>
+            <a:pPr>
+              <a:buFont typeface="Wingdings" pitchFamily="2" charset="2"/>
+              <a:buChar char="Ø"/>
+            </a:pPr>
+            <a:endParaRPr lang="en-US" sz="2400" dirty="0" smtClean="0"/>
+          </a:p>
+          <a:p>
+            <a:pPr>
+              <a:buFont typeface="Wingdings" pitchFamily="2" charset="2"/>
+              <a:buChar char="Ø"/>
+            </a:pPr>
+            <a:r>
+              <a:rPr lang="en-US" sz="2400" dirty="0" smtClean="0"/>
+              <a:t>Node.js | </a:t>
+            </a:r>
+            <a:r>
+              <a:rPr lang="en-US" sz="2400" dirty="0" err="1" smtClean="0"/>
+              <a:t>efficienza</a:t>
+            </a:r>
+            <a:r>
+              <a:rPr lang="en-US" sz="2400" dirty="0" smtClean="0"/>
+              <a:t>, </a:t>
+            </a:r>
+            <a:r>
+              <a:rPr lang="en-US" sz="2400" dirty="0" err="1" smtClean="0"/>
+              <a:t>scalabilità</a:t>
+            </a:r>
+            <a:r>
+              <a:rPr lang="en-US" sz="2400" dirty="0" smtClean="0"/>
+              <a:t>, NPM</a:t>
+            </a:r>
+          </a:p>
+          <a:p>
+            <a:pPr>
+              <a:buFont typeface="Wingdings" pitchFamily="2" charset="2"/>
+              <a:buChar char="Ø"/>
+            </a:pPr>
+            <a:endParaRPr lang="en-US" sz="2400" dirty="0" smtClean="0"/>
+          </a:p>
+          <a:p>
+            <a:pPr>
+              <a:buFont typeface="Wingdings" pitchFamily="2" charset="2"/>
+              <a:buChar char="Ø"/>
+            </a:pPr>
+            <a:r>
+              <a:rPr lang="en-US" sz="2400" dirty="0" err="1" smtClean="0"/>
+              <a:t>MongoDB</a:t>
+            </a:r>
+            <a:r>
+              <a:rPr lang="en-US" sz="2400" dirty="0" smtClean="0"/>
+              <a:t> | </a:t>
+            </a:r>
+            <a:r>
+              <a:rPr lang="en-US" sz="2400" dirty="0" err="1" smtClean="0"/>
+              <a:t>NoSQL</a:t>
+            </a:r>
+            <a:endParaRPr lang="en-US" sz="2400" dirty="0" smtClean="0"/>
+          </a:p>
+          <a:p>
+            <a:pPr>
+              <a:buFont typeface="Wingdings" pitchFamily="2" charset="2"/>
+              <a:buChar char="Ø"/>
+            </a:pPr>
+            <a:endParaRPr lang="en-US" sz="2400" dirty="0" smtClean="0"/>
+          </a:p>
+          <a:p>
+            <a:pPr>
+              <a:buFont typeface="Wingdings" pitchFamily="2" charset="2"/>
+              <a:buChar char="Ø"/>
+            </a:pPr>
+            <a:r>
+              <a:rPr lang="en-US" sz="2400" dirty="0" smtClean="0"/>
+              <a:t>API </a:t>
+            </a:r>
+            <a:r>
+              <a:rPr lang="en-US" sz="2400" dirty="0" err="1" smtClean="0"/>
+              <a:t>RESTful</a:t>
+            </a:r>
+            <a:r>
+              <a:rPr lang="en-US" sz="2400" dirty="0" smtClean="0"/>
+              <a:t> | </a:t>
+            </a:r>
+            <a:r>
+              <a:rPr lang="en-US" sz="2400" dirty="0" err="1" smtClean="0"/>
+              <a:t>risorse</a:t>
+            </a:r>
+            <a:r>
+              <a:rPr lang="en-US" sz="2400" dirty="0" smtClean="0"/>
+              <a:t>, URI </a:t>
+            </a:r>
+            <a:endParaRPr lang="en-US" sz="2400" dirty="0"/>
+          </a:p>
+          <a:p>
+            <a:pPr marL="0" indent="0">
+              <a:buNone/>
+            </a:pPr>
             <a:r>
               <a:rPr lang="en-US" dirty="0" smtClean="0"/>
-              <a:t>MVC pattern</a:t>
-            </a:r>
-            <a:endParaRPr lang="en-US" dirty="0"/>
-          </a:p>
-        </p:txBody>
-      </p:sp>
-      <p:pic>
-        <p:nvPicPr>
-          <p:cNvPr id="4" name="Picture 3" descr="C:\Users\Jolsty\Desktop\SimSimGit\SimSim\Tesi_Sistema_Accessi_IoT_Andrei_Ciulpan_872394\img\mvc.png"/>
-          <p:cNvPicPr>
-            <a:picLocks noChangeAspect="1" noChangeArrowheads="1"/>
-          </p:cNvPicPr>
-          <p:nvPr/>
-        </p:nvPicPr>
-        <p:blipFill>
-          <a:blip r:embed="rId2">
-            <a:extLst>
-              <a:ext uri="{28A0092B-C50C-407E-A947-70E740481C1C}">
-                <a14:useLocalDpi xmlns:a14="http://schemas.microsoft.com/office/drawing/2010/main" val="0"/>
-              </a:ext>
-            </a:extLst>
-          </a:blip>
-          <a:srcRect/>
-          <a:stretch>
-            <a:fillRect/>
-          </a:stretch>
-        </p:blipFill>
-        <p:spPr bwMode="auto">
-          <a:xfrm>
-            <a:off x="4379975" y="1409773"/>
-            <a:ext cx="4419797" cy="4834153"/>
-          </a:xfrm>
-          <a:prstGeom prst="rect">
-            <a:avLst/>
-          </a:prstGeom>
-          <a:noFill/>
-          <a:extLst>
-            <a:ext uri="{909E8E84-426E-40DD-AFC4-6F175D3DCCD1}">
-              <a14:hiddenFill xmlns:a14="http://schemas.microsoft.com/office/drawing/2010/main">
-                <a:solidFill>
-                  <a:srgbClr val="FFFFFF"/>
-                </a:solidFill>
-              </a14:hiddenFill>
-            </a:ext>
-          </a:extLst>
-        </p:spPr>
-      </p:pic>
+              <a:t>		</a:t>
+            </a:r>
+          </a:p>
+        </p:txBody>
+      </p:sp>
     </p:spTree>
     <p:extLst>
       <p:ext uri="{BB962C8B-B14F-4D97-AF65-F5344CB8AC3E}">
-        <p14:creationId xmlns:p14="http://schemas.microsoft.com/office/powerpoint/2010/main" val="1719444841"/>
+        <p14:creationId xmlns:p14="http://schemas.microsoft.com/office/powerpoint/2010/main" val="471692749"/>
       </p:ext>
     </p:extLst>
   </p:cSld>
@@ -4648,22 +4854,21 @@
           <a:lstStyle/>
           <a:p>
             <a:r>
-              <a:rPr lang="en-US" dirty="0" err="1" smtClean="0"/>
+              <a:rPr lang="en-US" dirty="0" err="1"/>
               <a:t>Sviluppo</a:t>
             </a:r>
             <a:r>
-              <a:rPr lang="en-US" dirty="0" smtClean="0"/>
+              <a:rPr lang="en-US" dirty="0"/>
               <a:t> del </a:t>
             </a:r>
             <a:r>
-              <a:rPr lang="en-US" dirty="0" err="1" smtClean="0"/>
+              <a:rPr lang="en-US" dirty="0" err="1"/>
               <a:t>sito</a:t>
             </a:r>
             <a:r>
-              <a:rPr lang="en-US" dirty="0" smtClean="0"/>
+              <a:rPr lang="en-US" dirty="0"/>
               <a:t> web</a:t>
             </a:r>
-            <a:endParaRPr lang="en-US" dirty="0"/>
           </a:p>
         </p:txBody>
       </p:sp>
@@ -4679,94 +4884,73 @@
         </p:nvSpPr>
         <p:spPr>
           <a:xfrm>
-            <a:off x="769905" y="1600201"/>
-            <a:ext cx="7681000" cy="4478744"/>
+            <a:off x="539475" y="2161635"/>
+            <a:ext cx="2304300" cy="676649"/>
           </a:xfrm>
-          <a:solidFill>
-            <a:schemeClr val="bg1"/>
-          </a:solidFill>
         </p:spPr>
         <p:txBody>
           <a:bodyPr>
-            <a:normAutofit/>
+            <a:noAutofit/>
           </a:bodyPr>
           <a:lstStyle/>
-          <a:p>
-            <a:pPr marL="0" indent="0">
-              <a:buNone/>
-            </a:pPr>
-            <a:r>
-              <a:rPr lang="en-US" dirty="0" smtClean="0"/>
-              <a:t>Back-End: </a:t>
-            </a:r>
-            <a:r>
-              <a:rPr lang="en-US" dirty="0" smtClean="0"/>
-              <a:t>JavaScript</a:t>
-            </a:r>
-          </a:p>
-          <a:p>
-            <a:pPr marL="0" indent="0">
-              <a:buNone/>
-            </a:pPr>
-            <a:endParaRPr lang="en-US" dirty="0" smtClean="0"/>
-          </a:p>
           <a:p>
             <a:pPr>
               <a:buFont typeface="Wingdings" pitchFamily="2" charset="2"/>
               <a:buChar char="Ø"/>
             </a:pPr>
             <a:r>
-              <a:rPr lang="en-US" dirty="0" smtClean="0"/>
-              <a:t>Raspberry Pi</a:t>
-            </a:r>
-          </a:p>
-          <a:p>
-            <a:pPr>
-              <a:buFont typeface="Wingdings" pitchFamily="2" charset="2"/>
-              <a:buChar char="Ø"/>
-            </a:pPr>
-            <a:r>
-              <a:rPr lang="en-US" dirty="0" smtClean="0"/>
-              <a:t>Node.js</a:t>
-            </a:r>
-          </a:p>
-          <a:p>
-            <a:pPr>
-              <a:buFont typeface="Wingdings" pitchFamily="2" charset="2"/>
-              <a:buChar char="Ø"/>
-            </a:pPr>
-            <a:r>
-              <a:rPr lang="en-US" dirty="0" err="1" smtClean="0"/>
-              <a:t>MongoDB</a:t>
-            </a:r>
-            <a:endParaRPr lang="en-US" dirty="0" smtClean="0"/>
-          </a:p>
-          <a:p>
-            <a:pPr>
-              <a:buFont typeface="Wingdings" pitchFamily="2" charset="2"/>
-              <a:buChar char="Ø"/>
-            </a:pPr>
-            <a:r>
-              <a:rPr lang="en-US" dirty="0" err="1" smtClean="0"/>
-              <a:t>RESTful</a:t>
-            </a:r>
-            <a:endParaRPr lang="en-US" dirty="0"/>
-          </a:p>
-          <a:p>
-            <a:pPr marL="0" indent="0">
-              <a:buNone/>
-            </a:pPr>
-            <a:r>
-              <a:rPr lang="en-US" dirty="0" smtClean="0"/>
-              <a:t>		</a:t>
-            </a:r>
-          </a:p>
-        </p:txBody>
-      </p:sp>
+              <a:rPr lang="en-US" sz="2400" dirty="0" smtClean="0"/>
+              <a:t>Pattern MVC</a:t>
+            </a:r>
+            <a:endParaRPr lang="en-US" sz="2400" dirty="0"/>
+          </a:p>
+        </p:txBody>
+      </p:sp>
+      <p:pic>
+        <p:nvPicPr>
+          <p:cNvPr id="1026" name="Picture 2" descr="C:\Users\Jolsty\Desktop\SimSimGit\SimSim\Tesi_Sistema_Accessi_IoT_Andrei_Ciulpan_872394\presentazione\img\mvc.png"/>
+          <p:cNvPicPr>
+            <a:picLocks noChangeAspect="1" noChangeArrowheads="1"/>
+          </p:cNvPicPr>
+          <p:nvPr/>
+        </p:nvPicPr>
+        <p:blipFill>
+          <a:blip r:embed="rId2">
+            <a:extLst>
+              <a:ext uri="{28A0092B-C50C-407E-A947-70E740481C1C}">
+                <a14:useLocalDpi xmlns:a14="http://schemas.microsoft.com/office/drawing/2010/main" val="0"/>
+              </a:ext>
+            </a:extLst>
+          </a:blip>
+          <a:srcRect/>
+          <a:stretch>
+            <a:fillRect/>
+          </a:stretch>
+        </p:blipFill>
+        <p:spPr bwMode="auto">
+          <a:xfrm>
+            <a:off x="839156" y="2849807"/>
+            <a:ext cx="6644065" cy="3213202"/>
+          </a:xfrm>
+          <a:prstGeom prst="rect">
+            <a:avLst/>
+          </a:prstGeom>
+          <a:noFill/>
+          <a:extLst>
+            <a:ext uri="{909E8E84-426E-40DD-AFC4-6F175D3DCCD1}">
+              <a14:hiddenFill xmlns:a14="http://schemas.microsoft.com/office/drawing/2010/main">
+                <a:solidFill>
+                  <a:srgbClr val="FFFFFF"/>
+                </a:solidFill>
+              </a14:hiddenFill>
+            </a:ext>
+          </a:extLst>
+        </p:spPr>
+      </p:pic>
     </p:spTree>
     <p:extLst>
       <p:ext uri="{BB962C8B-B14F-4D97-AF65-F5344CB8AC3E}">
-        <p14:creationId xmlns:p14="http://schemas.microsoft.com/office/powerpoint/2010/main" val="471692749"/>
+        <p14:creationId xmlns:p14="http://schemas.microsoft.com/office/powerpoint/2010/main" val="1719444841"/>
       </p:ext>
     </p:extLst>
   </p:cSld>
@@ -5145,8 +5329,13 @@
             </a:r>
             <a:r>
               <a:rPr lang="en-US" dirty="0" smtClean="0"/>
-              <a:t> Internet: RTC </a:t>
-            </a:r>
+              <a:t> </a:t>
+            </a:r>
+            <a:r>
+              <a:rPr lang="en-US" dirty="0" smtClean="0"/>
+              <a:t>Internet -&gt; RTC </a:t>
+            </a:r>
+            <a:endParaRPr lang="en-US" dirty="0" smtClean="0"/>
           </a:p>
           <a:p>
             <a:r>
@@ -5446,12 +5635,8 @@
           </a:p>
           <a:p>
             <a:r>
-              <a:rPr lang="en-US" dirty="0" err="1" smtClean="0"/>
-              <a:t>Sistema</a:t>
-            </a:r>
-            <a:r>
               <a:rPr lang="en-US" dirty="0" smtClean="0"/>
-              <a:t> di login </a:t>
+              <a:t>Sistema di login </a:t>
             </a:r>
           </a:p>
           <a:p>
@@ -5490,19 +5675,12 @@
           </a:p>
           <a:p>
             <a:r>
-              <a:rPr lang="en-US" dirty="0" err="1" smtClean="0"/>
-              <a:t>Videocamera</a:t>
-            </a:r>
-            <a:endParaRPr lang="en-US" dirty="0" smtClean="0"/>
-          </a:p>
-          <a:p>
-            <a:r>
-              <a:rPr lang="en-US" dirty="0" err="1" smtClean="0"/>
-              <a:t>Sistema</a:t>
-            </a:r>
-            <a:r>
               <a:rPr lang="en-US" dirty="0" smtClean="0"/>
-              <a:t> di </a:t>
+              <a:t>Sistema </a:t>
+            </a:r>
+            <a:r>
+              <a:rPr lang="en-US" dirty="0" smtClean="0"/>
+              <a:t>di </a:t>
             </a:r>
             <a:r>
               <a:rPr lang="en-US" dirty="0" err="1" smtClean="0"/>

</xml_diff>

<commit_message>
finito presentazione + discorso, devo ancora stilizzarla meglio
</commit_message>
<xml_diff>
--- a/Tesi_Sistema_Accessi_IoT_Andrei_Ciulpan_872394/presentazione/Sistema Accessi IoT.pptx
+++ b/Tesi_Sistema_Accessi_IoT_Andrei_Ciulpan_872394/presentazione/Sistema Accessi IoT.pptx
@@ -223,7 +223,7 @@
           <a:p>
             <a:fld id="{7E2CBA20-3CC6-4CA7-A64E-677853DDDBDD}" type="datetimeFigureOut">
               <a:rPr lang="en-US" smtClean="0"/>
-              <a:t>23-Jun-19</a:t>
+              <a:t>24-Jun-19</a:t>
             </a:fld>
             <a:endParaRPr lang="en-US"/>
           </a:p>
@@ -491,6 +491,1613 @@
 </p:notesMaster>
 </file>
 
+<file path=ppt/notesSlides/notesSlide1.xml><?xml version="1.0" encoding="utf-8"?>
+<p:notes xmlns:a="http://schemas.openxmlformats.org/drawingml/2006/main" xmlns:r="http://schemas.openxmlformats.org/officeDocument/2006/relationships" xmlns:p="http://schemas.openxmlformats.org/presentationml/2006/main">
+  <p:cSld>
+    <p:spTree>
+      <p:nvGrpSpPr>
+        <p:cNvPr id="1" name=""/>
+        <p:cNvGrpSpPr/>
+        <p:nvPr/>
+      </p:nvGrpSpPr>
+      <p:grpSpPr>
+        <a:xfrm>
+          <a:off x="0" y="0"/>
+          <a:ext cx="0" cy="0"/>
+          <a:chOff x="0" y="0"/>
+          <a:chExt cx="0" cy="0"/>
+        </a:xfrm>
+      </p:grpSpPr>
+      <p:sp>
+        <p:nvSpPr>
+          <p:cNvPr id="2" name="Substituent imagine diapozitiv 1"/>
+          <p:cNvSpPr>
+            <a:spLocks noGrp="1" noRot="1" noChangeAspect="1"/>
+          </p:cNvSpPr>
+          <p:nvPr>
+            <p:ph type="sldImg"/>
+          </p:nvPr>
+        </p:nvSpPr>
+        <p:spPr/>
+      </p:sp>
+      <p:sp>
+        <p:nvSpPr>
+          <p:cNvPr id="3" name="Substituent note 2"/>
+          <p:cNvSpPr>
+            <a:spLocks noGrp="1"/>
+          </p:cNvSpPr>
+          <p:nvPr>
+            <p:ph type="body" idx="1"/>
+          </p:nvPr>
+        </p:nvSpPr>
+        <p:spPr/>
+        <p:txBody>
+          <a:bodyPr/>
+          <a:lstStyle/>
+          <a:p>
+            <a:r>
+              <a:rPr lang="it-IT" dirty="0" smtClean="0"/>
+              <a:t>Buongiorno, sono Andrei Ciulpan (nr. matricola 872394) e oggi presento</a:t>
+            </a:r>
+          </a:p>
+          <a:p>
+            <a:r>
+              <a:rPr lang="it-IT" dirty="0" smtClean="0"/>
+              <a:t>il progetto su cui ho lavorato durante il tirocinio all'interno di Yatta, </a:t>
+            </a:r>
+          </a:p>
+          <a:p>
+            <a:r>
+              <a:rPr lang="it-IT" dirty="0" smtClean="0"/>
+              <a:t>un makerspace in centro a Milano, munito di un laboratorio in cui gli studenti</a:t>
+            </a:r>
+          </a:p>
+          <a:p>
+            <a:r>
+              <a:rPr lang="it-IT" dirty="0" smtClean="0"/>
+              <a:t>tirocinanti sono inseriti per partecipare allo sviluppo di progetti di physical computing.</a:t>
+            </a:r>
+          </a:p>
+          <a:p>
+            <a:r>
+              <a:rPr lang="it-IT" dirty="0" smtClean="0"/>
+              <a:t>Il progetto ha portato alla creazione di un prototipo (chiamato SimSim) </a:t>
+            </a:r>
+          </a:p>
+          <a:p>
+            <a:r>
+              <a:rPr lang="it-IT" dirty="0" smtClean="0"/>
+              <a:t>di un sistema di controlli accessi basato su un microcontrollore da applicare poi all'interno dell'azienda. </a:t>
+            </a:r>
+          </a:p>
+          <a:p>
+            <a:r>
+              <a:rPr lang="it-IT" dirty="0" smtClean="0"/>
+              <a:t>Si tratta di un sistema IoT (che sta per Internet of Things) in cui la connessione </a:t>
+            </a:r>
+          </a:p>
+          <a:p>
+            <a:r>
+              <a:rPr lang="it-IT" dirty="0" smtClean="0"/>
+              <a:t>Internet viene estesa anche al mondo degli oggetti fisici comunemente chiamati "oggetti smart".  </a:t>
+            </a:r>
+          </a:p>
+          <a:p>
+            <a:r>
+              <a:rPr lang="it-IT" dirty="0" smtClean="0"/>
+              <a:t>Questi oggetti sono normalmente dotati di un processore embedded, sensori e attuatori e sono in grado</a:t>
+            </a:r>
+          </a:p>
+          <a:p>
+            <a:r>
+              <a:rPr lang="it-IT" dirty="0" smtClean="0"/>
+              <a:t>di mandare dati in rete verso il back-end di un'applicazione dove potranno poi essere salvati ed elaborati.</a:t>
+            </a:r>
+            <a:endParaRPr lang="en-US" dirty="0"/>
+          </a:p>
+        </p:txBody>
+      </p:sp>
+      <p:sp>
+        <p:nvSpPr>
+          <p:cNvPr id="4" name="Substituent număr diapozitiv 3"/>
+          <p:cNvSpPr>
+            <a:spLocks noGrp="1"/>
+          </p:cNvSpPr>
+          <p:nvPr>
+            <p:ph type="sldNum" sz="quarter" idx="10"/>
+          </p:nvPr>
+        </p:nvSpPr>
+        <p:spPr/>
+        <p:txBody>
+          <a:bodyPr/>
+          <a:lstStyle/>
+          <a:p>
+            <a:fld id="{5D5D8A57-A6DA-4DCE-ADC7-3F4B291DAEDD}" type="slidenum">
+              <a:rPr lang="en-US" smtClean="0"/>
+              <a:t>1</a:t>
+            </a:fld>
+            <a:endParaRPr lang="en-US"/>
+          </a:p>
+        </p:txBody>
+      </p:sp>
+    </p:spTree>
+    <p:extLst>
+      <p:ext uri="{BB962C8B-B14F-4D97-AF65-F5344CB8AC3E}">
+        <p14:creationId xmlns:p14="http://schemas.microsoft.com/office/powerpoint/2010/main" val="1978141208"/>
+      </p:ext>
+    </p:extLst>
+  </p:cSld>
+  <p:clrMapOvr>
+    <a:masterClrMapping/>
+  </p:clrMapOvr>
+</p:notes>
+</file>
+
+<file path=ppt/notesSlides/notesSlide10.xml><?xml version="1.0" encoding="utf-8"?>
+<p:notes xmlns:a="http://schemas.openxmlformats.org/drawingml/2006/main" xmlns:r="http://schemas.openxmlformats.org/officeDocument/2006/relationships" xmlns:p="http://schemas.openxmlformats.org/presentationml/2006/main">
+  <p:cSld>
+    <p:spTree>
+      <p:nvGrpSpPr>
+        <p:cNvPr id="1" name=""/>
+        <p:cNvGrpSpPr/>
+        <p:nvPr/>
+      </p:nvGrpSpPr>
+      <p:grpSpPr>
+        <a:xfrm>
+          <a:off x="0" y="0"/>
+          <a:ext cx="0" cy="0"/>
+          <a:chOff x="0" y="0"/>
+          <a:chExt cx="0" cy="0"/>
+        </a:xfrm>
+      </p:grpSpPr>
+      <p:sp>
+        <p:nvSpPr>
+          <p:cNvPr id="2" name="Substituent imagine diapozitiv 1"/>
+          <p:cNvSpPr>
+            <a:spLocks noGrp="1" noRot="1" noChangeAspect="1"/>
+          </p:cNvSpPr>
+          <p:nvPr>
+            <p:ph type="sldImg"/>
+          </p:nvPr>
+        </p:nvSpPr>
+        <p:spPr/>
+      </p:sp>
+      <p:sp>
+        <p:nvSpPr>
+          <p:cNvPr id="3" name="Substituent note 2"/>
+          <p:cNvSpPr>
+            <a:spLocks noGrp="1"/>
+          </p:cNvSpPr>
+          <p:nvPr>
+            <p:ph type="body" idx="1"/>
+          </p:nvPr>
+        </p:nvSpPr>
+        <p:spPr/>
+        <p:txBody>
+          <a:bodyPr/>
+          <a:lstStyle/>
+          <a:p>
+            <a:r>
+              <a:rPr lang="it-IT" dirty="0" smtClean="0"/>
+              <a:t>Questo è il prototipo finale che è stato presentato anche all'Arduino Day. </a:t>
+            </a:r>
+          </a:p>
+          <a:p>
+            <a:r>
+              <a:rPr lang="it-IT" dirty="0" smtClean="0"/>
+              <a:t>Vorrei ringraziare la mia collega Cecilia per la creazione del modello 3D </a:t>
+            </a:r>
+            <a:endParaRPr lang="en-US" dirty="0"/>
+          </a:p>
+        </p:txBody>
+      </p:sp>
+      <p:sp>
+        <p:nvSpPr>
+          <p:cNvPr id="4" name="Substituent număr diapozitiv 3"/>
+          <p:cNvSpPr>
+            <a:spLocks noGrp="1"/>
+          </p:cNvSpPr>
+          <p:nvPr>
+            <p:ph type="sldNum" sz="quarter" idx="10"/>
+          </p:nvPr>
+        </p:nvSpPr>
+        <p:spPr/>
+        <p:txBody>
+          <a:bodyPr/>
+          <a:lstStyle/>
+          <a:p>
+            <a:fld id="{5D5D8A57-A6DA-4DCE-ADC7-3F4B291DAEDD}" type="slidenum">
+              <a:rPr lang="en-US" smtClean="0"/>
+              <a:t>10</a:t>
+            </a:fld>
+            <a:endParaRPr lang="en-US"/>
+          </a:p>
+        </p:txBody>
+      </p:sp>
+    </p:spTree>
+    <p:extLst>
+      <p:ext uri="{BB962C8B-B14F-4D97-AF65-F5344CB8AC3E}">
+        <p14:creationId xmlns:p14="http://schemas.microsoft.com/office/powerpoint/2010/main" val="673875981"/>
+      </p:ext>
+    </p:extLst>
+  </p:cSld>
+  <p:clrMapOvr>
+    <a:masterClrMapping/>
+  </p:clrMapOvr>
+</p:notes>
+</file>
+
+<file path=ppt/notesSlides/notesSlide11.xml><?xml version="1.0" encoding="utf-8"?>
+<p:notes xmlns:a="http://schemas.openxmlformats.org/drawingml/2006/main" xmlns:r="http://schemas.openxmlformats.org/officeDocument/2006/relationships" xmlns:p="http://schemas.openxmlformats.org/presentationml/2006/main">
+  <p:cSld>
+    <p:spTree>
+      <p:nvGrpSpPr>
+        <p:cNvPr id="1" name=""/>
+        <p:cNvGrpSpPr/>
+        <p:nvPr/>
+      </p:nvGrpSpPr>
+      <p:grpSpPr>
+        <a:xfrm>
+          <a:off x="0" y="0"/>
+          <a:ext cx="0" cy="0"/>
+          <a:chOff x="0" y="0"/>
+          <a:chExt cx="0" cy="0"/>
+        </a:xfrm>
+      </p:grpSpPr>
+      <p:sp>
+        <p:nvSpPr>
+          <p:cNvPr id="2" name="Substituent imagine diapozitiv 1"/>
+          <p:cNvSpPr>
+            <a:spLocks noGrp="1" noRot="1" noChangeAspect="1"/>
+          </p:cNvSpPr>
+          <p:nvPr>
+            <p:ph type="sldImg"/>
+          </p:nvPr>
+        </p:nvSpPr>
+        <p:spPr/>
+      </p:sp>
+      <p:sp>
+        <p:nvSpPr>
+          <p:cNvPr id="3" name="Substituent note 2"/>
+          <p:cNvSpPr>
+            <a:spLocks noGrp="1"/>
+          </p:cNvSpPr>
+          <p:nvPr>
+            <p:ph type="body" idx="1"/>
+          </p:nvPr>
+        </p:nvSpPr>
+        <p:spPr/>
+        <p:txBody>
+          <a:bodyPr/>
+          <a:lstStyle/>
+          <a:p>
+            <a:endParaRPr lang="it-IT" dirty="0" smtClean="0"/>
+          </a:p>
+          <a:p>
+            <a:r>
+              <a:rPr lang="it-IT" dirty="0" smtClean="0"/>
+              <a:t>Ringrazio la commissione e tutti quelli presenti per l'attenzione.</a:t>
+            </a:r>
+            <a:endParaRPr lang="en-US" dirty="0"/>
+          </a:p>
+        </p:txBody>
+      </p:sp>
+      <p:sp>
+        <p:nvSpPr>
+          <p:cNvPr id="4" name="Substituent număr diapozitiv 3"/>
+          <p:cNvSpPr>
+            <a:spLocks noGrp="1"/>
+          </p:cNvSpPr>
+          <p:nvPr>
+            <p:ph type="sldNum" sz="quarter" idx="10"/>
+          </p:nvPr>
+        </p:nvSpPr>
+        <p:spPr/>
+        <p:txBody>
+          <a:bodyPr/>
+          <a:lstStyle/>
+          <a:p>
+            <a:fld id="{5D5D8A57-A6DA-4DCE-ADC7-3F4B291DAEDD}" type="slidenum">
+              <a:rPr lang="en-US" smtClean="0"/>
+              <a:t>11</a:t>
+            </a:fld>
+            <a:endParaRPr lang="en-US"/>
+          </a:p>
+        </p:txBody>
+      </p:sp>
+    </p:spTree>
+    <p:extLst>
+      <p:ext uri="{BB962C8B-B14F-4D97-AF65-F5344CB8AC3E}">
+        <p14:creationId xmlns:p14="http://schemas.microsoft.com/office/powerpoint/2010/main" val="3564302276"/>
+      </p:ext>
+    </p:extLst>
+  </p:cSld>
+  <p:clrMapOvr>
+    <a:masterClrMapping/>
+  </p:clrMapOvr>
+</p:notes>
+</file>
+
+<file path=ppt/notesSlides/notesSlide2.xml><?xml version="1.0" encoding="utf-8"?>
+<p:notes xmlns:a="http://schemas.openxmlformats.org/drawingml/2006/main" xmlns:r="http://schemas.openxmlformats.org/officeDocument/2006/relationships" xmlns:p="http://schemas.openxmlformats.org/presentationml/2006/main">
+  <p:cSld>
+    <p:spTree>
+      <p:nvGrpSpPr>
+        <p:cNvPr id="1" name=""/>
+        <p:cNvGrpSpPr/>
+        <p:nvPr/>
+      </p:nvGrpSpPr>
+      <p:grpSpPr>
+        <a:xfrm>
+          <a:off x="0" y="0"/>
+          <a:ext cx="0" cy="0"/>
+          <a:chOff x="0" y="0"/>
+          <a:chExt cx="0" cy="0"/>
+        </a:xfrm>
+      </p:grpSpPr>
+      <p:sp>
+        <p:nvSpPr>
+          <p:cNvPr id="2" name="Substituent imagine diapozitiv 1"/>
+          <p:cNvSpPr>
+            <a:spLocks noGrp="1" noRot="1" noChangeAspect="1"/>
+          </p:cNvSpPr>
+          <p:nvPr>
+            <p:ph type="sldImg"/>
+          </p:nvPr>
+        </p:nvSpPr>
+        <p:spPr/>
+      </p:sp>
+      <p:sp>
+        <p:nvSpPr>
+          <p:cNvPr id="3" name="Substituent note 2"/>
+          <p:cNvSpPr>
+            <a:spLocks noGrp="1"/>
+          </p:cNvSpPr>
+          <p:nvPr>
+            <p:ph type="body" idx="1"/>
+          </p:nvPr>
+        </p:nvSpPr>
+        <p:spPr/>
+        <p:txBody>
+          <a:bodyPr/>
+          <a:lstStyle/>
+          <a:p>
+            <a:r>
+              <a:rPr lang="it-IT" dirty="0" smtClean="0"/>
+              <a:t>Qui ho preparato un piccolo sommario con i punti che verranno elaborati.</a:t>
+            </a:r>
+            <a:endParaRPr lang="en-US" dirty="0"/>
+          </a:p>
+        </p:txBody>
+      </p:sp>
+      <p:sp>
+        <p:nvSpPr>
+          <p:cNvPr id="4" name="Substituent număr diapozitiv 3"/>
+          <p:cNvSpPr>
+            <a:spLocks noGrp="1"/>
+          </p:cNvSpPr>
+          <p:nvPr>
+            <p:ph type="sldNum" sz="quarter" idx="10"/>
+          </p:nvPr>
+        </p:nvSpPr>
+        <p:spPr/>
+        <p:txBody>
+          <a:bodyPr/>
+          <a:lstStyle/>
+          <a:p>
+            <a:fld id="{5D5D8A57-A6DA-4DCE-ADC7-3F4B291DAEDD}" type="slidenum">
+              <a:rPr lang="en-US" smtClean="0"/>
+              <a:t>2</a:t>
+            </a:fld>
+            <a:endParaRPr lang="en-US"/>
+          </a:p>
+        </p:txBody>
+      </p:sp>
+    </p:spTree>
+    <p:extLst>
+      <p:ext uri="{BB962C8B-B14F-4D97-AF65-F5344CB8AC3E}">
+        <p14:creationId xmlns:p14="http://schemas.microsoft.com/office/powerpoint/2010/main" val="2707399384"/>
+      </p:ext>
+    </p:extLst>
+  </p:cSld>
+  <p:clrMapOvr>
+    <a:masterClrMapping/>
+  </p:clrMapOvr>
+</p:notes>
+</file>
+
+<file path=ppt/notesSlides/notesSlide3.xml><?xml version="1.0" encoding="utf-8"?>
+<p:notes xmlns:a="http://schemas.openxmlformats.org/drawingml/2006/main" xmlns:r="http://schemas.openxmlformats.org/officeDocument/2006/relationships" xmlns:p="http://schemas.openxmlformats.org/presentationml/2006/main">
+  <p:cSld>
+    <p:spTree>
+      <p:nvGrpSpPr>
+        <p:cNvPr id="1" name=""/>
+        <p:cNvGrpSpPr/>
+        <p:nvPr/>
+      </p:nvGrpSpPr>
+      <p:grpSpPr>
+        <a:xfrm>
+          <a:off x="0" y="0"/>
+          <a:ext cx="0" cy="0"/>
+          <a:chOff x="0" y="0"/>
+          <a:chExt cx="0" cy="0"/>
+        </a:xfrm>
+      </p:grpSpPr>
+      <p:sp>
+        <p:nvSpPr>
+          <p:cNvPr id="2" name="Substituent imagine diapozitiv 1"/>
+          <p:cNvSpPr>
+            <a:spLocks noGrp="1" noRot="1" noChangeAspect="1"/>
+          </p:cNvSpPr>
+          <p:nvPr>
+            <p:ph type="sldImg"/>
+          </p:nvPr>
+        </p:nvSpPr>
+        <p:spPr/>
+      </p:sp>
+      <p:sp>
+        <p:nvSpPr>
+          <p:cNvPr id="3" name="Substituent note 2"/>
+          <p:cNvSpPr>
+            <a:spLocks noGrp="1"/>
+          </p:cNvSpPr>
+          <p:nvPr>
+            <p:ph type="body" idx="1"/>
+          </p:nvPr>
+        </p:nvSpPr>
+        <p:spPr/>
+        <p:txBody>
+          <a:bodyPr/>
+          <a:lstStyle/>
+          <a:p>
+            <a:r>
+              <a:rPr lang="it-IT" dirty="0" smtClean="0"/>
+              <a:t>I requisiti principali sono descritti da questo diagramma dei casi d'uso</a:t>
+            </a:r>
+          </a:p>
+          <a:p>
+            <a:r>
+              <a:rPr lang="it-IT" dirty="0" smtClean="0"/>
+              <a:t>I requisiti iniziali del progetto erano più semplificati, </a:t>
+            </a:r>
+          </a:p>
+          <a:p>
+            <a:r>
+              <a:rPr lang="it-IT" dirty="0" smtClean="0"/>
+              <a:t>nel senso che non includevano ancora il database dell'azienda </a:t>
+            </a:r>
+          </a:p>
+          <a:p>
+            <a:r>
+              <a:rPr lang="it-IT" dirty="0" smtClean="0"/>
+              <a:t>e il sito web per gestirlo. Questi dettagli sono stati poi</a:t>
+            </a:r>
+          </a:p>
+          <a:p>
+            <a:r>
+              <a:rPr lang="it-IT" dirty="0" smtClean="0"/>
+              <a:t>aggiunti durante la fase di sviluppo del prototipo.</a:t>
+            </a:r>
+          </a:p>
+          <a:p>
+            <a:r>
+              <a:rPr lang="it-IT" dirty="0" smtClean="0"/>
+              <a:t>Principalmente il sistema deve essere in grado di </a:t>
+            </a:r>
+          </a:p>
+          <a:p>
+            <a:r>
+              <a:rPr lang="it-IT" dirty="0" smtClean="0"/>
+              <a:t>funzionare con tre diverse modalità di riconoscimento: </a:t>
+            </a:r>
+          </a:p>
+          <a:p>
+            <a:r>
+              <a:rPr lang="it-IT" dirty="0" smtClean="0"/>
+              <a:t>tessere RFID, tastierino numerico (e quindi password), telecomando </a:t>
+            </a:r>
+          </a:p>
+          <a:p>
+            <a:r>
+              <a:rPr lang="it-IT" dirty="0" smtClean="0"/>
+              <a:t>A seguito di ogni accesso avvenuto con successo, il sistema </a:t>
+            </a:r>
+          </a:p>
+          <a:p>
+            <a:r>
+              <a:rPr lang="it-IT" dirty="0" smtClean="0"/>
+              <a:t>deve aprire la serratura di una porta e salvare automaticamente il log nel database. </a:t>
+            </a:r>
+          </a:p>
+          <a:p>
+            <a:r>
+              <a:rPr lang="it-IT" dirty="0" smtClean="0"/>
+              <a:t>Oltre ai log degli accessi, vanno salvati anche i soci e le tessere dell'azienda.</a:t>
+            </a:r>
+          </a:p>
+          <a:p>
+            <a:r>
+              <a:rPr lang="it-IT" dirty="0" smtClean="0"/>
+              <a:t>Infatti l'amministratore deve essere in grado di fare, tramite un'interfaccia grafica (in questo </a:t>
+            </a:r>
+          </a:p>
+          <a:p>
+            <a:r>
+              <a:rPr lang="it-IT" dirty="0" smtClean="0"/>
+              <a:t>caso un sito web), semplici operazioni CRUD (quindi di aggiungere/modificare/leggere/cancellare </a:t>
+            </a:r>
+          </a:p>
+          <a:p>
+            <a:r>
+              <a:rPr lang="it-IT" dirty="0" smtClean="0"/>
+              <a:t>i soci e le tessere, e visualizzare i log degli accessi) </a:t>
+            </a:r>
+            <a:endParaRPr lang="en-US" dirty="0"/>
+          </a:p>
+        </p:txBody>
+      </p:sp>
+      <p:sp>
+        <p:nvSpPr>
+          <p:cNvPr id="4" name="Substituent număr diapozitiv 3"/>
+          <p:cNvSpPr>
+            <a:spLocks noGrp="1"/>
+          </p:cNvSpPr>
+          <p:nvPr>
+            <p:ph type="sldNum" sz="quarter" idx="10"/>
+          </p:nvPr>
+        </p:nvSpPr>
+        <p:spPr/>
+        <p:txBody>
+          <a:bodyPr/>
+          <a:lstStyle/>
+          <a:p>
+            <a:fld id="{5D5D8A57-A6DA-4DCE-ADC7-3F4B291DAEDD}" type="slidenum">
+              <a:rPr lang="en-US" smtClean="0"/>
+              <a:t>3</a:t>
+            </a:fld>
+            <a:endParaRPr lang="en-US"/>
+          </a:p>
+        </p:txBody>
+      </p:sp>
+    </p:spTree>
+    <p:extLst>
+      <p:ext uri="{BB962C8B-B14F-4D97-AF65-F5344CB8AC3E}">
+        <p14:creationId xmlns:p14="http://schemas.microsoft.com/office/powerpoint/2010/main" val="2674273562"/>
+      </p:ext>
+    </p:extLst>
+  </p:cSld>
+  <p:clrMapOvr>
+    <a:masterClrMapping/>
+  </p:clrMapOvr>
+</p:notes>
+</file>
+
+<file path=ppt/notesSlides/notesSlide4.xml><?xml version="1.0" encoding="utf-8"?>
+<p:notes xmlns:a="http://schemas.openxmlformats.org/drawingml/2006/main" xmlns:r="http://schemas.openxmlformats.org/officeDocument/2006/relationships" xmlns:p="http://schemas.openxmlformats.org/presentationml/2006/main">
+  <p:cSld>
+    <p:spTree>
+      <p:nvGrpSpPr>
+        <p:cNvPr id="1" name=""/>
+        <p:cNvGrpSpPr/>
+        <p:nvPr/>
+      </p:nvGrpSpPr>
+      <p:grpSpPr>
+        <a:xfrm>
+          <a:off x="0" y="0"/>
+          <a:ext cx="0" cy="0"/>
+          <a:chOff x="0" y="0"/>
+          <a:chExt cx="0" cy="0"/>
+        </a:xfrm>
+      </p:grpSpPr>
+      <p:sp>
+        <p:nvSpPr>
+          <p:cNvPr id="2" name="Substituent imagine diapozitiv 1"/>
+          <p:cNvSpPr>
+            <a:spLocks noGrp="1" noRot="1" noChangeAspect="1"/>
+          </p:cNvSpPr>
+          <p:nvPr>
+            <p:ph type="sldImg"/>
+          </p:nvPr>
+        </p:nvSpPr>
+        <p:spPr/>
+      </p:sp>
+      <p:sp>
+        <p:nvSpPr>
+          <p:cNvPr id="3" name="Substituent note 2"/>
+          <p:cNvSpPr>
+            <a:spLocks noGrp="1"/>
+          </p:cNvSpPr>
+          <p:nvPr>
+            <p:ph type="body" idx="1"/>
+          </p:nvPr>
+        </p:nvSpPr>
+        <p:spPr/>
+        <p:txBody>
+          <a:bodyPr/>
+          <a:lstStyle/>
+          <a:p>
+            <a:r>
+              <a:rPr lang="it-IT" dirty="0" smtClean="0"/>
+              <a:t>Questi sono i componenti principali del sistema embedded, che riescono a lavorare insieme </a:t>
+            </a:r>
+          </a:p>
+          <a:p>
+            <a:r>
+              <a:rPr lang="it-IT" dirty="0" smtClean="0"/>
+              <a:t>grazie all'Arduino.</a:t>
+            </a:r>
+          </a:p>
+          <a:p>
+            <a:r>
+              <a:rPr lang="it-IT" dirty="0" smtClean="0"/>
+              <a:t>Per implementare la funzione del microcontrollore, è stato scelto l'Arduino UNO, una board </a:t>
+            </a:r>
+          </a:p>
+          <a:p>
+            <a:r>
+              <a:rPr lang="it-IT" dirty="0" smtClean="0"/>
+              <a:t>di basso costo, open-source e facile da programmare tramite il linguaggio di programmazione </a:t>
+            </a:r>
+          </a:p>
+          <a:p>
+            <a:r>
+              <a:rPr lang="it-IT" dirty="0" smtClean="0"/>
+              <a:t>appositamente chiamato Arduino Programming Language.</a:t>
+            </a:r>
+          </a:p>
+          <a:p>
+            <a:r>
+              <a:rPr lang="it-IT" dirty="0" smtClean="0"/>
+              <a:t>Il ricevitore RF serve per comunicare con il telecomando per via di frequenze radio</a:t>
+            </a:r>
+          </a:p>
+          <a:p>
+            <a:r>
+              <a:rPr lang="it-IT" dirty="0" smtClean="0"/>
+              <a:t>Il lettore RFID per leggere le tessere dei soci</a:t>
+            </a:r>
+          </a:p>
+          <a:p>
+            <a:r>
+              <a:rPr lang="it-IT" dirty="0" smtClean="0"/>
+              <a:t>Poi abbiamo il tastierino numerico, per dare la possibilità di entrare per via password </a:t>
+            </a:r>
+          </a:p>
+          <a:p>
+            <a:r>
+              <a:rPr lang="it-IT" dirty="0" smtClean="0"/>
+              <a:t>L'LCD per dare informazioni all'utente (e.g. accesso consentito/negato ecc.) </a:t>
+            </a:r>
+          </a:p>
+          <a:p>
+            <a:r>
+              <a:rPr lang="it-IT" dirty="0" smtClean="0"/>
+              <a:t>Il servomotore è l'attuatore che apre la serratura della porta </a:t>
+            </a:r>
+          </a:p>
+          <a:p>
+            <a:r>
+              <a:rPr lang="it-IT" dirty="0" smtClean="0"/>
+              <a:t>Siccome l'Arduino UNO non può connettersi alla rete locale via WiFi, </a:t>
+            </a:r>
+          </a:p>
+          <a:p>
+            <a:r>
+              <a:rPr lang="it-IT" dirty="0" smtClean="0"/>
+              <a:t>è stato aggiunto un chip chiamato ESP8266 che fa da intermediario tra </a:t>
+            </a:r>
+          </a:p>
+          <a:p>
+            <a:r>
+              <a:rPr lang="it-IT" dirty="0" smtClean="0"/>
+              <a:t>l'Arduino UNO e il server.</a:t>
+            </a:r>
+            <a:endParaRPr lang="en-US" dirty="0"/>
+          </a:p>
+        </p:txBody>
+      </p:sp>
+      <p:sp>
+        <p:nvSpPr>
+          <p:cNvPr id="4" name="Substituent număr diapozitiv 3"/>
+          <p:cNvSpPr>
+            <a:spLocks noGrp="1"/>
+          </p:cNvSpPr>
+          <p:nvPr>
+            <p:ph type="sldNum" sz="quarter" idx="10"/>
+          </p:nvPr>
+        </p:nvSpPr>
+        <p:spPr/>
+        <p:txBody>
+          <a:bodyPr/>
+          <a:lstStyle/>
+          <a:p>
+            <a:fld id="{5D5D8A57-A6DA-4DCE-ADC7-3F4B291DAEDD}" type="slidenum">
+              <a:rPr lang="en-US" smtClean="0"/>
+              <a:t>4</a:t>
+            </a:fld>
+            <a:endParaRPr lang="en-US"/>
+          </a:p>
+        </p:txBody>
+      </p:sp>
+    </p:spTree>
+    <p:extLst>
+      <p:ext uri="{BB962C8B-B14F-4D97-AF65-F5344CB8AC3E}">
+        <p14:creationId xmlns:p14="http://schemas.microsoft.com/office/powerpoint/2010/main" val="1141243818"/>
+      </p:ext>
+    </p:extLst>
+  </p:cSld>
+  <p:clrMapOvr>
+    <a:masterClrMapping/>
+  </p:clrMapOvr>
+</p:notes>
+</file>
+
+<file path=ppt/notesSlides/notesSlide5.xml><?xml version="1.0" encoding="utf-8"?>
+<p:notes xmlns:a="http://schemas.openxmlformats.org/drawingml/2006/main" xmlns:r="http://schemas.openxmlformats.org/officeDocument/2006/relationships" xmlns:p="http://schemas.openxmlformats.org/presentationml/2006/main">
+  <p:cSld>
+    <p:spTree>
+      <p:nvGrpSpPr>
+        <p:cNvPr id="1" name=""/>
+        <p:cNvGrpSpPr/>
+        <p:nvPr/>
+      </p:nvGrpSpPr>
+      <p:grpSpPr>
+        <a:xfrm>
+          <a:off x="0" y="0"/>
+          <a:ext cx="0" cy="0"/>
+          <a:chOff x="0" y="0"/>
+          <a:chExt cx="0" cy="0"/>
+        </a:xfrm>
+      </p:grpSpPr>
+      <p:sp>
+        <p:nvSpPr>
+          <p:cNvPr id="2" name="Substituent imagine diapozitiv 1"/>
+          <p:cNvSpPr>
+            <a:spLocks noGrp="1" noRot="1" noChangeAspect="1"/>
+          </p:cNvSpPr>
+          <p:nvPr>
+            <p:ph type="sldImg"/>
+          </p:nvPr>
+        </p:nvSpPr>
+        <p:spPr/>
+      </p:sp>
+      <p:sp>
+        <p:nvSpPr>
+          <p:cNvPr id="3" name="Substituent note 2"/>
+          <p:cNvSpPr>
+            <a:spLocks noGrp="1"/>
+          </p:cNvSpPr>
+          <p:nvPr>
+            <p:ph type="body" idx="1"/>
+          </p:nvPr>
+        </p:nvSpPr>
+        <p:spPr/>
+        <p:txBody>
+          <a:bodyPr/>
+          <a:lstStyle/>
+          <a:p>
+            <a:r>
+              <a:rPr lang="it-IT" dirty="0" smtClean="0"/>
+              <a:t>Il server Web è stato sviluppato su un Raspberry Pi ed è hostato in locale </a:t>
+            </a:r>
+          </a:p>
+          <a:p>
+            <a:r>
+              <a:rPr lang="it-IT" dirty="0" smtClean="0"/>
+              <a:t>all'interno di una rete privata e dedicata solo al progetto. </a:t>
+            </a:r>
+          </a:p>
+          <a:p>
+            <a:r>
+              <a:rPr lang="it-IT" dirty="0" smtClean="0"/>
+              <a:t>Il lato server è stato implementato in JavaScript, particolarmente </a:t>
+            </a:r>
+          </a:p>
+          <a:p>
+            <a:r>
+              <a:rPr lang="it-IT" dirty="0" smtClean="0"/>
+              <a:t>utilizzando Node.js, un framework open-source che esegue codice JavaScript </a:t>
+            </a:r>
+          </a:p>
+          <a:p>
+            <a:r>
+              <a:rPr lang="it-IT" dirty="0" smtClean="0"/>
+              <a:t>al di fuori di un browser. Alcuni vantaggi principali di Node.js, oltre al fatto </a:t>
+            </a:r>
+          </a:p>
+          <a:p>
+            <a:r>
+              <a:rPr lang="it-IT" dirty="0" smtClean="0"/>
+              <a:t>di poter creare il back-end utilizzando JavaScript, sono la programmazione a eventi (un'azione </a:t>
+            </a:r>
+          </a:p>
+          <a:p>
+            <a:r>
+              <a:rPr lang="it-IT" dirty="0" smtClean="0"/>
+              <a:t>viene lanciata solo dopo che si è verificato un evento aumentando l'efficienza </a:t>
+            </a:r>
+          </a:p>
+          <a:p>
+            <a:r>
+              <a:rPr lang="it-IT" dirty="0" smtClean="0"/>
+              <a:t>soprattutto nell'ambito di networking dove capita spesso di dover rimanere in attesa </a:t>
+            </a:r>
+          </a:p>
+          <a:p>
+            <a:r>
+              <a:rPr lang="it-IT" dirty="0" smtClean="0"/>
+              <a:t>di una risposta), la scalabilità del software e NPM (node package manager - </a:t>
+            </a:r>
+          </a:p>
+          <a:p>
+            <a:r>
+              <a:rPr lang="it-IT" dirty="0" smtClean="0"/>
+              <a:t>il più grande ecosistema di librerie open-source al mondo)</a:t>
+            </a:r>
+          </a:p>
+          <a:p>
+            <a:r>
+              <a:rPr lang="it-IT" dirty="0" smtClean="0"/>
+              <a:t>Il DBMS utilizzato è MongoDB: un DBMS open-source di tipo NoSQL ed è</a:t>
+            </a:r>
+          </a:p>
+          <a:p>
+            <a:r>
+              <a:rPr lang="it-IT" dirty="0" smtClean="0"/>
+              <a:t>orientato ai documenti. Questo significa che, anzichè avere le tipiche tabelle</a:t>
+            </a:r>
+          </a:p>
+          <a:p>
+            <a:r>
+              <a:rPr lang="it-IT" dirty="0" smtClean="0"/>
+              <a:t>di un database relazionale definite secondo uno schema rigido e fisso, si hanno dei </a:t>
+            </a:r>
+          </a:p>
+          <a:p>
+            <a:r>
+              <a:rPr lang="it-IT" dirty="0" smtClean="0"/>
+              <a:t>documenti in formato BSON - binary JSON, ovvero la serializzazione codificata </a:t>
+            </a:r>
+          </a:p>
+          <a:p>
+            <a:r>
+              <a:rPr lang="it-IT" dirty="0" smtClean="0"/>
+              <a:t>in binario del formato JSON - facilitando quindi l'integrazione dei dati con quasi tutte </a:t>
+            </a:r>
+          </a:p>
+          <a:p>
+            <a:r>
+              <a:rPr lang="it-IT" dirty="0" smtClean="0"/>
+              <a:t>le applicazioni web.</a:t>
+            </a:r>
+          </a:p>
+          <a:p>
+            <a:r>
+              <a:rPr lang="it-IT" dirty="0" smtClean="0"/>
+              <a:t>Infine, la comunicazione tra il client (ovvero browser) e il server è basata sull'approccio </a:t>
+            </a:r>
+          </a:p>
+          <a:p>
+            <a:r>
+              <a:rPr lang="it-IT" dirty="0" smtClean="0"/>
+              <a:t>REST (Representational State Transfer) in cui il concetto più importante è l'esistenza </a:t>
+            </a:r>
+          </a:p>
+          <a:p>
+            <a:r>
+              <a:rPr lang="it-IT" dirty="0" smtClean="0"/>
+              <a:t>di risorse del server a cui si possono accedere tramite identificatori univoci chiamati URI.</a:t>
+            </a:r>
+          </a:p>
+          <a:p>
+            <a:r>
+              <a:rPr lang="it-IT" dirty="0" smtClean="0"/>
+              <a:t>Generalmente le API RESTful sfruttano le chiamate HTTP per dare la possibilità ai client di </a:t>
+            </a:r>
+          </a:p>
+          <a:p>
+            <a:r>
+              <a:rPr lang="it-IT" dirty="0" smtClean="0"/>
+              <a:t>leggere, aggiornare, creare e rimuovere risorse.</a:t>
+            </a:r>
+            <a:endParaRPr lang="en-US" dirty="0"/>
+          </a:p>
+        </p:txBody>
+      </p:sp>
+      <p:sp>
+        <p:nvSpPr>
+          <p:cNvPr id="4" name="Substituent număr diapozitiv 3"/>
+          <p:cNvSpPr>
+            <a:spLocks noGrp="1"/>
+          </p:cNvSpPr>
+          <p:nvPr>
+            <p:ph type="sldNum" sz="quarter" idx="10"/>
+          </p:nvPr>
+        </p:nvSpPr>
+        <p:spPr/>
+        <p:txBody>
+          <a:bodyPr/>
+          <a:lstStyle/>
+          <a:p>
+            <a:fld id="{5D5D8A57-A6DA-4DCE-ADC7-3F4B291DAEDD}" type="slidenum">
+              <a:rPr lang="en-US" smtClean="0"/>
+              <a:t>5</a:t>
+            </a:fld>
+            <a:endParaRPr lang="en-US"/>
+          </a:p>
+        </p:txBody>
+      </p:sp>
+    </p:spTree>
+    <p:extLst>
+      <p:ext uri="{BB962C8B-B14F-4D97-AF65-F5344CB8AC3E}">
+        <p14:creationId xmlns:p14="http://schemas.microsoft.com/office/powerpoint/2010/main" val="1653777208"/>
+      </p:ext>
+    </p:extLst>
+  </p:cSld>
+  <p:clrMapOvr>
+    <a:masterClrMapping/>
+  </p:clrMapOvr>
+</p:notes>
+</file>
+
+<file path=ppt/notesSlides/notesSlide6.xml><?xml version="1.0" encoding="utf-8"?>
+<p:notes xmlns:a="http://schemas.openxmlformats.org/drawingml/2006/main" xmlns:r="http://schemas.openxmlformats.org/officeDocument/2006/relationships" xmlns:p="http://schemas.openxmlformats.org/presentationml/2006/main">
+  <p:cSld>
+    <p:spTree>
+      <p:nvGrpSpPr>
+        <p:cNvPr id="1" name=""/>
+        <p:cNvGrpSpPr/>
+        <p:nvPr/>
+      </p:nvGrpSpPr>
+      <p:grpSpPr>
+        <a:xfrm>
+          <a:off x="0" y="0"/>
+          <a:ext cx="0" cy="0"/>
+          <a:chOff x="0" y="0"/>
+          <a:chExt cx="0" cy="0"/>
+        </a:xfrm>
+      </p:grpSpPr>
+      <p:sp>
+        <p:nvSpPr>
+          <p:cNvPr id="2" name="Substituent imagine diapozitiv 1"/>
+          <p:cNvSpPr>
+            <a:spLocks noGrp="1" noRot="1" noChangeAspect="1"/>
+          </p:cNvSpPr>
+          <p:nvPr>
+            <p:ph type="sldImg"/>
+          </p:nvPr>
+        </p:nvSpPr>
+        <p:spPr/>
+      </p:sp>
+      <p:sp>
+        <p:nvSpPr>
+          <p:cNvPr id="3" name="Substituent note 2"/>
+          <p:cNvSpPr>
+            <a:spLocks noGrp="1"/>
+          </p:cNvSpPr>
+          <p:nvPr>
+            <p:ph type="body" idx="1"/>
+          </p:nvPr>
+        </p:nvSpPr>
+        <p:spPr/>
+        <p:txBody>
+          <a:bodyPr/>
+          <a:lstStyle/>
+          <a:p>
+            <a:r>
+              <a:rPr lang="it-IT" dirty="0" smtClean="0"/>
+              <a:t>L'applicazione web segue uno dei più famosi pattern architetturali conosciuti: MVC (model-view-controller)</a:t>
+            </a:r>
+          </a:p>
+          <a:p>
+            <a:r>
+              <a:rPr lang="it-IT" dirty="0" smtClean="0"/>
+              <a:t>L'idea consiste nella modularizzazione del codice per garantire l'indipendenza tra i dati e l'interfaccia,</a:t>
+            </a:r>
+          </a:p>
+          <a:p>
+            <a:r>
+              <a:rPr lang="it-IT" dirty="0" smtClean="0"/>
+              <a:t>rendendo il codice più facile da comprendere, più scalabile e riutilizzabile.</a:t>
+            </a:r>
+          </a:p>
+          <a:p>
+            <a:r>
+              <a:rPr lang="it-IT" dirty="0" smtClean="0"/>
+              <a:t>Infatti l'applicazione è separata in tre principali componenti: il modello, la vista e il controller </a:t>
+            </a:r>
+          </a:p>
+          <a:p>
+            <a:r>
+              <a:rPr lang="it-IT" dirty="0" smtClean="0"/>
+              <a:t>Il modello corrisponde alla struttura e alla logica dei dati dell'applicazione (in questo caso corrisponde </a:t>
+            </a:r>
+          </a:p>
+          <a:p>
+            <a:r>
+              <a:rPr lang="it-IT" dirty="0" smtClean="0"/>
+              <a:t>agli schemi dei documenti di MongoDB). Il modello è manipulato dal controller ed è usato per aggiornare la vista.</a:t>
+            </a:r>
+          </a:p>
+          <a:p>
+            <a:r>
+              <a:rPr lang="it-IT" dirty="0" smtClean="0"/>
+              <a:t>La vista corrisponde all'interfaccia utente dell'applicazione e rappresenta il modo in cui vengono presentati </a:t>
+            </a:r>
+          </a:p>
+          <a:p>
+            <a:r>
+              <a:rPr lang="it-IT" dirty="0" smtClean="0"/>
+              <a:t>i dati all'utente.</a:t>
+            </a:r>
+          </a:p>
+          <a:p>
+            <a:r>
+              <a:rPr lang="it-IT" dirty="0" smtClean="0"/>
+              <a:t>Il controller, invece, accetta l'input dell'utente - normalmente interagendo con l'interfaccia grafica </a:t>
+            </a:r>
+          </a:p>
+          <a:p>
+            <a:r>
+              <a:rPr lang="it-IT" dirty="0" smtClean="0"/>
+              <a:t>(e.g. invio modulo, click su un pulsante ecc.) e lo trasforma in comandi per il modello per recuperare </a:t>
+            </a:r>
+          </a:p>
+          <a:p>
+            <a:r>
+              <a:rPr lang="it-IT" dirty="0" smtClean="0"/>
+              <a:t>i dati e le invia alla vista.</a:t>
+            </a:r>
+            <a:endParaRPr lang="en-US" dirty="0"/>
+          </a:p>
+        </p:txBody>
+      </p:sp>
+      <p:sp>
+        <p:nvSpPr>
+          <p:cNvPr id="4" name="Substituent număr diapozitiv 3"/>
+          <p:cNvSpPr>
+            <a:spLocks noGrp="1"/>
+          </p:cNvSpPr>
+          <p:nvPr>
+            <p:ph type="sldNum" sz="quarter" idx="10"/>
+          </p:nvPr>
+        </p:nvSpPr>
+        <p:spPr/>
+        <p:txBody>
+          <a:bodyPr/>
+          <a:lstStyle/>
+          <a:p>
+            <a:fld id="{5D5D8A57-A6DA-4DCE-ADC7-3F4B291DAEDD}" type="slidenum">
+              <a:rPr lang="en-US" smtClean="0"/>
+              <a:t>6</a:t>
+            </a:fld>
+            <a:endParaRPr lang="en-US"/>
+          </a:p>
+        </p:txBody>
+      </p:sp>
+    </p:spTree>
+    <p:extLst>
+      <p:ext uri="{BB962C8B-B14F-4D97-AF65-F5344CB8AC3E}">
+        <p14:creationId xmlns:p14="http://schemas.microsoft.com/office/powerpoint/2010/main" val="2973050651"/>
+      </p:ext>
+    </p:extLst>
+  </p:cSld>
+  <p:clrMapOvr>
+    <a:masterClrMapping/>
+  </p:clrMapOvr>
+</p:notes>
+</file>
+
+<file path=ppt/notesSlides/notesSlide7.xml><?xml version="1.0" encoding="utf-8"?>
+<p:notes xmlns:a="http://schemas.openxmlformats.org/drawingml/2006/main" xmlns:r="http://schemas.openxmlformats.org/officeDocument/2006/relationships" xmlns:p="http://schemas.openxmlformats.org/presentationml/2006/main">
+  <p:cSld>
+    <p:spTree>
+      <p:nvGrpSpPr>
+        <p:cNvPr id="1" name=""/>
+        <p:cNvGrpSpPr/>
+        <p:nvPr/>
+      </p:nvGrpSpPr>
+      <p:grpSpPr>
+        <a:xfrm>
+          <a:off x="0" y="0"/>
+          <a:ext cx="0" cy="0"/>
+          <a:chOff x="0" y="0"/>
+          <a:chExt cx="0" cy="0"/>
+        </a:xfrm>
+      </p:grpSpPr>
+      <p:sp>
+        <p:nvSpPr>
+          <p:cNvPr id="2" name="Substituent imagine diapozitiv 1"/>
+          <p:cNvSpPr>
+            <a:spLocks noGrp="1" noRot="1" noChangeAspect="1"/>
+          </p:cNvSpPr>
+          <p:nvPr>
+            <p:ph type="sldImg"/>
+          </p:nvPr>
+        </p:nvSpPr>
+        <p:spPr/>
+      </p:sp>
+      <p:sp>
+        <p:nvSpPr>
+          <p:cNvPr id="3" name="Substituent note 2"/>
+          <p:cNvSpPr>
+            <a:spLocks noGrp="1"/>
+          </p:cNvSpPr>
+          <p:nvPr>
+            <p:ph type="body" idx="1"/>
+          </p:nvPr>
+        </p:nvSpPr>
+        <p:spPr/>
+        <p:txBody>
+          <a:bodyPr/>
+          <a:lstStyle/>
+          <a:p>
+            <a:r>
+              <a:rPr lang="it-IT" dirty="0" smtClean="0"/>
+              <a:t>Il termine front-end rappresenta l'interfaccia dell'applicazione, </a:t>
+            </a:r>
+          </a:p>
+          <a:p>
+            <a:r>
+              <a:rPr lang="it-IT" dirty="0" smtClean="0"/>
+              <a:t>ovvero la parte visibile agli utenti e quella con cui essi interagiscono.</a:t>
+            </a:r>
+          </a:p>
+          <a:p>
+            <a:r>
+              <a:rPr lang="it-IT" dirty="0" smtClean="0"/>
+              <a:t>Ho i tipici linguaggi come HTML per la struttura e il contenuto, </a:t>
+            </a:r>
+          </a:p>
+          <a:p>
+            <a:r>
+              <a:rPr lang="it-IT" dirty="0" smtClean="0"/>
+              <a:t>JavaScript per aggiungere dinamicità e CSS per lo stile.</a:t>
+            </a:r>
+          </a:p>
+          <a:p>
+            <a:r>
+              <a:rPr lang="it-IT" dirty="0" smtClean="0"/>
+              <a:t>Per quanto riguarda JavaScript ho usato jQuery, una libreria molto diffusa (soprattutto</a:t>
+            </a:r>
+          </a:p>
+          <a:p>
+            <a:r>
+              <a:rPr lang="it-IT" dirty="0" smtClean="0"/>
+              <a:t>qualche anno fa) proposta a ridurre e semplificare il codice, ad un basso costo di performance.</a:t>
+            </a:r>
+          </a:p>
+          <a:p>
+            <a:r>
+              <a:rPr lang="it-IT" dirty="0" smtClean="0"/>
+              <a:t>Per il passaggio dei dati dal server al client ho usato EJS, un linguaggio di templating che permette</a:t>
+            </a:r>
+          </a:p>
+          <a:p>
+            <a:r>
+              <a:rPr lang="it-IT" dirty="0" smtClean="0"/>
+              <a:t>di incorporare codice JavaScript all'interno dei documenti HTML. </a:t>
+            </a:r>
+          </a:p>
+          <a:p>
+            <a:r>
+              <a:rPr lang="it-IT" dirty="0" smtClean="0"/>
+              <a:t>Per quanto riguarda lo stile, ho usato un template della W3CSS.</a:t>
+            </a:r>
+          </a:p>
+          <a:p>
+            <a:r>
+              <a:rPr lang="it-IT" dirty="0" smtClean="0"/>
+              <a:t>L'intero sito web è responsivo, ovvero è stato progettato per essere visualizzabile </a:t>
+            </a:r>
+          </a:p>
+          <a:p>
+            <a:r>
+              <a:rPr lang="it-IT" dirty="0" smtClean="0"/>
+              <a:t>su qualsiasi tipo di dispositivo.</a:t>
+            </a:r>
+            <a:endParaRPr lang="en-US" dirty="0"/>
+          </a:p>
+        </p:txBody>
+      </p:sp>
+      <p:sp>
+        <p:nvSpPr>
+          <p:cNvPr id="4" name="Substituent număr diapozitiv 3"/>
+          <p:cNvSpPr>
+            <a:spLocks noGrp="1"/>
+          </p:cNvSpPr>
+          <p:nvPr>
+            <p:ph type="sldNum" sz="quarter" idx="10"/>
+          </p:nvPr>
+        </p:nvSpPr>
+        <p:spPr/>
+        <p:txBody>
+          <a:bodyPr/>
+          <a:lstStyle/>
+          <a:p>
+            <a:fld id="{5D5D8A57-A6DA-4DCE-ADC7-3F4B291DAEDD}" type="slidenum">
+              <a:rPr lang="en-US" smtClean="0"/>
+              <a:t>7</a:t>
+            </a:fld>
+            <a:endParaRPr lang="en-US"/>
+          </a:p>
+        </p:txBody>
+      </p:sp>
+    </p:spTree>
+    <p:extLst>
+      <p:ext uri="{BB962C8B-B14F-4D97-AF65-F5344CB8AC3E}">
+        <p14:creationId xmlns:p14="http://schemas.microsoft.com/office/powerpoint/2010/main" val="1049768964"/>
+      </p:ext>
+    </p:extLst>
+  </p:cSld>
+  <p:clrMapOvr>
+    <a:masterClrMapping/>
+  </p:clrMapOvr>
+</p:notes>
+</file>
+
+<file path=ppt/notesSlides/notesSlide8.xml><?xml version="1.0" encoding="utf-8"?>
+<p:notes xmlns:a="http://schemas.openxmlformats.org/drawingml/2006/main" xmlns:r="http://schemas.openxmlformats.org/officeDocument/2006/relationships" xmlns:p="http://schemas.openxmlformats.org/presentationml/2006/main">
+  <p:cSld>
+    <p:spTree>
+      <p:nvGrpSpPr>
+        <p:cNvPr id="1" name=""/>
+        <p:cNvGrpSpPr/>
+        <p:nvPr/>
+      </p:nvGrpSpPr>
+      <p:grpSpPr>
+        <a:xfrm>
+          <a:off x="0" y="0"/>
+          <a:ext cx="0" cy="0"/>
+          <a:chOff x="0" y="0"/>
+          <a:chExt cx="0" cy="0"/>
+        </a:xfrm>
+      </p:grpSpPr>
+      <p:sp>
+        <p:nvSpPr>
+          <p:cNvPr id="2" name="Substituent imagine diapozitiv 1"/>
+          <p:cNvSpPr>
+            <a:spLocks noGrp="1" noRot="1" noChangeAspect="1"/>
+          </p:cNvSpPr>
+          <p:nvPr>
+            <p:ph type="sldImg"/>
+          </p:nvPr>
+        </p:nvSpPr>
+        <p:spPr/>
+      </p:sp>
+      <p:sp>
+        <p:nvSpPr>
+          <p:cNvPr id="3" name="Substituent note 2"/>
+          <p:cNvSpPr>
+            <a:spLocks noGrp="1"/>
+          </p:cNvSpPr>
+          <p:nvPr>
+            <p:ph type="body" idx="1"/>
+          </p:nvPr>
+        </p:nvSpPr>
+        <p:spPr/>
+        <p:txBody>
+          <a:bodyPr/>
+          <a:lstStyle/>
+          <a:p>
+            <a:r>
+              <a:rPr lang="it-IT" dirty="0" smtClean="0"/>
+              <a:t>Siccome il server è ospitato in locale, non c'era bisogno di avere la connessione Internet sul Raspberry Pi:</a:t>
+            </a:r>
+          </a:p>
+          <a:p>
+            <a:r>
+              <a:rPr lang="it-IT" dirty="0" smtClean="0"/>
+              <a:t>la mancanza di connessione ha sollevato un problema: il Raspberry Pi non ha un orologio interno e per tenere traccia </a:t>
+            </a:r>
+          </a:p>
+          <a:p>
+            <a:r>
+              <a:rPr lang="it-IT" dirty="0" smtClean="0"/>
+              <a:t>del tempo deve connettersi a dei server NTP. Questo significa che non poteva salvare i log con la data e l'ora corrente.</a:t>
+            </a:r>
+          </a:p>
+          <a:p>
+            <a:r>
+              <a:rPr lang="it-IT" dirty="0" smtClean="0"/>
+              <a:t>Per aggirare il problema, ho usato un RTC (real-time clock) che può essere interrogato direttamente dall'Arduino.</a:t>
+            </a:r>
+          </a:p>
+          <a:p>
+            <a:r>
+              <a:rPr lang="it-IT" dirty="0" smtClean="0"/>
+              <a:t>In questo modo l'Arduino può incorporare la data e l'ora direttamente all'interno del log.</a:t>
+            </a:r>
+          </a:p>
+          <a:p>
+            <a:endParaRPr lang="it-IT" dirty="0" smtClean="0"/>
+          </a:p>
+          <a:p>
+            <a:r>
+              <a:rPr lang="it-IT" dirty="0" smtClean="0"/>
+              <a:t>Durante lo sviluppo ho scoperto che Raspbian, il sistema operativo </a:t>
+            </a:r>
+          </a:p>
+          <a:p>
+            <a:r>
+              <a:rPr lang="it-IT" dirty="0" smtClean="0"/>
+              <a:t>progettato per i Raspberry Pi, non è ancora stato aggiornato </a:t>
+            </a:r>
+          </a:p>
+          <a:p>
+            <a:r>
+              <a:rPr lang="it-IT" dirty="0" smtClean="0"/>
+              <a:t>per essere un sistema operativo a 64 bit, perciò non poteva sfruttare al meglio </a:t>
+            </a:r>
+          </a:p>
+          <a:p>
+            <a:r>
+              <a:rPr lang="it-IT" dirty="0" smtClean="0"/>
+              <a:t>l'architettura ARM a 64 bit del modello usato. Questo comportava alcune incompatibilità:</a:t>
+            </a:r>
+          </a:p>
+          <a:p>
+            <a:r>
+              <a:rPr lang="it-IT" dirty="0" smtClean="0"/>
+              <a:t>MongoDB su 32 bit era limitato a 2 GB di dati e aveva problemi a connettersi </a:t>
+            </a:r>
+          </a:p>
+          <a:p>
+            <a:r>
+              <a:rPr lang="it-IT" dirty="0" smtClean="0"/>
+              <a:t>con l'ultima versione di Node.js.</a:t>
+            </a:r>
+          </a:p>
+          <a:p>
+            <a:r>
+              <a:rPr lang="it-IT" dirty="0" smtClean="0"/>
+              <a:t>Come soluzione a questo problema ho deciso di installare openSUSE, che non è stato progettato </a:t>
+            </a:r>
+          </a:p>
+          <a:p>
+            <a:r>
+              <a:rPr lang="it-IT" dirty="0" smtClean="0"/>
+              <a:t>per il Raspberry Pi e quindi offriva una prestazione minore, ma non ha creato grossi problemi.</a:t>
+            </a:r>
+          </a:p>
+          <a:p>
+            <a:endParaRPr lang="it-IT" dirty="0" smtClean="0"/>
+          </a:p>
+          <a:p>
+            <a:r>
+              <a:rPr lang="it-IT" dirty="0" smtClean="0"/>
+              <a:t>L'ingresso nello spazio di Yatta è regolato da un tesseramento: ogni anno, tutte le tessere non rinnovate </a:t>
+            </a:r>
+          </a:p>
+          <a:p>
+            <a:r>
+              <a:rPr lang="it-IT" dirty="0" smtClean="0"/>
+              <a:t>vengono disattivate: per evitare di farlo manualmente, ho implementato uno scheduler che viene eseguito automaticamente </a:t>
+            </a:r>
+          </a:p>
+          <a:p>
+            <a:r>
+              <a:rPr lang="it-IT" dirty="0" smtClean="0"/>
+              <a:t>una volta all'anno</a:t>
+            </a:r>
+            <a:r>
+              <a:rPr lang="it-IT" baseline="0" dirty="0" smtClean="0"/>
+              <a:t> e che disattiva tutte le tessere non rinnovate nell’anno corrente.</a:t>
+            </a:r>
+            <a:endParaRPr lang="en-US" dirty="0"/>
+          </a:p>
+        </p:txBody>
+      </p:sp>
+      <p:sp>
+        <p:nvSpPr>
+          <p:cNvPr id="4" name="Substituent număr diapozitiv 3"/>
+          <p:cNvSpPr>
+            <a:spLocks noGrp="1"/>
+          </p:cNvSpPr>
+          <p:nvPr>
+            <p:ph type="sldNum" sz="quarter" idx="10"/>
+          </p:nvPr>
+        </p:nvSpPr>
+        <p:spPr/>
+        <p:txBody>
+          <a:bodyPr/>
+          <a:lstStyle/>
+          <a:p>
+            <a:fld id="{5D5D8A57-A6DA-4DCE-ADC7-3F4B291DAEDD}" type="slidenum">
+              <a:rPr lang="en-US" smtClean="0"/>
+              <a:t>8</a:t>
+            </a:fld>
+            <a:endParaRPr lang="en-US"/>
+          </a:p>
+        </p:txBody>
+      </p:sp>
+    </p:spTree>
+    <p:extLst>
+      <p:ext uri="{BB962C8B-B14F-4D97-AF65-F5344CB8AC3E}">
+        <p14:creationId xmlns:p14="http://schemas.microsoft.com/office/powerpoint/2010/main" val="341737221"/>
+      </p:ext>
+    </p:extLst>
+  </p:cSld>
+  <p:clrMapOvr>
+    <a:masterClrMapping/>
+  </p:clrMapOvr>
+</p:notes>
+</file>
+
+<file path=ppt/notesSlides/notesSlide9.xml><?xml version="1.0" encoding="utf-8"?>
+<p:notes xmlns:a="http://schemas.openxmlformats.org/drawingml/2006/main" xmlns:r="http://schemas.openxmlformats.org/officeDocument/2006/relationships" xmlns:p="http://schemas.openxmlformats.org/presentationml/2006/main">
+  <p:cSld>
+    <p:spTree>
+      <p:nvGrpSpPr>
+        <p:cNvPr id="1" name=""/>
+        <p:cNvGrpSpPr/>
+        <p:nvPr/>
+      </p:nvGrpSpPr>
+      <p:grpSpPr>
+        <a:xfrm>
+          <a:off x="0" y="0"/>
+          <a:ext cx="0" cy="0"/>
+          <a:chOff x="0" y="0"/>
+          <a:chExt cx="0" cy="0"/>
+        </a:xfrm>
+      </p:grpSpPr>
+      <p:sp>
+        <p:nvSpPr>
+          <p:cNvPr id="2" name="Substituent imagine diapozitiv 1"/>
+          <p:cNvSpPr>
+            <a:spLocks noGrp="1" noRot="1" noChangeAspect="1"/>
+          </p:cNvSpPr>
+          <p:nvPr>
+            <p:ph type="sldImg"/>
+          </p:nvPr>
+        </p:nvSpPr>
+        <p:spPr/>
+      </p:sp>
+      <p:sp>
+        <p:nvSpPr>
+          <p:cNvPr id="3" name="Substituent note 2"/>
+          <p:cNvSpPr>
+            <a:spLocks noGrp="1"/>
+          </p:cNvSpPr>
+          <p:nvPr>
+            <p:ph type="body" idx="1"/>
+          </p:nvPr>
+        </p:nvSpPr>
+        <p:spPr/>
+        <p:txBody>
+          <a:bodyPr/>
+          <a:lstStyle/>
+          <a:p>
+            <a:r>
+              <a:rPr lang="it-IT" dirty="0" smtClean="0"/>
+              <a:t>Prima di essere messo in utilizzo, ci sono alcuni possibili miglioramenti </a:t>
+            </a:r>
+          </a:p>
+          <a:p>
+            <a:r>
+              <a:rPr lang="it-IT" dirty="0" smtClean="0"/>
+              <a:t>per portare il prototipo</a:t>
+            </a:r>
+            <a:r>
+              <a:rPr lang="it-IT" baseline="0" dirty="0" smtClean="0"/>
+              <a:t> </a:t>
+            </a:r>
+            <a:r>
+              <a:rPr lang="it-IT" dirty="0" smtClean="0"/>
+              <a:t>più verso lo standard attuale dei sistemi commerciali.</a:t>
+            </a:r>
+          </a:p>
+          <a:p>
+            <a:endParaRPr lang="it-IT" dirty="0" smtClean="0"/>
+          </a:p>
+          <a:p>
+            <a:r>
+              <a:rPr lang="it-IT" dirty="0" smtClean="0"/>
+              <a:t>Al momento, il progetto dispone di una rete LAN privata a cui può accedere solo l'amministratore. </a:t>
+            </a:r>
+          </a:p>
+          <a:p>
+            <a:r>
+              <a:rPr lang="it-IT" dirty="0" smtClean="0"/>
+              <a:t>Si potrebbe evitare questa cosa con un sistema di login sul sito web, per far sì che possano accedere </a:t>
+            </a:r>
+          </a:p>
+          <a:p>
+            <a:r>
+              <a:rPr lang="it-IT" dirty="0" smtClean="0"/>
+              <a:t>solo le persone verificate. </a:t>
+            </a:r>
+          </a:p>
+          <a:p>
+            <a:endParaRPr lang="it-IT" dirty="0" smtClean="0"/>
+          </a:p>
+          <a:p>
+            <a:r>
+              <a:rPr lang="it-IT" dirty="0" smtClean="0"/>
+              <a:t>E' possibile far sì che l'Arduino sia attivo soltanto durante la fascia oraria di lavoro, quando c'è qualcuno </a:t>
+            </a:r>
+          </a:p>
+          <a:p>
+            <a:r>
+              <a:rPr lang="it-IT" dirty="0" smtClean="0"/>
+              <a:t>presente in sede. </a:t>
+            </a:r>
+          </a:p>
+          <a:p>
+            <a:endParaRPr lang="it-IT" dirty="0" smtClean="0"/>
+          </a:p>
+          <a:p>
+            <a:r>
+              <a:rPr lang="it-IT" dirty="0" smtClean="0"/>
+              <a:t>L'Arduino è stato programmato per chiudere la porta dopo un certo intervallo di tempo. E' possibile aggiungere </a:t>
+            </a:r>
+          </a:p>
+          <a:p>
+            <a:r>
+              <a:rPr lang="it-IT" dirty="0" smtClean="0"/>
+              <a:t>un sensore per il rilevamento delle persone per far in modo che la porta venga chiusa solo quando non ci sono </a:t>
+            </a:r>
+          </a:p>
+          <a:p>
+            <a:r>
+              <a:rPr lang="it-IT" dirty="0" smtClean="0"/>
+              <a:t>più persone nella vicinanza.</a:t>
+            </a:r>
+          </a:p>
+          <a:p>
+            <a:endParaRPr lang="it-IT" dirty="0" smtClean="0"/>
+          </a:p>
+          <a:p>
+            <a:r>
+              <a:rPr lang="it-IT" dirty="0" smtClean="0"/>
+              <a:t>Inoltre si potrebbe installare un sistema di allarme per quando la porta viene aperta forzatamente durante la fascia oraria </a:t>
+            </a:r>
+          </a:p>
+          <a:p>
+            <a:r>
+              <a:rPr lang="it-IT" dirty="0" smtClean="0"/>
+              <a:t>di inattività. </a:t>
+            </a:r>
+            <a:endParaRPr lang="en-US" dirty="0"/>
+          </a:p>
+        </p:txBody>
+      </p:sp>
+      <p:sp>
+        <p:nvSpPr>
+          <p:cNvPr id="4" name="Substituent număr diapozitiv 3"/>
+          <p:cNvSpPr>
+            <a:spLocks noGrp="1"/>
+          </p:cNvSpPr>
+          <p:nvPr>
+            <p:ph type="sldNum" sz="quarter" idx="10"/>
+          </p:nvPr>
+        </p:nvSpPr>
+        <p:spPr/>
+        <p:txBody>
+          <a:bodyPr/>
+          <a:lstStyle/>
+          <a:p>
+            <a:fld id="{5D5D8A57-A6DA-4DCE-ADC7-3F4B291DAEDD}" type="slidenum">
+              <a:rPr lang="en-US" smtClean="0"/>
+              <a:t>9</a:t>
+            </a:fld>
+            <a:endParaRPr lang="en-US"/>
+          </a:p>
+        </p:txBody>
+      </p:sp>
+    </p:spTree>
+    <p:extLst>
+      <p:ext uri="{BB962C8B-B14F-4D97-AF65-F5344CB8AC3E}">
+        <p14:creationId xmlns:p14="http://schemas.microsoft.com/office/powerpoint/2010/main" val="1333230084"/>
+      </p:ext>
+    </p:extLst>
+  </p:cSld>
+  <p:clrMapOvr>
+    <a:masterClrMapping/>
+  </p:clrMapOvr>
+</p:notes>
+</file>
+
 <file path=ppt/slideLayouts/slideLayout1.xml><?xml version="1.0" encoding="utf-8"?>
 <p:sldLayout xmlns:a="http://schemas.openxmlformats.org/drawingml/2006/main" xmlns:r="http://schemas.openxmlformats.org/officeDocument/2006/relationships" xmlns:p="http://schemas.openxmlformats.org/presentationml/2006/main" type="title" preserve="1">
   <p:cSld name="Diapozitiv titlu">
@@ -685,7 +2292,7 @@
           <a:p>
             <a:fld id="{179DE077-2B25-4D43-8A5F-B5A94BA1672D}" type="datetimeFigureOut">
               <a:rPr lang="en-US" smtClean="0"/>
-              <a:t>23-Jun-19</a:t>
+              <a:t>24-Jun-19</a:t>
             </a:fld>
             <a:endParaRPr lang="en-US"/>
           </a:p>
@@ -850,7 +2457,7 @@
           <a:p>
             <a:fld id="{179DE077-2B25-4D43-8A5F-B5A94BA1672D}" type="datetimeFigureOut">
               <a:rPr lang="en-US" smtClean="0"/>
-              <a:t>23-Jun-19</a:t>
+              <a:t>24-Jun-19</a:t>
             </a:fld>
             <a:endParaRPr lang="en-US"/>
           </a:p>
@@ -1025,7 +2632,7 @@
           <a:p>
             <a:fld id="{179DE077-2B25-4D43-8A5F-B5A94BA1672D}" type="datetimeFigureOut">
               <a:rPr lang="en-US" smtClean="0"/>
-              <a:t>23-Jun-19</a:t>
+              <a:t>24-Jun-19</a:t>
             </a:fld>
             <a:endParaRPr lang="en-US"/>
           </a:p>
@@ -1190,7 +2797,7 @@
           <a:p>
             <a:fld id="{179DE077-2B25-4D43-8A5F-B5A94BA1672D}" type="datetimeFigureOut">
               <a:rPr lang="en-US" smtClean="0"/>
-              <a:t>23-Jun-19</a:t>
+              <a:t>24-Jun-19</a:t>
             </a:fld>
             <a:endParaRPr lang="en-US"/>
           </a:p>
@@ -1431,7 +3038,7 @@
           <a:p>
             <a:fld id="{179DE077-2B25-4D43-8A5F-B5A94BA1672D}" type="datetimeFigureOut">
               <a:rPr lang="en-US" smtClean="0"/>
-              <a:t>23-Jun-19</a:t>
+              <a:t>24-Jun-19</a:t>
             </a:fld>
             <a:endParaRPr lang="en-US"/>
           </a:p>
@@ -1714,7 +3321,7 @@
           <a:p>
             <a:fld id="{179DE077-2B25-4D43-8A5F-B5A94BA1672D}" type="datetimeFigureOut">
               <a:rPr lang="en-US" smtClean="0"/>
-              <a:t>23-Jun-19</a:t>
+              <a:t>24-Jun-19</a:t>
             </a:fld>
             <a:endParaRPr lang="en-US"/>
           </a:p>
@@ -2143,7 +3750,7 @@
           <a:p>
             <a:fld id="{179DE077-2B25-4D43-8A5F-B5A94BA1672D}" type="datetimeFigureOut">
               <a:rPr lang="en-US" smtClean="0"/>
-              <a:t>23-Jun-19</a:t>
+              <a:t>24-Jun-19</a:t>
             </a:fld>
             <a:endParaRPr lang="en-US"/>
           </a:p>
@@ -2256,7 +3863,7 @@
           <a:p>
             <a:fld id="{179DE077-2B25-4D43-8A5F-B5A94BA1672D}" type="datetimeFigureOut">
               <a:rPr lang="en-US" smtClean="0"/>
-              <a:t>23-Jun-19</a:t>
+              <a:t>24-Jun-19</a:t>
             </a:fld>
             <a:endParaRPr lang="en-US"/>
           </a:p>
@@ -2346,7 +3953,7 @@
           <a:p>
             <a:fld id="{179DE077-2B25-4D43-8A5F-B5A94BA1672D}" type="datetimeFigureOut">
               <a:rPr lang="en-US" smtClean="0"/>
-              <a:t>23-Jun-19</a:t>
+              <a:t>24-Jun-19</a:t>
             </a:fld>
             <a:endParaRPr lang="en-US"/>
           </a:p>
@@ -2535,7 +4142,7 @@
           <a:p>
             <a:fld id="{179DE077-2B25-4D43-8A5F-B5A94BA1672D}" type="datetimeFigureOut">
               <a:rPr lang="en-US" smtClean="0"/>
-              <a:t>23-Jun-19</a:t>
+              <a:t>24-Jun-19</a:t>
             </a:fld>
             <a:endParaRPr lang="en-US"/>
           </a:p>
@@ -2853,7 +4460,7 @@
           <a:p>
             <a:fld id="{179DE077-2B25-4D43-8A5F-B5A94BA1672D}" type="datetimeFigureOut">
               <a:rPr lang="en-US" smtClean="0"/>
-              <a:t>23-Jun-19</a:t>
+              <a:t>24-Jun-19</a:t>
             </a:fld>
             <a:endParaRPr lang="en-US"/>
           </a:p>
@@ -3232,7 +4839,7 @@
           <a:p>
             <a:fld id="{179DE077-2B25-4D43-8A5F-B5A94BA1672D}" type="datetimeFigureOut">
               <a:rPr lang="en-US" smtClean="0"/>
-              <a:t>23-Jun-19</a:t>
+              <a:t>24-Jun-19</a:t>
             </a:fld>
             <a:endParaRPr lang="en-US"/>
           </a:p>
@@ -3614,11 +5221,15 @@
             </a:r>
             <a:r>
               <a:rPr lang="en-US" sz="2800" dirty="0" smtClean="0"/>
-              <a:t>: 		   </a:t>
+              <a:t>: 		  </a:t>
             </a:r>
             <a:r>
               <a:rPr lang="en-US" sz="2800" b="1" dirty="0" smtClean="0"/>
-              <a:t>Andrea TRENTINI</a:t>
+              <a:t>Andrea </a:t>
+            </a:r>
+            <a:r>
+              <a:rPr lang="en-US" sz="2800" b="1" dirty="0" smtClean="0"/>
+              <a:t>TRENTINI</a:t>
             </a:r>
             <a:endParaRPr lang="en-US" sz="2800" b="1" dirty="0"/>
           </a:p>
@@ -3638,7 +5249,7 @@
             </a:r>
             <a:r>
               <a:rPr lang="en-US" sz="2800" dirty="0" smtClean="0"/>
-              <a:t>             </a:t>
+              <a:t>            </a:t>
             </a:r>
             <a:r>
               <a:rPr lang="en-US" sz="2800" b="1" dirty="0" smtClean="0"/>
@@ -3657,7 +5268,7 @@
           <p:nvPr/>
         </p:nvPicPr>
         <p:blipFill>
-          <a:blip r:embed="rId2" cstate="print">
+          <a:blip r:embed="rId3" cstate="print">
             <a:extLst>
               <a:ext uri="{28A0092B-C50C-407E-A947-70E740481C1C}">
                 <a14:useLocalDpi xmlns:a14="http://schemas.microsoft.com/office/drawing/2010/main" val="0"/>
@@ -3698,7 +5309,7 @@
           <p:nvPr/>
         </p:nvPicPr>
         <p:blipFill>
-          <a:blip r:embed="rId3" cstate="print">
+          <a:blip r:embed="rId4" cstate="print">
             <a:extLst>
               <a:ext uri="{28A0092B-C50C-407E-A947-70E740481C1C}">
                 <a14:useLocalDpi xmlns:a14="http://schemas.microsoft.com/office/drawing/2010/main" val="0"/>
@@ -3739,7 +5350,7 @@
         <p:spPr>
           <a:xfrm>
             <a:off x="961930" y="2161635"/>
-            <a:ext cx="5491915" cy="0"/>
+            <a:ext cx="5415105" cy="0"/>
           </a:xfrm>
           <a:prstGeom prst="line">
             <a:avLst/>
@@ -3842,7 +5453,7 @@
           <p:nvPr/>
         </p:nvPicPr>
         <p:blipFill>
-          <a:blip r:embed="rId2">
+          <a:blip r:embed="rId3">
             <a:extLst>
               <a:ext uri="{28A0092B-C50C-407E-A947-70E740481C1C}">
                 <a14:useLocalDpi xmlns:a14="http://schemas.microsoft.com/office/drawing/2010/main" val="0"/>
@@ -3964,29 +5575,30 @@
       </p:grpSpPr>
       <p:sp>
         <p:nvSpPr>
-          <p:cNvPr id="3" name="Substituent conținut 2"/>
-          <p:cNvSpPr>
-            <a:spLocks noGrp="1"/>
-          </p:cNvSpPr>
-          <p:nvPr>
-            <p:ph idx="1"/>
+          <p:cNvPr id="4" name="Titlu 1"/>
+          <p:cNvSpPr>
+            <a:spLocks noGrp="1"/>
+          </p:cNvSpPr>
+          <p:nvPr>
+            <p:ph type="title"/>
           </p:nvPr>
         </p:nvSpPr>
         <p:spPr>
           <a:xfrm>
-            <a:off x="457200" y="2929735"/>
-            <a:ext cx="8229600" cy="1190555"/>
+            <a:off x="885120" y="2852925"/>
+            <a:ext cx="7373760" cy="1143000"/>
           </a:xfrm>
+          <a:noFill/>
+          <a:ln>
+            <a:noFill/>
+          </a:ln>
         </p:spPr>
         <p:txBody>
           <a:bodyPr>
-            <a:normAutofit/>
+            <a:noAutofit/>
           </a:bodyPr>
           <a:lstStyle/>
           <a:p>
-            <a:pPr marL="0" indent="0" algn="ctr">
-              <a:buNone/>
-            </a:pPr>
             <a:r>
               <a:rPr lang="en-US" sz="5400" dirty="0" smtClean="0"/>
               <a:t>Grazie per </a:t>
@@ -4041,7 +5653,7 @@
         </p:nvSpPr>
         <p:spPr>
           <a:xfrm>
-            <a:off x="325839" y="548625"/>
+            <a:off x="325859" y="548625"/>
             <a:ext cx="3286036" cy="1143000"/>
           </a:xfrm>
           <a:noFill/>
@@ -4259,7 +5871,7 @@
           <p:nvPr/>
         </p:nvPicPr>
         <p:blipFill>
-          <a:blip r:embed="rId2">
+          <a:blip r:embed="rId3">
             <a:extLst>
               <a:ext uri="{28A0092B-C50C-407E-A947-70E740481C1C}">
                 <a14:useLocalDpi xmlns:a14="http://schemas.microsoft.com/office/drawing/2010/main" val="0"/>
@@ -4452,7 +6064,7 @@
         <p:spPr>
           <a:xfrm>
             <a:off x="457200" y="1931205"/>
-            <a:ext cx="6726340" cy="4248314"/>
+            <a:ext cx="6611126" cy="4248314"/>
           </a:xfrm>
         </p:spPr>
         <p:txBody>
@@ -4465,19 +6077,19 @@
               <a:buNone/>
             </a:pPr>
             <a:r>
-              <a:rPr lang="en-US" sz="2400" dirty="0" err="1" smtClean="0"/>
+              <a:rPr lang="en-US" sz="2500" dirty="0" err="1" smtClean="0"/>
               <a:t>Linguaggio</a:t>
             </a:r>
             <a:r>
-              <a:rPr lang="en-US" sz="2400" dirty="0" smtClean="0"/>
+              <a:rPr lang="en-US" sz="2500" dirty="0" smtClean="0"/>
               <a:t>: </a:t>
             </a:r>
             <a:r>
-              <a:rPr lang="en-US" sz="2400" dirty="0" err="1" smtClean="0"/>
+              <a:rPr lang="en-US" sz="2500" dirty="0" err="1" smtClean="0"/>
               <a:t>Arduino</a:t>
             </a:r>
             <a:r>
-              <a:rPr lang="en-US" sz="2400" dirty="0" smtClean="0"/>
+              <a:rPr lang="en-US" sz="2500" dirty="0" smtClean="0"/>
               <a:t> Programming Language</a:t>
             </a:r>
           </a:p>
@@ -4673,7 +6285,7 @@
               <a:buNone/>
             </a:pPr>
             <a:r>
-              <a:rPr lang="en-US" sz="2400" dirty="0" smtClean="0"/>
+              <a:rPr lang="en-US" sz="3200" dirty="0" smtClean="0"/>
               <a:t>Back-End: JavaScript</a:t>
             </a:r>
           </a:p>
@@ -4690,11 +6302,7 @@
             </a:pPr>
             <a:r>
               <a:rPr lang="en-US" sz="2400" dirty="0" smtClean="0"/>
-              <a:t>Raspberry </a:t>
-            </a:r>
-            <a:r>
-              <a:rPr lang="en-US" sz="2400" dirty="0" smtClean="0"/>
-              <a:t>Pi | hosting</a:t>
+              <a:t>Raspberry Pi | hosting</a:t>
             </a:r>
           </a:p>
           <a:p>
@@ -4884,8 +6492,8 @@
         </p:nvSpPr>
         <p:spPr>
           <a:xfrm>
-            <a:off x="539475" y="2161635"/>
-            <a:ext cx="2304300" cy="676649"/>
+            <a:off x="451086" y="1823310"/>
+            <a:ext cx="2803565" cy="676649"/>
           </a:xfrm>
         </p:spPr>
         <p:txBody>
@@ -4899,10 +6507,10 @@
               <a:buChar char="Ø"/>
             </a:pPr>
             <a:r>
-              <a:rPr lang="en-US" sz="2400" dirty="0" smtClean="0"/>
+              <a:rPr lang="en-US" sz="3200" dirty="0" smtClean="0"/>
               <a:t>Pattern MVC</a:t>
             </a:r>
-            <a:endParaRPr lang="en-US" sz="2400" dirty="0"/>
+            <a:endParaRPr lang="en-US" sz="3200" dirty="0"/>
           </a:p>
         </p:txBody>
       </p:sp>
@@ -4915,7 +6523,7 @@
           <p:nvPr/>
         </p:nvPicPr>
         <p:blipFill>
-          <a:blip r:embed="rId2">
+          <a:blip r:embed="rId3">
             <a:extLst>
               <a:ext uri="{28A0092B-C50C-407E-A947-70E740481C1C}">
                 <a14:useLocalDpi xmlns:a14="http://schemas.microsoft.com/office/drawing/2010/main" val="0"/>
@@ -5181,8 +6789,13 @@
             </a:pPr>
             <a:r>
               <a:rPr lang="en-US" dirty="0" smtClean="0"/>
-              <a:t>Front-End: HTML5 / CSS / JavaScript</a:t>
-            </a:r>
+              <a:t>Front-End: HTML5 / </a:t>
+            </a:r>
+            <a:r>
+              <a:rPr lang="en-US" dirty="0" smtClean="0"/>
+              <a:t>JavaScript / CSS3</a:t>
+            </a:r>
+            <a:endParaRPr lang="en-US" dirty="0" smtClean="0"/>
           </a:p>
           <a:p>
             <a:pPr marL="0" indent="0">
@@ -5191,26 +6804,50 @@
             <a:endParaRPr lang="en-US" dirty="0" smtClean="0"/>
           </a:p>
           <a:p>
+            <a:pPr>
+              <a:buFont typeface="Wingdings" pitchFamily="2" charset="2"/>
+              <a:buChar char="Ø"/>
+            </a:pPr>
             <a:r>
               <a:rPr lang="en-US" dirty="0" smtClean="0"/>
               <a:t>jQuery</a:t>
             </a:r>
+          </a:p>
+          <a:p>
+            <a:pPr marL="0" indent="0">
+              <a:buNone/>
+            </a:pPr>
             <a:endParaRPr lang="en-US" dirty="0"/>
           </a:p>
           <a:p>
-            <a:r>
-              <a:rPr lang="en-US" dirty="0"/>
+            <a:pPr>
+              <a:buFont typeface="Wingdings" pitchFamily="2" charset="2"/>
+              <a:buChar char="Ø"/>
+            </a:pPr>
+            <a:r>
+              <a:rPr lang="en-US" dirty="0" smtClean="0"/>
               <a:t>EJS</a:t>
             </a:r>
           </a:p>
           <a:p>
-            <a:r>
-              <a:rPr lang="en-US" dirty="0"/>
-              <a:t>W3CSS </a:t>
-            </a:r>
+            <a:pPr>
+              <a:buFont typeface="Wingdings" pitchFamily="2" charset="2"/>
+              <a:buChar char="Ø"/>
+            </a:pPr>
+            <a:endParaRPr lang="en-US" dirty="0"/>
+          </a:p>
+          <a:p>
+            <a:pPr>
+              <a:buFont typeface="Wingdings" pitchFamily="2" charset="2"/>
+              <a:buChar char="Ø"/>
+            </a:pPr>
             <a:r>
               <a:rPr lang="en-US" dirty="0" smtClean="0"/>
-              <a:t>	 			</a:t>
+              <a:t>W3CSS | Responsive </a:t>
+            </a:r>
+            <a:r>
+              <a:rPr lang="en-US" dirty="0" smtClean="0"/>
+              <a:t>			</a:t>
             </a:r>
           </a:p>
         </p:txBody>
@@ -5295,8 +6932,8 @@
         </p:nvSpPr>
         <p:spPr>
           <a:xfrm>
-            <a:off x="457200" y="1854395"/>
-            <a:ext cx="8229600" cy="3566176"/>
+            <a:off x="438912" y="1845862"/>
+            <a:ext cx="7935183" cy="3349768"/>
           </a:xfrm>
         </p:spPr>
         <p:txBody>
@@ -5311,172 +6948,104 @@
             <a:endParaRPr lang="en-US" dirty="0" smtClean="0"/>
           </a:p>
           <a:p>
-            <a:r>
-              <a:rPr lang="en-US" dirty="0" smtClean="0"/>
+            <a:pPr>
+              <a:buFont typeface="Wingdings" pitchFamily="2" charset="2"/>
+              <a:buChar char="Ø"/>
+            </a:pPr>
+            <a:r>
+              <a:rPr lang="en-US" sz="2400" dirty="0" smtClean="0"/>
               <a:t>Raspberry </a:t>
             </a:r>
             <a:r>
-              <a:rPr lang="en-US" dirty="0" err="1" smtClean="0"/>
+              <a:rPr lang="en-US" sz="2400" dirty="0" err="1" smtClean="0"/>
               <a:t>senza</a:t>
             </a:r>
             <a:r>
-              <a:rPr lang="en-US" dirty="0" smtClean="0"/>
+              <a:rPr lang="en-US" sz="2400" dirty="0" smtClean="0"/>
               <a:t> </a:t>
             </a:r>
             <a:r>
-              <a:rPr lang="en-US" dirty="0" err="1" smtClean="0"/>
-              <a:t>connessione</a:t>
-            </a:r>
-            <a:r>
-              <a:rPr lang="en-US" dirty="0" smtClean="0"/>
+              <a:rPr lang="en-US" sz="2400" dirty="0" smtClean="0"/>
+              <a:t>Internet </a:t>
+            </a:r>
+            <a:r>
+              <a:rPr lang="en-US" sz="2400" dirty="0" smtClean="0"/>
+              <a:t>-&gt; RTC </a:t>
+            </a:r>
+            <a:endParaRPr lang="en-US" sz="2400" dirty="0" smtClean="0"/>
+          </a:p>
+          <a:p>
+            <a:pPr>
+              <a:buFont typeface="Wingdings" pitchFamily="2" charset="2"/>
+              <a:buChar char="Ø"/>
+            </a:pPr>
+            <a:endParaRPr lang="en-US" sz="2400" dirty="0" smtClean="0"/>
+          </a:p>
+          <a:p>
+            <a:pPr>
+              <a:buFont typeface="Wingdings" pitchFamily="2" charset="2"/>
+              <a:buChar char="Ø"/>
+            </a:pPr>
+            <a:r>
+              <a:rPr lang="en-US" sz="2400" dirty="0" err="1" smtClean="0"/>
+              <a:t>Raspbian</a:t>
+            </a:r>
+            <a:r>
+              <a:rPr lang="en-US" sz="2400" dirty="0" smtClean="0"/>
+              <a:t> e ARM 64-bit -&gt; </a:t>
+            </a:r>
+            <a:r>
+              <a:rPr lang="en-US" sz="2400" dirty="0" err="1" smtClean="0"/>
+              <a:t>openSUSE</a:t>
+            </a:r>
+            <a:endParaRPr lang="en-US" sz="2400" dirty="0" smtClean="0"/>
+          </a:p>
+          <a:p>
+            <a:pPr marL="114300" indent="0">
+              <a:buNone/>
+            </a:pPr>
+            <a:endParaRPr lang="en-US" sz="2400" dirty="0" smtClean="0"/>
+          </a:p>
+          <a:p>
+            <a:pPr>
+              <a:buFont typeface="Wingdings" pitchFamily="2" charset="2"/>
+              <a:buChar char="Ø"/>
+            </a:pPr>
+            <a:r>
+              <a:rPr lang="en-US" sz="2400" dirty="0" err="1" smtClean="0"/>
+              <a:t>Disattivazione</a:t>
+            </a:r>
+            <a:r>
+              <a:rPr lang="en-US" sz="2400" dirty="0" smtClean="0"/>
               <a:t> </a:t>
             </a:r>
             <a:r>
-              <a:rPr lang="en-US" dirty="0" smtClean="0"/>
-              <a:t>Internet -&gt; RTC </a:t>
-            </a:r>
-            <a:endParaRPr lang="en-US" dirty="0" smtClean="0"/>
-          </a:p>
-          <a:p>
-            <a:r>
-              <a:rPr lang="en-US" dirty="0" err="1" smtClean="0"/>
-              <a:t>Incompatibilità</a:t>
-            </a:r>
-            <a:r>
-              <a:rPr lang="en-US" dirty="0" smtClean="0"/>
+              <a:rPr lang="en-US" sz="2400" dirty="0" err="1" smtClean="0"/>
+              <a:t>delle</a:t>
+            </a:r>
+            <a:r>
+              <a:rPr lang="en-US" sz="2400" dirty="0" smtClean="0"/>
               <a:t> </a:t>
             </a:r>
             <a:r>
-              <a:rPr lang="en-US" dirty="0" err="1" smtClean="0"/>
-              <a:t>tra</a:t>
-            </a:r>
-            <a:r>
-              <a:rPr lang="en-US" dirty="0" smtClean="0"/>
+              <a:rPr lang="en-US" sz="2400" dirty="0" err="1" smtClean="0"/>
+              <a:t>tessere</a:t>
+            </a:r>
+            <a:r>
+              <a:rPr lang="en-US" sz="2400" dirty="0" smtClean="0"/>
               <a:t> </a:t>
             </a:r>
             <a:r>
-              <a:rPr lang="en-US" dirty="0" err="1" smtClean="0"/>
-              <a:t>Raspbian</a:t>
-            </a:r>
-            <a:r>
-              <a:rPr lang="en-US" dirty="0" smtClean="0"/>
-              <a:t> e </a:t>
-            </a:r>
-            <a:r>
-              <a:rPr lang="en-US" dirty="0" err="1" smtClean="0"/>
-              <a:t>architettura</a:t>
-            </a:r>
-            <a:r>
-              <a:rPr lang="en-US" dirty="0" smtClean="0"/>
-              <a:t> 64 bit -&gt; </a:t>
-            </a:r>
-            <a:r>
-              <a:rPr lang="en-US" dirty="0" err="1" smtClean="0"/>
-              <a:t>openSUSE</a:t>
-            </a:r>
-            <a:r>
-              <a:rPr lang="en-US" dirty="0" smtClean="0"/>
-              <a:t> </a:t>
-            </a:r>
-          </a:p>
-          <a:p>
-            <a:r>
-              <a:rPr lang="en-US" dirty="0" err="1" smtClean="0"/>
-              <a:t>Problema</a:t>
-            </a:r>
-            <a:r>
-              <a:rPr lang="en-US" dirty="0" smtClean="0"/>
-              <a:t> di </a:t>
-            </a:r>
-            <a:r>
-              <a:rPr lang="en-US" dirty="0" err="1" smtClean="0"/>
-              <a:t>sicurezza</a:t>
-            </a:r>
-            <a:r>
-              <a:rPr lang="en-US" dirty="0" smtClean="0"/>
-              <a:t> </a:t>
-            </a:r>
-            <a:r>
-              <a:rPr lang="en-US" dirty="0" err="1" smtClean="0"/>
-              <a:t>all’interno</a:t>
-            </a:r>
-            <a:r>
-              <a:rPr lang="en-US" dirty="0" smtClean="0"/>
-              <a:t> </a:t>
-            </a:r>
-            <a:r>
-              <a:rPr lang="en-US" dirty="0" err="1" smtClean="0"/>
-              <a:t>della</a:t>
-            </a:r>
-            <a:r>
-              <a:rPr lang="en-US" dirty="0" smtClean="0"/>
-              <a:t> rete locale -&gt; router </a:t>
-            </a:r>
-            <a:r>
-              <a:rPr lang="en-US" dirty="0" err="1" smtClean="0"/>
-              <a:t>dedicato</a:t>
-            </a:r>
-            <a:r>
-              <a:rPr lang="en-US" dirty="0" smtClean="0"/>
-              <a:t> ad </a:t>
-            </a:r>
-            <a:r>
-              <a:rPr lang="en-US" dirty="0" err="1" smtClean="0"/>
-              <a:t>una</a:t>
-            </a:r>
-            <a:r>
-              <a:rPr lang="en-US" dirty="0" smtClean="0"/>
-              <a:t> LAN </a:t>
-            </a:r>
-            <a:r>
-              <a:rPr lang="en-US" dirty="0" err="1" smtClean="0"/>
-              <a:t>privata</a:t>
-            </a:r>
-            <a:r>
-              <a:rPr lang="en-US" dirty="0" smtClean="0"/>
-              <a:t> </a:t>
-            </a:r>
-          </a:p>
-          <a:p>
-            <a:r>
-              <a:rPr lang="en-US" dirty="0" err="1" smtClean="0"/>
-              <a:t>Disattivazione</a:t>
-            </a:r>
-            <a:r>
-              <a:rPr lang="en-US" dirty="0" smtClean="0"/>
-              <a:t> </a:t>
-            </a:r>
-            <a:r>
-              <a:rPr lang="en-US" dirty="0" err="1" smtClean="0"/>
-              <a:t>tessere</a:t>
-            </a:r>
-            <a:r>
-              <a:rPr lang="en-US" dirty="0" smtClean="0"/>
-              <a:t> </a:t>
-            </a:r>
-            <a:r>
-              <a:rPr lang="en-US" dirty="0" err="1" smtClean="0"/>
-              <a:t>soci</a:t>
-            </a:r>
-            <a:r>
-              <a:rPr lang="en-US" dirty="0" smtClean="0"/>
-              <a:t> non </a:t>
-            </a:r>
-            <a:r>
-              <a:rPr lang="en-US" dirty="0" err="1" smtClean="0"/>
-              <a:t>più</a:t>
-            </a:r>
-            <a:r>
-              <a:rPr lang="en-US" dirty="0" smtClean="0"/>
-              <a:t> </a:t>
-            </a:r>
-            <a:r>
-              <a:rPr lang="en-US" dirty="0" err="1" smtClean="0"/>
-              <a:t>iscritti</a:t>
-            </a:r>
-            <a:r>
-              <a:rPr lang="en-US" dirty="0" smtClean="0"/>
-              <a:t> -&gt; scheduler</a:t>
+              <a:rPr lang="en-US" sz="2400" dirty="0" err="1" smtClean="0"/>
+              <a:t>scadute</a:t>
+            </a:r>
+            <a:r>
+              <a:rPr lang="en-US" sz="2400" dirty="0" smtClean="0"/>
+              <a:t> -&gt; </a:t>
+            </a:r>
+            <a:r>
+              <a:rPr lang="en-US" sz="2400" dirty="0" smtClean="0"/>
+              <a:t>scheduler</a:t>
             </a:r>
           </a:p>
         </p:txBody>
@@ -5569,124 +7138,96 @@
             <a:pPr marL="0" indent="0">
               <a:buNone/>
             </a:pPr>
-            <a:r>
-              <a:rPr lang="en-US" dirty="0" smtClean="0"/>
-              <a:t>Per </a:t>
-            </a:r>
-            <a:r>
-              <a:rPr lang="en-US" dirty="0" err="1" smtClean="0"/>
-              <a:t>alzare</a:t>
-            </a:r>
-            <a:r>
-              <a:rPr lang="en-US" dirty="0" smtClean="0"/>
-              <a:t> </a:t>
-            </a:r>
-            <a:r>
-              <a:rPr lang="en-US" dirty="0" err="1" smtClean="0"/>
-              <a:t>il</a:t>
-            </a:r>
-            <a:r>
-              <a:rPr lang="en-US" dirty="0" smtClean="0"/>
-              <a:t> </a:t>
-            </a:r>
-            <a:r>
-              <a:rPr lang="en-US" dirty="0" err="1" smtClean="0"/>
-              <a:t>progetto</a:t>
-            </a:r>
-            <a:r>
-              <a:rPr lang="en-US" dirty="0" smtClean="0"/>
-              <a:t> </a:t>
-            </a:r>
-            <a:r>
-              <a:rPr lang="en-US" dirty="0" err="1" smtClean="0"/>
-              <a:t>agli</a:t>
-            </a:r>
-            <a:r>
-              <a:rPr lang="en-US" dirty="0" smtClean="0"/>
-              <a:t> standard </a:t>
-            </a:r>
-            <a:r>
-              <a:rPr lang="en-US" dirty="0" err="1" smtClean="0"/>
-              <a:t>dei</a:t>
-            </a:r>
-            <a:r>
-              <a:rPr lang="en-US" dirty="0" smtClean="0"/>
-              <a:t> </a:t>
-            </a:r>
-            <a:r>
-              <a:rPr lang="en-US" dirty="0" err="1" smtClean="0"/>
-              <a:t>sistemi</a:t>
-            </a:r>
-            <a:r>
-              <a:rPr lang="en-US" dirty="0" smtClean="0"/>
-              <a:t> </a:t>
-            </a:r>
-            <a:r>
-              <a:rPr lang="en-US" dirty="0" err="1" smtClean="0"/>
-              <a:t>commerciali</a:t>
-            </a:r>
             <a:endParaRPr lang="en-US" dirty="0" smtClean="0"/>
           </a:p>
           <a:p>
-            <a:pPr marL="0" indent="0">
-              <a:buNone/>
+            <a:pPr>
+              <a:buFont typeface="Wingdings" pitchFamily="2" charset="2"/>
+              <a:buChar char="Ø"/>
             </a:pPr>
-            <a:endParaRPr lang="en-US" dirty="0" smtClean="0"/>
-          </a:p>
-          <a:p>
-            <a:r>
-              <a:rPr lang="en-US" dirty="0" smtClean="0"/>
+            <a:r>
+              <a:rPr lang="en-US" sz="2800" dirty="0" smtClean="0"/>
               <a:t>Sistema di login </a:t>
             </a:r>
-          </a:p>
-          <a:p>
-            <a:r>
-              <a:rPr lang="en-US" dirty="0" smtClean="0"/>
+            <a:endParaRPr lang="en-US" sz="2800" dirty="0" smtClean="0"/>
+          </a:p>
+          <a:p>
+            <a:pPr>
+              <a:buFont typeface="Wingdings" pitchFamily="2" charset="2"/>
+              <a:buChar char="Ø"/>
+            </a:pPr>
+            <a:endParaRPr lang="en-US" sz="2800" dirty="0" smtClean="0"/>
+          </a:p>
+          <a:p>
+            <a:pPr>
+              <a:buFont typeface="Wingdings" pitchFamily="2" charset="2"/>
+              <a:buChar char="Ø"/>
+            </a:pPr>
+            <a:r>
+              <a:rPr lang="en-US" sz="2800" dirty="0" smtClean="0"/>
               <a:t>Fascia </a:t>
             </a:r>
             <a:r>
-              <a:rPr lang="en-US" dirty="0" err="1" smtClean="0"/>
+              <a:rPr lang="en-US" sz="2800" dirty="0" err="1" smtClean="0"/>
               <a:t>oraria</a:t>
             </a:r>
             <a:r>
-              <a:rPr lang="en-US" dirty="0" smtClean="0"/>
+              <a:rPr lang="en-US" sz="2800" dirty="0" smtClean="0"/>
               <a:t> di </a:t>
             </a:r>
             <a:r>
-              <a:rPr lang="en-US" dirty="0" err="1" smtClean="0"/>
+              <a:rPr lang="en-US" sz="2800" dirty="0" err="1" smtClean="0"/>
               <a:t>lavoro</a:t>
             </a:r>
-            <a:endParaRPr lang="en-US" dirty="0" smtClean="0"/>
-          </a:p>
-          <a:p>
-            <a:r>
-              <a:rPr lang="en-US" dirty="0" err="1" smtClean="0"/>
+            <a:endParaRPr lang="en-US" sz="2800" dirty="0" smtClean="0"/>
+          </a:p>
+          <a:p>
+            <a:pPr>
+              <a:buFont typeface="Wingdings" pitchFamily="2" charset="2"/>
+              <a:buChar char="Ø"/>
+            </a:pPr>
+            <a:endParaRPr lang="en-US" sz="2800" dirty="0" smtClean="0"/>
+          </a:p>
+          <a:p>
+            <a:pPr>
+              <a:buFont typeface="Wingdings" pitchFamily="2" charset="2"/>
+              <a:buChar char="Ø"/>
+            </a:pPr>
+            <a:r>
+              <a:rPr lang="en-US" sz="2800" dirty="0" err="1" smtClean="0"/>
               <a:t>Sensore</a:t>
             </a:r>
             <a:r>
-              <a:rPr lang="en-US" dirty="0" smtClean="0"/>
+              <a:rPr lang="en-US" sz="2800" dirty="0" smtClean="0"/>
               <a:t> di </a:t>
             </a:r>
             <a:r>
-              <a:rPr lang="en-US" dirty="0" err="1" smtClean="0"/>
+              <a:rPr lang="en-US" sz="2800" dirty="0" err="1" smtClean="0"/>
               <a:t>rilevamento</a:t>
             </a:r>
-            <a:endParaRPr lang="en-US" dirty="0" smtClean="0"/>
-          </a:p>
-          <a:p>
-            <a:r>
-              <a:rPr lang="en-US" dirty="0" smtClean="0"/>
-              <a:t>Sistema </a:t>
-            </a:r>
-            <a:r>
-              <a:rPr lang="en-US" dirty="0" smtClean="0"/>
-              <a:t>di </a:t>
-            </a:r>
-            <a:r>
-              <a:rPr lang="en-US" dirty="0" err="1" smtClean="0"/>
+            <a:endParaRPr lang="en-US" sz="2800" dirty="0" smtClean="0"/>
+          </a:p>
+          <a:p>
+            <a:pPr>
+              <a:buFont typeface="Wingdings" pitchFamily="2" charset="2"/>
+              <a:buChar char="Ø"/>
+            </a:pPr>
+            <a:endParaRPr lang="en-US" sz="2800" dirty="0" smtClean="0"/>
+          </a:p>
+          <a:p>
+            <a:pPr>
+              <a:buFont typeface="Wingdings" pitchFamily="2" charset="2"/>
+              <a:buChar char="Ø"/>
+            </a:pPr>
+            <a:r>
+              <a:rPr lang="en-US" sz="2800" dirty="0" smtClean="0"/>
+              <a:t>Sistema di </a:t>
+            </a:r>
+            <a:r>
+              <a:rPr lang="en-US" sz="2800" dirty="0" err="1" smtClean="0"/>
               <a:t>allarme</a:t>
             </a:r>
-            <a:endParaRPr lang="en-US" dirty="0"/>
+            <a:endParaRPr lang="en-US" sz="2800" dirty="0"/>
           </a:p>
         </p:txBody>
       </p:sp>

</xml_diff>

<commit_message>
aggiornato pdf della presentazione
</commit_message>
<xml_diff>
--- a/Tesi_Sistema_Accessi_IoT_Andrei_Ciulpan_872394/presentazione/Sistema Accessi IoT.pptx
+++ b/Tesi_Sistema_Accessi_IoT_Andrei_Ciulpan_872394/presentazione/Sistema Accessi IoT.pptx
@@ -21,7 +21,7 @@
     <p:sldId id="266" r:id="rId12"/>
   </p:sldIdLst>
   <p:sldSz cx="9144000" cy="6858000" type="screen4x3"/>
-  <p:notesSz cx="6858000" cy="9144000"/>
+  <p:notesSz cx="9144000" cy="6858000"/>
   <p:defaultTextStyle>
     <a:defPPr>
       <a:defRPr lang="en-US"/>
@@ -176,7 +176,7 @@
         <p:spPr>
           <a:xfrm>
             <a:off x="0" y="0"/>
-            <a:ext cx="2971800" cy="457200"/>
+            <a:ext cx="3962400" cy="342900"/>
           </a:xfrm>
           <a:prstGeom prst="rect">
             <a:avLst/>
@@ -206,8 +206,8 @@
         </p:nvSpPr>
         <p:spPr>
           <a:xfrm>
-            <a:off x="3884613" y="0"/>
-            <a:ext cx="2971800" cy="457200"/>
+            <a:off x="5179484" y="0"/>
+            <a:ext cx="3962400" cy="342900"/>
           </a:xfrm>
           <a:prstGeom prst="rect">
             <a:avLst/>
@@ -241,8 +241,8 @@
         </p:nvSpPr>
         <p:spPr>
           <a:xfrm>
-            <a:off x="1143000" y="685800"/>
-            <a:ext cx="4572000" cy="3429000"/>
+            <a:off x="2857500" y="514350"/>
+            <a:ext cx="3429000" cy="2571750"/>
           </a:xfrm>
           <a:prstGeom prst="rect">
             <a:avLst/>
@@ -274,8 +274,8 @@
         </p:nvSpPr>
         <p:spPr>
           <a:xfrm>
-            <a:off x="685800" y="4343400"/>
-            <a:ext cx="5486400" cy="4114800"/>
+            <a:off x="914400" y="3257550"/>
+            <a:ext cx="7315200" cy="3086100"/>
           </a:xfrm>
           <a:prstGeom prst="rect">
             <a:avLst/>
@@ -334,8 +334,8 @@
         </p:nvSpPr>
         <p:spPr>
           <a:xfrm>
-            <a:off x="0" y="8685213"/>
-            <a:ext cx="2971800" cy="457200"/>
+            <a:off x="0" y="6513910"/>
+            <a:ext cx="3962400" cy="342900"/>
           </a:xfrm>
           <a:prstGeom prst="rect">
             <a:avLst/>
@@ -365,8 +365,8 @@
         </p:nvSpPr>
         <p:spPr>
           <a:xfrm>
-            <a:off x="3884613" y="8685213"/>
-            <a:ext cx="2971800" cy="457200"/>
+            <a:off x="5179484" y="6513910"/>
+            <a:ext cx="3962400" cy="342900"/>
           </a:xfrm>
           <a:prstGeom prst="rect">
             <a:avLst/>
@@ -6678,11 +6678,7 @@
             </a:pPr>
             <a:r>
               <a:rPr lang="en-US" sz="3200" dirty="0" smtClean="0"/>
-              <a:t> Pattern </a:t>
-            </a:r>
-            <a:r>
-              <a:rPr lang="en-US" sz="3200" dirty="0" smtClean="0"/>
-              <a:t>MVC</a:t>
+              <a:t> Pattern MVC</a:t>
             </a:r>
             <a:endParaRPr lang="en-US" sz="3200" dirty="0"/>
           </a:p>

</xml_diff>